<commit_message>
Added content to presentation
</commit_message>
<xml_diff>
--- a/FinalPresentation.pptx
+++ b/FinalPresentation.pptx
@@ -9,6 +9,9 @@
     <p:sldId id="257" r:id="rId3"/>
     <p:sldId id="258" r:id="rId4"/>
     <p:sldId id="259" r:id="rId5"/>
+    <p:sldId id="260" r:id="rId6"/>
+    <p:sldId id="261" r:id="rId7"/>
+    <p:sldId id="262" r:id="rId8"/>
   </p:sldIdLst>
   <p:sldSz cx="12192000" cy="6858000"/>
   <p:notesSz cx="6858000" cy="9144000"/>
@@ -107,7 +110,220 @@
       </a:defRPr>
     </a:lvl9pPr>
   </p:defaultTextStyle>
+  <p:extLst>
+    <p:ext uri="{EFAFB233-063F-42B5-8137-9DF3F51BA10A}">
+      <p15:sldGuideLst xmlns:p15="http://schemas.microsoft.com/office/powerpoint/2012/main"/>
+    </p:ext>
+  </p:extLst>
 </p:presentation>
+</file>
+
+<file path=ppt/revisionInfo.xml><?xml version="1.0" encoding="utf-8"?>
+<p1510:revInfo xmlns:a="http://schemas.openxmlformats.org/drawingml/2006/main" xmlns:r="http://schemas.openxmlformats.org/officeDocument/2006/relationships" xmlns:p1510="http://schemas.microsoft.com/office/powerpoint/2015/10/main">
+  <p1510:revLst>
+    <p1510:client id="{139E8E0A-F4F5-4069-9B79-8584EA1D7BE1}" v="8" dt="2020-05-16T19:54:03.437"/>
+  </p1510:revLst>
+</p1510:revInfo>
+</file>
+
+<file path=ppt/changesInfos/changesInfo1.xml><?xml version="1.0" encoding="utf-8"?>
+<pc:chgInfo xmlns:a="http://schemas.openxmlformats.org/drawingml/2006/main" xmlns:r="http://schemas.openxmlformats.org/officeDocument/2006/relationships" xmlns:ac="http://schemas.microsoft.com/office/drawing/2013/main/command" xmlns:pc="http://schemas.microsoft.com/office/powerpoint/2013/main/command">
+  <pc:docChgLst>
+    <pc:chgData name="Andrew Lindsley" userId="74a0f4885c134500" providerId="LiveId" clId="{139E8E0A-F4F5-4069-9B79-8584EA1D7BE1}"/>
+    <pc:docChg chg="undo custSel addSld modSld">
+      <pc:chgData name="Andrew Lindsley" userId="74a0f4885c134500" providerId="LiveId" clId="{139E8E0A-F4F5-4069-9B79-8584EA1D7BE1}" dt="2020-05-16T20:01:27.774" v="1571" actId="20577"/>
+      <pc:docMkLst>
+        <pc:docMk/>
+      </pc:docMkLst>
+      <pc:sldChg chg="addSp delSp modSp mod">
+        <pc:chgData name="Andrew Lindsley" userId="74a0f4885c134500" providerId="LiveId" clId="{139E8E0A-F4F5-4069-9B79-8584EA1D7BE1}" dt="2020-05-16T18:34:13.878" v="313" actId="1076"/>
+        <pc:sldMkLst>
+          <pc:docMk/>
+          <pc:sldMk cId="4028143618" sldId="257"/>
+        </pc:sldMkLst>
+        <pc:spChg chg="mod">
+          <ac:chgData name="Andrew Lindsley" userId="74a0f4885c134500" providerId="LiveId" clId="{139E8E0A-F4F5-4069-9B79-8584EA1D7BE1}" dt="2020-05-16T18:23:03.904" v="45" actId="20577"/>
+          <ac:spMkLst>
+            <pc:docMk/>
+            <pc:sldMk cId="4028143618" sldId="257"/>
+            <ac:spMk id="2" creationId="{40082831-5EF9-4D93-A8F2-B87EE40F0222}"/>
+          </ac:spMkLst>
+        </pc:spChg>
+        <pc:spChg chg="mod">
+          <ac:chgData name="Andrew Lindsley" userId="74a0f4885c134500" providerId="LiveId" clId="{139E8E0A-F4F5-4069-9B79-8584EA1D7BE1}" dt="2020-05-16T18:25:06.576" v="304" actId="20577"/>
+          <ac:spMkLst>
+            <pc:docMk/>
+            <pc:sldMk cId="4028143618" sldId="257"/>
+            <ac:spMk id="3" creationId="{0B248CA2-5B62-4F9A-8A4E-CD60925F41B6}"/>
+          </ac:spMkLst>
+        </pc:spChg>
+        <pc:picChg chg="add del mod">
+          <ac:chgData name="Andrew Lindsley" userId="74a0f4885c134500" providerId="LiveId" clId="{139E8E0A-F4F5-4069-9B79-8584EA1D7BE1}" dt="2020-05-16T18:33:00.726" v="309" actId="478"/>
+          <ac:picMkLst>
+            <pc:docMk/>
+            <pc:sldMk cId="4028143618" sldId="257"/>
+            <ac:picMk id="5" creationId="{FBDB4734-7C38-4E14-BB14-E59AE6EAD065}"/>
+          </ac:picMkLst>
+        </pc:picChg>
+        <pc:picChg chg="add mod">
+          <ac:chgData name="Andrew Lindsley" userId="74a0f4885c134500" providerId="LiveId" clId="{139E8E0A-F4F5-4069-9B79-8584EA1D7BE1}" dt="2020-05-16T18:34:13.878" v="313" actId="1076"/>
+          <ac:picMkLst>
+            <pc:docMk/>
+            <pc:sldMk cId="4028143618" sldId="257"/>
+            <ac:picMk id="7" creationId="{22D6AA92-32C8-4CBE-954D-11A9B3FA07C8}"/>
+          </ac:picMkLst>
+        </pc:picChg>
+      </pc:sldChg>
+      <pc:sldChg chg="modSp mod">
+        <pc:chgData name="Andrew Lindsley" userId="74a0f4885c134500" providerId="LiveId" clId="{139E8E0A-F4F5-4069-9B79-8584EA1D7BE1}" dt="2020-05-16T19:41:33.661" v="1018" actId="27636"/>
+        <pc:sldMkLst>
+          <pc:docMk/>
+          <pc:sldMk cId="230443031" sldId="258"/>
+        </pc:sldMkLst>
+        <pc:spChg chg="mod">
+          <ac:chgData name="Andrew Lindsley" userId="74a0f4885c134500" providerId="LiveId" clId="{139E8E0A-F4F5-4069-9B79-8584EA1D7BE1}" dt="2020-05-16T18:43:27.495" v="338" actId="20577"/>
+          <ac:spMkLst>
+            <pc:docMk/>
+            <pc:sldMk cId="230443031" sldId="258"/>
+            <ac:spMk id="2" creationId="{40082831-5EF9-4D93-A8F2-B87EE40F0222}"/>
+          </ac:spMkLst>
+        </pc:spChg>
+        <pc:spChg chg="mod">
+          <ac:chgData name="Andrew Lindsley" userId="74a0f4885c134500" providerId="LiveId" clId="{139E8E0A-F4F5-4069-9B79-8584EA1D7BE1}" dt="2020-05-16T19:41:33.661" v="1018" actId="27636"/>
+          <ac:spMkLst>
+            <pc:docMk/>
+            <pc:sldMk cId="230443031" sldId="258"/>
+            <ac:spMk id="3" creationId="{0B248CA2-5B62-4F9A-8A4E-CD60925F41B6}"/>
+          </ac:spMkLst>
+        </pc:spChg>
+      </pc:sldChg>
+      <pc:sldChg chg="addSp modSp mod">
+        <pc:chgData name="Andrew Lindsley" userId="74a0f4885c134500" providerId="LiveId" clId="{139E8E0A-F4F5-4069-9B79-8584EA1D7BE1}" dt="2020-05-16T19:47:44.790" v="1350" actId="1076"/>
+        <pc:sldMkLst>
+          <pc:docMk/>
+          <pc:sldMk cId="2635310036" sldId="259"/>
+        </pc:sldMkLst>
+        <pc:spChg chg="mod">
+          <ac:chgData name="Andrew Lindsley" userId="74a0f4885c134500" providerId="LiveId" clId="{139E8E0A-F4F5-4069-9B79-8584EA1D7BE1}" dt="2020-05-16T19:06:20.008" v="515" actId="20577"/>
+          <ac:spMkLst>
+            <pc:docMk/>
+            <pc:sldMk cId="2635310036" sldId="259"/>
+            <ac:spMk id="2" creationId="{BB1FC2B1-3AE2-4065-B6C9-E485ABC888C5}"/>
+          </ac:spMkLst>
+        </pc:spChg>
+        <pc:spChg chg="mod">
+          <ac:chgData name="Andrew Lindsley" userId="74a0f4885c134500" providerId="LiveId" clId="{139E8E0A-F4F5-4069-9B79-8584EA1D7BE1}" dt="2020-05-16T19:47:04.004" v="1343" actId="20577"/>
+          <ac:spMkLst>
+            <pc:docMk/>
+            <pc:sldMk cId="2635310036" sldId="259"/>
+            <ac:spMk id="3" creationId="{13E5A1DE-E6C3-4643-A967-C90D0DCC838A}"/>
+          </ac:spMkLst>
+        </pc:spChg>
+        <pc:picChg chg="add mod">
+          <ac:chgData name="Andrew Lindsley" userId="74a0f4885c134500" providerId="LiveId" clId="{139E8E0A-F4F5-4069-9B79-8584EA1D7BE1}" dt="2020-05-16T19:47:44.790" v="1350" actId="1076"/>
+          <ac:picMkLst>
+            <pc:docMk/>
+            <pc:sldMk cId="2635310036" sldId="259"/>
+            <ac:picMk id="5" creationId="{2D76EDEA-18E2-4A6C-8812-C12B1C4776B3}"/>
+          </ac:picMkLst>
+        </pc:picChg>
+      </pc:sldChg>
+      <pc:sldChg chg="addSp delSp modSp new mod">
+        <pc:chgData name="Andrew Lindsley" userId="74a0f4885c134500" providerId="LiveId" clId="{139E8E0A-F4F5-4069-9B79-8584EA1D7BE1}" dt="2020-05-16T19:12:57.554" v="558" actId="14100"/>
+        <pc:sldMkLst>
+          <pc:docMk/>
+          <pc:sldMk cId="1538555576" sldId="260"/>
+        </pc:sldMkLst>
+        <pc:spChg chg="mod">
+          <ac:chgData name="Andrew Lindsley" userId="74a0f4885c134500" providerId="LiveId" clId="{139E8E0A-F4F5-4069-9B79-8584EA1D7BE1}" dt="2020-05-16T19:07:21.451" v="534" actId="20577"/>
+          <ac:spMkLst>
+            <pc:docMk/>
+            <pc:sldMk cId="1538555576" sldId="260"/>
+            <ac:spMk id="2" creationId="{689EE6AA-90E3-440A-94DD-EA556DCE0AD8}"/>
+          </ac:spMkLst>
+        </pc:spChg>
+        <pc:spChg chg="del mod">
+          <ac:chgData name="Andrew Lindsley" userId="74a0f4885c134500" providerId="LiveId" clId="{139E8E0A-F4F5-4069-9B79-8584EA1D7BE1}" dt="2020-05-16T19:09:43.634" v="552" actId="931"/>
+          <ac:spMkLst>
+            <pc:docMk/>
+            <pc:sldMk cId="1538555576" sldId="260"/>
+            <ac:spMk id="3" creationId="{A8E41A43-E27F-4E5A-8D6E-465CFB9F95F3}"/>
+          </ac:spMkLst>
+        </pc:spChg>
+        <pc:picChg chg="add mod">
+          <ac:chgData name="Andrew Lindsley" userId="74a0f4885c134500" providerId="LiveId" clId="{139E8E0A-F4F5-4069-9B79-8584EA1D7BE1}" dt="2020-05-16T19:12:57.554" v="558" actId="14100"/>
+          <ac:picMkLst>
+            <pc:docMk/>
+            <pc:sldMk cId="1538555576" sldId="260"/>
+            <ac:picMk id="5" creationId="{A3BC2AE1-9DC7-485B-B125-3B865BE45C6F}"/>
+          </ac:picMkLst>
+        </pc:picChg>
+      </pc:sldChg>
+      <pc:sldChg chg="addSp delSp modSp new mod">
+        <pc:chgData name="Andrew Lindsley" userId="74a0f4885c134500" providerId="LiveId" clId="{139E8E0A-F4F5-4069-9B79-8584EA1D7BE1}" dt="2020-05-16T19:27:40.513" v="848" actId="20577"/>
+        <pc:sldMkLst>
+          <pc:docMk/>
+          <pc:sldMk cId="3166054258" sldId="261"/>
+        </pc:sldMkLst>
+        <pc:spChg chg="mod">
+          <ac:chgData name="Andrew Lindsley" userId="74a0f4885c134500" providerId="LiveId" clId="{139E8E0A-F4F5-4069-9B79-8584EA1D7BE1}" dt="2020-05-16T19:21:10.625" v="578" actId="20577"/>
+          <ac:spMkLst>
+            <pc:docMk/>
+            <pc:sldMk cId="3166054258" sldId="261"/>
+            <ac:spMk id="2" creationId="{8E3D5069-4E87-4125-83B8-E7C052D52E7E}"/>
+          </ac:spMkLst>
+        </pc:spChg>
+        <pc:spChg chg="add del mod">
+          <ac:chgData name="Andrew Lindsley" userId="74a0f4885c134500" providerId="LiveId" clId="{139E8E0A-F4F5-4069-9B79-8584EA1D7BE1}" dt="2020-05-16T19:27:40.513" v="848" actId="20577"/>
+          <ac:spMkLst>
+            <pc:docMk/>
+            <pc:sldMk cId="3166054258" sldId="261"/>
+            <ac:spMk id="3" creationId="{1180D718-9729-4D00-B35D-12023989FBDD}"/>
+          </ac:spMkLst>
+        </pc:spChg>
+        <pc:picChg chg="add del mod">
+          <ac:chgData name="Andrew Lindsley" userId="74a0f4885c134500" providerId="LiveId" clId="{139E8E0A-F4F5-4069-9B79-8584EA1D7BE1}" dt="2020-05-16T19:22:58.673" v="583" actId="931"/>
+          <ac:picMkLst>
+            <pc:docMk/>
+            <pc:sldMk cId="3166054258" sldId="261"/>
+            <ac:picMk id="5" creationId="{21F36539-5291-412D-9D56-CD1BE7D79A33}"/>
+          </ac:picMkLst>
+        </pc:picChg>
+        <pc:picChg chg="add mod">
+          <ac:chgData name="Andrew Lindsley" userId="74a0f4885c134500" providerId="LiveId" clId="{139E8E0A-F4F5-4069-9B79-8584EA1D7BE1}" dt="2020-05-16T19:24:46.370" v="648" actId="14100"/>
+          <ac:picMkLst>
+            <pc:docMk/>
+            <pc:sldMk cId="3166054258" sldId="261"/>
+            <ac:picMk id="7" creationId="{DCC66136-172D-429B-9863-AE5DB214BA42}"/>
+          </ac:picMkLst>
+        </pc:picChg>
+      </pc:sldChg>
+      <pc:sldChg chg="modSp new mod">
+        <pc:chgData name="Andrew Lindsley" userId="74a0f4885c134500" providerId="LiveId" clId="{139E8E0A-F4F5-4069-9B79-8584EA1D7BE1}" dt="2020-05-16T20:01:27.774" v="1571" actId="20577"/>
+        <pc:sldMkLst>
+          <pc:docMk/>
+          <pc:sldMk cId="1509338378" sldId="262"/>
+        </pc:sldMkLst>
+        <pc:spChg chg="mod">
+          <ac:chgData name="Andrew Lindsley" userId="74a0f4885c134500" providerId="LiveId" clId="{139E8E0A-F4F5-4069-9B79-8584EA1D7BE1}" dt="2020-05-16T19:29:42.631" v="862" actId="20577"/>
+          <ac:spMkLst>
+            <pc:docMk/>
+            <pc:sldMk cId="1509338378" sldId="262"/>
+            <ac:spMk id="2" creationId="{C3F72BEF-4739-46BB-8A7E-F39C654C673B}"/>
+          </ac:spMkLst>
+        </pc:spChg>
+        <pc:spChg chg="mod">
+          <ac:chgData name="Andrew Lindsley" userId="74a0f4885c134500" providerId="LiveId" clId="{139E8E0A-F4F5-4069-9B79-8584EA1D7BE1}" dt="2020-05-16T20:01:27.774" v="1571" actId="20577"/>
+          <ac:spMkLst>
+            <pc:docMk/>
+            <pc:sldMk cId="1509338378" sldId="262"/>
+            <ac:spMk id="3" creationId="{523FC326-DD52-41D5-8764-FA314CD8A0B8}"/>
+          </ac:spMkLst>
+        </pc:spChg>
+      </pc:sldChg>
+    </pc:docChg>
+  </pc:docChgLst>
+</pc:chgInfo>
 </file>
 
 <file path=ppt/slideLayouts/slideLayout1.xml><?xml version="1.0" encoding="utf-8"?>
@@ -160,7 +376,7 @@
           <a:noFill/>
           <a:extLst>
             <a:ext uri="{909E8E84-426E-40dd-AFC4-6F175D3DCCD1}">
-              <a14:hiddenFill xmlns:a14="http://schemas.microsoft.com/office/drawing/2010/main" xmlns="">
+              <a14:hiddenFill xmlns="" xmlns:a14="http://schemas.microsoft.com/office/drawing/2010/main">
                 <a:solidFill>
                   <a:srgbClr val="FFFFFF"/>
                 </a:solidFill>
@@ -220,7 +436,7 @@
             </a:ln>
             <a:extLst>
               <a:ext uri="{91240B29-F687-4f45-9708-019B960494DF}">
-                <a14:hiddenLine xmlns:a14="http://schemas.microsoft.com/office/drawing/2010/main" xmlns="" w="9525">
+                <a14:hiddenLine xmlns="" xmlns:a14="http://schemas.microsoft.com/office/drawing/2010/main" w="9525">
                   <a:solidFill>
                     <a:srgbClr val="000000"/>
                   </a:solidFill>
@@ -310,7 +526,7 @@
             </a:ln>
             <a:extLst>
               <a:ext uri="{91240B29-F687-4f45-9708-019B960494DF}">
-                <a14:hiddenLine xmlns:a14="http://schemas.microsoft.com/office/drawing/2010/main" xmlns="" w="9525">
+                <a14:hiddenLine xmlns="" xmlns:a14="http://schemas.microsoft.com/office/drawing/2010/main" w="9525">
                   <a:solidFill>
                     <a:srgbClr val="000000"/>
                   </a:solidFill>
@@ -400,7 +616,7 @@
             </a:ln>
             <a:extLst>
               <a:ext uri="{91240B29-F687-4f45-9708-019B960494DF}">
-                <a14:hiddenLine xmlns:a14="http://schemas.microsoft.com/office/drawing/2010/main" xmlns="" w="9525">
+                <a14:hiddenLine xmlns="" xmlns:a14="http://schemas.microsoft.com/office/drawing/2010/main" w="9525">
                   <a:solidFill>
                     <a:srgbClr val="000000"/>
                   </a:solidFill>
@@ -434,7 +650,7 @@
             </a:ln>
             <a:extLst>
               <a:ext uri="{91240B29-F687-4f45-9708-019B960494DF}">
-                <a14:hiddenLine xmlns:a14="http://schemas.microsoft.com/office/drawing/2010/main" xmlns="" w="9525">
+                <a14:hiddenLine xmlns="" xmlns:a14="http://schemas.microsoft.com/office/drawing/2010/main" w="9525">
                   <a:solidFill>
                     <a:srgbClr val="000000"/>
                   </a:solidFill>
@@ -524,7 +740,7 @@
             </a:ln>
             <a:extLst>
               <a:ext uri="{91240B29-F687-4f45-9708-019B960494DF}">
-                <a14:hiddenLine xmlns:a14="http://schemas.microsoft.com/office/drawing/2010/main" xmlns="" w="9525">
+                <a14:hiddenLine xmlns="" xmlns:a14="http://schemas.microsoft.com/office/drawing/2010/main" w="9525">
                   <a:solidFill>
                     <a:srgbClr val="000000"/>
                   </a:solidFill>
@@ -586,7 +802,7 @@
             </a:ln>
             <a:extLst>
               <a:ext uri="{91240B29-F687-4f45-9708-019B960494DF}">
-                <a14:hiddenLine xmlns:a14="http://schemas.microsoft.com/office/drawing/2010/main" xmlns="" w="9525">
+                <a14:hiddenLine xmlns="" xmlns:a14="http://schemas.microsoft.com/office/drawing/2010/main" w="9525">
                   <a:solidFill>
                     <a:srgbClr val="000000"/>
                   </a:solidFill>
@@ -648,7 +864,7 @@
             </a:ln>
             <a:extLst>
               <a:ext uri="{91240B29-F687-4f45-9708-019B960494DF}">
-                <a14:hiddenLine xmlns:a14="http://schemas.microsoft.com/office/drawing/2010/main" xmlns="" w="9525">
+                <a14:hiddenLine xmlns="" xmlns:a14="http://schemas.microsoft.com/office/drawing/2010/main" w="9525">
                   <a:solidFill>
                     <a:srgbClr val="000000"/>
                   </a:solidFill>
@@ -738,7 +954,7 @@
             </a:ln>
             <a:extLst>
               <a:ext uri="{91240B29-F687-4f45-9708-019B960494DF}">
-                <a14:hiddenLine xmlns:a14="http://schemas.microsoft.com/office/drawing/2010/main" xmlns="" w="9525">
+                <a14:hiddenLine xmlns="" xmlns:a14="http://schemas.microsoft.com/office/drawing/2010/main" w="9525">
                   <a:solidFill>
                     <a:srgbClr val="000000"/>
                   </a:solidFill>
@@ -800,7 +1016,7 @@
             </a:ln>
             <a:extLst>
               <a:ext uri="{91240B29-F687-4f45-9708-019B960494DF}">
-                <a14:hiddenLine xmlns:a14="http://schemas.microsoft.com/office/drawing/2010/main" xmlns="" w="9525">
+                <a14:hiddenLine xmlns="" xmlns:a14="http://schemas.microsoft.com/office/drawing/2010/main" w="9525">
                   <a:solidFill>
                     <a:srgbClr val="000000"/>
                   </a:solidFill>
@@ -862,7 +1078,7 @@
             </a:ln>
             <a:extLst>
               <a:ext uri="{91240B29-F687-4f45-9708-019B960494DF}">
-                <a14:hiddenLine xmlns:a14="http://schemas.microsoft.com/office/drawing/2010/main" xmlns="" w="9525">
+                <a14:hiddenLine xmlns="" xmlns:a14="http://schemas.microsoft.com/office/drawing/2010/main" w="9525">
                   <a:solidFill>
                     <a:srgbClr val="000000"/>
                   </a:solidFill>
@@ -952,7 +1168,7 @@
             </a:ln>
             <a:extLst>
               <a:ext uri="{91240B29-F687-4f45-9708-019B960494DF}">
-                <a14:hiddenLine xmlns:a14="http://schemas.microsoft.com/office/drawing/2010/main" xmlns="" w="9525">
+                <a14:hiddenLine xmlns="" xmlns:a14="http://schemas.microsoft.com/office/drawing/2010/main" w="9525">
                   <a:solidFill>
                     <a:srgbClr val="000000"/>
                   </a:solidFill>
@@ -1042,7 +1258,7 @@
             </a:ln>
             <a:extLst>
               <a:ext uri="{91240B29-F687-4f45-9708-019B960494DF}">
-                <a14:hiddenLine xmlns:a14="http://schemas.microsoft.com/office/drawing/2010/main" xmlns="" w="9525">
+                <a14:hiddenLine xmlns="" xmlns:a14="http://schemas.microsoft.com/office/drawing/2010/main" w="9525">
                   <a:solidFill>
                     <a:srgbClr val="000000"/>
                   </a:solidFill>
@@ -1104,7 +1320,7 @@
             </a:ln>
             <a:extLst>
               <a:ext uri="{91240B29-F687-4f45-9708-019B960494DF}">
-                <a14:hiddenLine xmlns:a14="http://schemas.microsoft.com/office/drawing/2010/main" xmlns="" w="9525">
+                <a14:hiddenLine xmlns="" xmlns:a14="http://schemas.microsoft.com/office/drawing/2010/main" w="9525">
                   <a:solidFill>
                     <a:srgbClr val="000000"/>
                   </a:solidFill>
@@ -1214,7 +1430,7 @@
             </a:ln>
             <a:extLst>
               <a:ext uri="{91240B29-F687-4f45-9708-019B960494DF}">
-                <a14:hiddenLine xmlns:a14="http://schemas.microsoft.com/office/drawing/2010/main" xmlns="" w="9525">
+                <a14:hiddenLine xmlns="" xmlns:a14="http://schemas.microsoft.com/office/drawing/2010/main" w="9525">
                   <a:solidFill>
                     <a:srgbClr val="000000"/>
                   </a:solidFill>
@@ -1276,7 +1492,7 @@
             </a:ln>
             <a:extLst>
               <a:ext uri="{91240B29-F687-4f45-9708-019B960494DF}">
-                <a14:hiddenLine xmlns:a14="http://schemas.microsoft.com/office/drawing/2010/main" xmlns="" w="9525">
+                <a14:hiddenLine xmlns="" xmlns:a14="http://schemas.microsoft.com/office/drawing/2010/main" w="9525">
                   <a:solidFill>
                     <a:srgbClr val="000000"/>
                   </a:solidFill>
@@ -1366,7 +1582,7 @@
             </a:ln>
             <a:extLst>
               <a:ext uri="{91240B29-F687-4f45-9708-019B960494DF}">
-                <a14:hiddenLine xmlns:a14="http://schemas.microsoft.com/office/drawing/2010/main" xmlns="" w="9525">
+                <a14:hiddenLine xmlns="" xmlns:a14="http://schemas.microsoft.com/office/drawing/2010/main" w="9525">
                   <a:solidFill>
                     <a:srgbClr val="000000"/>
                   </a:solidFill>
@@ -1456,7 +1672,7 @@
             </a:ln>
             <a:extLst>
               <a:ext uri="{91240B29-F687-4f45-9708-019B960494DF}">
-                <a14:hiddenLine xmlns:a14="http://schemas.microsoft.com/office/drawing/2010/main" xmlns="" w="9525">
+                <a14:hiddenLine xmlns="" xmlns:a14="http://schemas.microsoft.com/office/drawing/2010/main" w="9525">
                   <a:solidFill>
                     <a:srgbClr val="000000"/>
                   </a:solidFill>
@@ -1518,7 +1734,7 @@
             </a:ln>
             <a:extLst>
               <a:ext uri="{91240B29-F687-4f45-9708-019B960494DF}">
-                <a14:hiddenLine xmlns:a14="http://schemas.microsoft.com/office/drawing/2010/main" xmlns="" w="9525">
+                <a14:hiddenLine xmlns="" xmlns:a14="http://schemas.microsoft.com/office/drawing/2010/main" w="9525">
                   <a:solidFill>
                     <a:srgbClr val="000000"/>
                   </a:solidFill>
@@ -1608,7 +1824,7 @@
             </a:ln>
             <a:extLst>
               <a:ext uri="{91240B29-F687-4f45-9708-019B960494DF}">
-                <a14:hiddenLine xmlns:a14="http://schemas.microsoft.com/office/drawing/2010/main" xmlns="" w="9525">
+                <a14:hiddenLine xmlns="" xmlns:a14="http://schemas.microsoft.com/office/drawing/2010/main" w="9525">
                   <a:solidFill>
                     <a:srgbClr val="000000"/>
                   </a:solidFill>
@@ -1698,7 +1914,7 @@
             </a:ln>
             <a:extLst>
               <a:ext uri="{91240B29-F687-4f45-9708-019B960494DF}">
-                <a14:hiddenLine xmlns:a14="http://schemas.microsoft.com/office/drawing/2010/main" xmlns="" w="9525">
+                <a14:hiddenLine xmlns="" xmlns:a14="http://schemas.microsoft.com/office/drawing/2010/main" w="9525">
                   <a:solidFill>
                     <a:srgbClr val="000000"/>
                   </a:solidFill>
@@ -1754,7 +1970,7 @@
             </a:ln>
             <a:extLst>
               <a:ext uri="{91240B29-F687-4f45-9708-019B960494DF}">
-                <a14:hiddenLine xmlns:a14="http://schemas.microsoft.com/office/drawing/2010/main" xmlns="" w="9525">
+                <a14:hiddenLine xmlns="" xmlns:a14="http://schemas.microsoft.com/office/drawing/2010/main" w="9525">
                   <a:solidFill>
                     <a:srgbClr val="000000"/>
                   </a:solidFill>
@@ -1844,7 +2060,7 @@
             </a:ln>
             <a:extLst>
               <a:ext uri="{91240B29-F687-4f45-9708-019B960494DF}">
-                <a14:hiddenLine xmlns:a14="http://schemas.microsoft.com/office/drawing/2010/main" xmlns="" w="9525">
+                <a14:hiddenLine xmlns="" xmlns:a14="http://schemas.microsoft.com/office/drawing/2010/main" w="9525">
                   <a:solidFill>
                     <a:srgbClr val="000000"/>
                   </a:solidFill>
@@ -1900,7 +2116,7 @@
             </a:ln>
             <a:extLst>
               <a:ext uri="{91240B29-F687-4f45-9708-019B960494DF}">
-                <a14:hiddenLine xmlns:a14="http://schemas.microsoft.com/office/drawing/2010/main" xmlns="" w="9525">
+                <a14:hiddenLine xmlns="" xmlns:a14="http://schemas.microsoft.com/office/drawing/2010/main" w="9525">
                   <a:solidFill>
                     <a:srgbClr val="000000"/>
                   </a:solidFill>
@@ -1990,7 +2206,7 @@
             </a:ln>
             <a:extLst>
               <a:ext uri="{91240B29-F687-4f45-9708-019B960494DF}">
-                <a14:hiddenLine xmlns:a14="http://schemas.microsoft.com/office/drawing/2010/main" xmlns="" w="9525">
+                <a14:hiddenLine xmlns="" xmlns:a14="http://schemas.microsoft.com/office/drawing/2010/main" w="9525">
                   <a:solidFill>
                     <a:srgbClr val="000000"/>
                   </a:solidFill>
@@ -2058,7 +2274,7 @@
             </a:ln>
             <a:extLst>
               <a:ext uri="{91240B29-F687-4f45-9708-019B960494DF}">
-                <a14:hiddenLine xmlns:a14="http://schemas.microsoft.com/office/drawing/2010/main" xmlns="" w="9525">
+                <a14:hiddenLine xmlns="" xmlns:a14="http://schemas.microsoft.com/office/drawing/2010/main" w="9525">
                   <a:solidFill>
                     <a:srgbClr val="000000"/>
                   </a:solidFill>
@@ -2148,7 +2364,7 @@
             </a:ln>
             <a:extLst>
               <a:ext uri="{91240B29-F687-4f45-9708-019B960494DF}">
-                <a14:hiddenLine xmlns:a14="http://schemas.microsoft.com/office/drawing/2010/main" xmlns="" w="9525">
+                <a14:hiddenLine xmlns="" xmlns:a14="http://schemas.microsoft.com/office/drawing/2010/main" w="9525">
                   <a:solidFill>
                     <a:srgbClr val="000000"/>
                   </a:solidFill>
@@ -2216,7 +2432,7 @@
             </a:ln>
             <a:extLst>
               <a:ext uri="{91240B29-F687-4f45-9708-019B960494DF}">
-                <a14:hiddenLine xmlns:a14="http://schemas.microsoft.com/office/drawing/2010/main" xmlns="" w="9525">
+                <a14:hiddenLine xmlns="" xmlns:a14="http://schemas.microsoft.com/office/drawing/2010/main" w="9525">
                   <a:solidFill>
                     <a:srgbClr val="000000"/>
                   </a:solidFill>
@@ -2306,7 +2522,7 @@
             </a:ln>
             <a:extLst>
               <a:ext uri="{91240B29-F687-4f45-9708-019B960494DF}">
-                <a14:hiddenLine xmlns:a14="http://schemas.microsoft.com/office/drawing/2010/main" xmlns="" w="9525">
+                <a14:hiddenLine xmlns="" xmlns:a14="http://schemas.microsoft.com/office/drawing/2010/main" w="9525">
                   <a:solidFill>
                     <a:srgbClr val="000000"/>
                   </a:solidFill>
@@ -2340,7 +2556,7 @@
             </a:ln>
             <a:extLst>
               <a:ext uri="{91240B29-F687-4f45-9708-019B960494DF}">
-                <a14:hiddenLine xmlns:a14="http://schemas.microsoft.com/office/drawing/2010/main" xmlns="" w="9525">
+                <a14:hiddenLine xmlns="" xmlns:a14="http://schemas.microsoft.com/office/drawing/2010/main" w="9525">
                   <a:solidFill>
                     <a:srgbClr val="000000"/>
                   </a:solidFill>
@@ -2430,7 +2646,7 @@
             </a:ln>
             <a:extLst>
               <a:ext uri="{91240B29-F687-4f45-9708-019B960494DF}">
-                <a14:hiddenLine xmlns:a14="http://schemas.microsoft.com/office/drawing/2010/main" xmlns="" w="9525">
+                <a14:hiddenLine xmlns="" xmlns:a14="http://schemas.microsoft.com/office/drawing/2010/main" w="9525">
                   <a:solidFill>
                     <a:srgbClr val="000000"/>
                   </a:solidFill>
@@ -2492,7 +2708,7 @@
             </a:ln>
             <a:extLst>
               <a:ext uri="{91240B29-F687-4f45-9708-019B960494DF}">
-                <a14:hiddenLine xmlns:a14="http://schemas.microsoft.com/office/drawing/2010/main" xmlns="" w="9525">
+                <a14:hiddenLine xmlns="" xmlns:a14="http://schemas.microsoft.com/office/drawing/2010/main" w="9525">
                   <a:solidFill>
                     <a:srgbClr val="000000"/>
                   </a:solidFill>
@@ -2554,7 +2770,7 @@
             </a:ln>
             <a:extLst>
               <a:ext uri="{91240B29-F687-4f45-9708-019B960494DF}">
-                <a14:hiddenLine xmlns:a14="http://schemas.microsoft.com/office/drawing/2010/main" xmlns="" w="9525">
+                <a14:hiddenLine xmlns="" xmlns:a14="http://schemas.microsoft.com/office/drawing/2010/main" w="9525">
                   <a:solidFill>
                     <a:srgbClr val="000000"/>
                   </a:solidFill>
@@ -2644,7 +2860,7 @@
             </a:ln>
             <a:extLst>
               <a:ext uri="{91240B29-F687-4f45-9708-019B960494DF}">
-                <a14:hiddenLine xmlns:a14="http://schemas.microsoft.com/office/drawing/2010/main" xmlns="" w="9525">
+                <a14:hiddenLine xmlns="" xmlns:a14="http://schemas.microsoft.com/office/drawing/2010/main" w="9525">
                   <a:solidFill>
                     <a:srgbClr val="000000"/>
                   </a:solidFill>
@@ -2712,7 +2928,7 @@
             </a:ln>
             <a:extLst>
               <a:ext uri="{91240B29-F687-4f45-9708-019B960494DF}">
-                <a14:hiddenLine xmlns:a14="http://schemas.microsoft.com/office/drawing/2010/main" xmlns="" w="9525">
+                <a14:hiddenLine xmlns="" xmlns:a14="http://schemas.microsoft.com/office/drawing/2010/main" w="9525">
                   <a:solidFill>
                     <a:srgbClr val="000000"/>
                   </a:solidFill>
@@ -2774,7 +2990,7 @@
             </a:ln>
             <a:extLst>
               <a:ext uri="{91240B29-F687-4f45-9708-019B960494DF}">
-                <a14:hiddenLine xmlns:a14="http://schemas.microsoft.com/office/drawing/2010/main" xmlns="" w="9525">
+                <a14:hiddenLine xmlns="" xmlns:a14="http://schemas.microsoft.com/office/drawing/2010/main" w="9525">
                   <a:solidFill>
                     <a:srgbClr val="000000"/>
                   </a:solidFill>
@@ -2864,7 +3080,7 @@
             </a:ln>
             <a:extLst>
               <a:ext uri="{91240B29-F687-4f45-9708-019B960494DF}">
-                <a14:hiddenLine xmlns:a14="http://schemas.microsoft.com/office/drawing/2010/main" xmlns="" w="9525">
+                <a14:hiddenLine xmlns="" xmlns:a14="http://schemas.microsoft.com/office/drawing/2010/main" w="9525">
                   <a:solidFill>
                     <a:srgbClr val="000000"/>
                   </a:solidFill>
@@ -2926,7 +3142,7 @@
             </a:ln>
             <a:extLst>
               <a:ext uri="{91240B29-F687-4f45-9708-019B960494DF}">
-                <a14:hiddenLine xmlns:a14="http://schemas.microsoft.com/office/drawing/2010/main" xmlns="" w="9525">
+                <a14:hiddenLine xmlns="" xmlns:a14="http://schemas.microsoft.com/office/drawing/2010/main" w="9525">
                   <a:solidFill>
                     <a:srgbClr val="000000"/>
                   </a:solidFill>
@@ -3016,7 +3232,7 @@
             </a:ln>
             <a:extLst>
               <a:ext uri="{91240B29-F687-4f45-9708-019B960494DF}">
-                <a14:hiddenLine xmlns:a14="http://schemas.microsoft.com/office/drawing/2010/main" xmlns="" w="9525">
+                <a14:hiddenLine xmlns="" xmlns:a14="http://schemas.microsoft.com/office/drawing/2010/main" w="9525">
                   <a:solidFill>
                     <a:srgbClr val="000000"/>
                   </a:solidFill>
@@ -3078,7 +3294,7 @@
             </a:ln>
             <a:extLst>
               <a:ext uri="{91240B29-F687-4f45-9708-019B960494DF}">
-                <a14:hiddenLine xmlns:a14="http://schemas.microsoft.com/office/drawing/2010/main" xmlns="" w="9525">
+                <a14:hiddenLine xmlns="" xmlns:a14="http://schemas.microsoft.com/office/drawing/2010/main" w="9525">
                   <a:solidFill>
                     <a:srgbClr val="000000"/>
                   </a:solidFill>
@@ -3168,7 +3384,7 @@
             </a:ln>
             <a:extLst>
               <a:ext uri="{91240B29-F687-4f45-9708-019B960494DF}">
-                <a14:hiddenLine xmlns:a14="http://schemas.microsoft.com/office/drawing/2010/main" xmlns="" w="9525">
+                <a14:hiddenLine xmlns="" xmlns:a14="http://schemas.microsoft.com/office/drawing/2010/main" w="9525">
                   <a:solidFill>
                     <a:srgbClr val="000000"/>
                   </a:solidFill>
@@ -3202,7 +3418,7 @@
             </a:ln>
             <a:extLst>
               <a:ext uri="{91240B29-F687-4f45-9708-019B960494DF}">
-                <a14:hiddenLine xmlns:a14="http://schemas.microsoft.com/office/drawing/2010/main" xmlns="" w="9525">
+                <a14:hiddenLine xmlns="" xmlns:a14="http://schemas.microsoft.com/office/drawing/2010/main" w="9525">
                   <a:solidFill>
                     <a:srgbClr val="000000"/>
                   </a:solidFill>
@@ -3267,7 +3483,7 @@
             </a:ln>
             <a:extLst>
               <a:ext uri="{91240B29-F687-4f45-9708-019B960494DF}">
-                <a14:hiddenLine xmlns:a14="http://schemas.microsoft.com/office/drawing/2010/main" xmlns="" w="9525">
+                <a14:hiddenLine xmlns="" xmlns:a14="http://schemas.microsoft.com/office/drawing/2010/main" w="9525">
                   <a:solidFill>
                     <a:srgbClr val="000000"/>
                   </a:solidFill>
@@ -3357,7 +3573,7 @@
             </a:ln>
             <a:extLst>
               <a:ext uri="{91240B29-F687-4f45-9708-019B960494DF}">
-                <a14:hiddenLine xmlns:a14="http://schemas.microsoft.com/office/drawing/2010/main" xmlns="" w="9525">
+                <a14:hiddenLine xmlns="" xmlns:a14="http://schemas.microsoft.com/office/drawing/2010/main" w="9525">
                   <a:solidFill>
                     <a:srgbClr val="000000"/>
                   </a:solidFill>
@@ -3419,7 +3635,7 @@
             </a:ln>
             <a:extLst>
               <a:ext uri="{91240B29-F687-4f45-9708-019B960494DF}">
-                <a14:hiddenLine xmlns:a14="http://schemas.microsoft.com/office/drawing/2010/main" xmlns="" w="9525">
+                <a14:hiddenLine xmlns="" xmlns:a14="http://schemas.microsoft.com/office/drawing/2010/main" w="9525">
                   <a:solidFill>
                     <a:srgbClr val="000000"/>
                   </a:solidFill>
@@ -3509,7 +3725,7 @@
             </a:ln>
             <a:extLst>
               <a:ext uri="{91240B29-F687-4f45-9708-019B960494DF}">
-                <a14:hiddenLine xmlns:a14="http://schemas.microsoft.com/office/drawing/2010/main" xmlns="" w="9525">
+                <a14:hiddenLine xmlns="" xmlns:a14="http://schemas.microsoft.com/office/drawing/2010/main" w="9525">
                   <a:solidFill>
                     <a:srgbClr val="000000"/>
                   </a:solidFill>
@@ -3599,7 +3815,7 @@
             </a:ln>
             <a:extLst>
               <a:ext uri="{91240B29-F687-4f45-9708-019B960494DF}">
-                <a14:hiddenLine xmlns:a14="http://schemas.microsoft.com/office/drawing/2010/main" xmlns="" w="9525">
+                <a14:hiddenLine xmlns="" xmlns:a14="http://schemas.microsoft.com/office/drawing/2010/main" w="9525">
                   <a:solidFill>
                     <a:srgbClr val="000000"/>
                   </a:solidFill>
@@ -3664,7 +3880,7 @@
             </a:ln>
             <a:extLst>
               <a:ext uri="{91240B29-F687-4f45-9708-019B960494DF}">
-                <a14:hiddenLine xmlns:a14="http://schemas.microsoft.com/office/drawing/2010/main" xmlns="" w="9525">
+                <a14:hiddenLine xmlns="" xmlns:a14="http://schemas.microsoft.com/office/drawing/2010/main" w="9525">
                   <a:solidFill>
                     <a:srgbClr val="000000"/>
                   </a:solidFill>
@@ -3726,7 +3942,7 @@
             </a:ln>
             <a:extLst>
               <a:ext uri="{91240B29-F687-4f45-9708-019B960494DF}">
-                <a14:hiddenLine xmlns:a14="http://schemas.microsoft.com/office/drawing/2010/main" xmlns="" w="9525">
+                <a14:hiddenLine xmlns="" xmlns:a14="http://schemas.microsoft.com/office/drawing/2010/main" w="9525">
                   <a:solidFill>
                     <a:srgbClr val="000000"/>
                   </a:solidFill>
@@ -3816,7 +4032,7 @@
             </a:ln>
             <a:extLst>
               <a:ext uri="{91240B29-F687-4f45-9708-019B960494DF}">
-                <a14:hiddenLine xmlns:a14="http://schemas.microsoft.com/office/drawing/2010/main" xmlns="" w="9525">
+                <a14:hiddenLine xmlns="" xmlns:a14="http://schemas.microsoft.com/office/drawing/2010/main" w="9525">
                   <a:solidFill>
                     <a:srgbClr val="000000"/>
                   </a:solidFill>
@@ -3906,7 +4122,7 @@
             </a:ln>
             <a:extLst>
               <a:ext uri="{91240B29-F687-4f45-9708-019B960494DF}">
-                <a14:hiddenLine xmlns:a14="http://schemas.microsoft.com/office/drawing/2010/main" xmlns="" w="9525">
+                <a14:hiddenLine xmlns="" xmlns:a14="http://schemas.microsoft.com/office/drawing/2010/main" w="9525">
                   <a:solidFill>
                     <a:srgbClr val="000000"/>
                   </a:solidFill>
@@ -3968,7 +4184,7 @@
             </a:ln>
             <a:extLst>
               <a:ext uri="{91240B29-F687-4f45-9708-019B960494DF}">
-                <a14:hiddenLine xmlns:a14="http://schemas.microsoft.com/office/drawing/2010/main" xmlns="" w="9525">
+                <a14:hiddenLine xmlns="" xmlns:a14="http://schemas.microsoft.com/office/drawing/2010/main" w="9525">
                   <a:solidFill>
                     <a:srgbClr val="000000"/>
                   </a:solidFill>
@@ -4088,7 +4304,7 @@
             </a:ln>
             <a:extLst>
               <a:ext uri="{91240B29-F687-4f45-9708-019B960494DF}">
-                <a14:hiddenLine xmlns:a14="http://schemas.microsoft.com/office/drawing/2010/main" xmlns="" w="9525">
+                <a14:hiddenLine xmlns="" xmlns:a14="http://schemas.microsoft.com/office/drawing/2010/main" w="9525">
                   <a:solidFill>
                     <a:srgbClr val="000000"/>
                   </a:solidFill>
@@ -4156,7 +4372,7 @@
             </a:ln>
             <a:extLst>
               <a:ext uri="{91240B29-F687-4f45-9708-019B960494DF}">
-                <a14:hiddenLine xmlns:a14="http://schemas.microsoft.com/office/drawing/2010/main" xmlns="" w="9525">
+                <a14:hiddenLine xmlns="" xmlns:a14="http://schemas.microsoft.com/office/drawing/2010/main" w="9525">
                   <a:solidFill>
                     <a:srgbClr val="000000"/>
                   </a:solidFill>
@@ -4246,7 +4462,7 @@
             </a:ln>
             <a:extLst>
               <a:ext uri="{91240B29-F687-4f45-9708-019B960494DF}">
-                <a14:hiddenLine xmlns:a14="http://schemas.microsoft.com/office/drawing/2010/main" xmlns="" w="9525">
+                <a14:hiddenLine xmlns="" xmlns:a14="http://schemas.microsoft.com/office/drawing/2010/main" w="9525">
                   <a:solidFill>
                     <a:srgbClr val="000000"/>
                   </a:solidFill>
@@ -4386,7 +4602,7 @@
           <a:p>
             <a:fld id="{48A87A34-81AB-432B-8DAE-1953F412C126}" type="datetimeFigureOut">
               <a:rPr lang="en-US" dirty="0"/>
-              <a:t>5/12/2020</a:t>
+              <a:t>5/16/2020</a:t>
             </a:fld>
             <a:endParaRPr lang="en-US" dirty="0"/>
           </a:p>
@@ -4648,7 +4864,7 @@
           <a:p>
             <a:fld id="{48A87A34-81AB-432B-8DAE-1953F412C126}" type="datetimeFigureOut">
               <a:rPr lang="en-US" dirty="0"/>
-              <a:t>5/12/2020</a:t>
+              <a:t>5/16/2020</a:t>
             </a:fld>
             <a:endParaRPr lang="en-US" dirty="0"/>
           </a:p>
@@ -4839,7 +5055,7 @@
           <a:p>
             <a:fld id="{48A87A34-81AB-432B-8DAE-1953F412C126}" type="datetimeFigureOut">
               <a:rPr lang="en-US" dirty="0"/>
-              <a:t>5/12/2020</a:t>
+              <a:t>5/16/2020</a:t>
             </a:fld>
             <a:endParaRPr lang="en-US" dirty="0"/>
           </a:p>
@@ -5097,7 +5313,7 @@
           <a:p>
             <a:fld id="{48A87A34-81AB-432B-8DAE-1953F412C126}" type="datetimeFigureOut">
               <a:rPr lang="en-US" dirty="0"/>
-              <a:t>5/12/2020</a:t>
+              <a:t>5/16/2020</a:t>
             </a:fld>
             <a:endParaRPr lang="en-US" dirty="0"/>
           </a:p>
@@ -5526,7 +5742,7 @@
           <a:p>
             <a:fld id="{48A87A34-81AB-432B-8DAE-1953F412C126}" type="datetimeFigureOut">
               <a:rPr lang="en-US" dirty="0"/>
-              <a:t>5/12/2020</a:t>
+              <a:t>5/16/2020</a:t>
             </a:fld>
             <a:endParaRPr lang="en-US" dirty="0"/>
           </a:p>
@@ -6067,7 +6283,7 @@
           <a:p>
             <a:fld id="{48A87A34-81AB-432B-8DAE-1953F412C126}" type="datetimeFigureOut">
               <a:rPr lang="en-US" dirty="0"/>
-              <a:t>5/12/2020</a:t>
+              <a:t>5/16/2020</a:t>
             </a:fld>
             <a:endParaRPr lang="en-US" dirty="0"/>
           </a:p>
@@ -6782,7 +6998,7 @@
           <a:p>
             <a:fld id="{48A87A34-81AB-432B-8DAE-1953F412C126}" type="datetimeFigureOut">
               <a:rPr lang="en-US" dirty="0"/>
-              <a:t>5/12/2020</a:t>
+              <a:t>5/16/2020</a:t>
             </a:fld>
             <a:endParaRPr lang="en-US" dirty="0"/>
           </a:p>
@@ -6947,7 +7163,7 @@
           <a:p>
             <a:fld id="{48A87A34-81AB-432B-8DAE-1953F412C126}" type="datetimeFigureOut">
               <a:rPr lang="en-US" dirty="0"/>
-              <a:t>5/12/2020</a:t>
+              <a:t>5/16/2020</a:t>
             </a:fld>
             <a:endParaRPr lang="en-US" dirty="0"/>
           </a:p>
@@ -7122,7 +7338,7 @@
           <a:p>
             <a:fld id="{48A87A34-81AB-432B-8DAE-1953F412C126}" type="datetimeFigureOut">
               <a:rPr lang="en-US" dirty="0"/>
-              <a:t>5/12/2020</a:t>
+              <a:t>5/16/2020</a:t>
             </a:fld>
             <a:endParaRPr lang="en-US" dirty="0"/>
           </a:p>
@@ -7287,7 +7503,7 @@
           <a:p>
             <a:fld id="{48A87A34-81AB-432B-8DAE-1953F412C126}" type="datetimeFigureOut">
               <a:rPr lang="en-US" dirty="0"/>
-              <a:t>5/12/2020</a:t>
+              <a:t>5/16/2020</a:t>
             </a:fld>
             <a:endParaRPr lang="en-US" dirty="0"/>
           </a:p>
@@ -7532,7 +7748,7 @@
           <a:p>
             <a:fld id="{48A87A34-81AB-432B-8DAE-1953F412C126}" type="datetimeFigureOut">
               <a:rPr lang="en-US" dirty="0"/>
-              <a:t>5/12/2020</a:t>
+              <a:t>5/16/2020</a:t>
             </a:fld>
             <a:endParaRPr lang="en-US" dirty="0"/>
           </a:p>
@@ -7759,7 +7975,7 @@
           <a:p>
             <a:fld id="{48A87A34-81AB-432B-8DAE-1953F412C126}" type="datetimeFigureOut">
               <a:rPr lang="en-US" dirty="0"/>
-              <a:t>5/12/2020</a:t>
+              <a:t>5/16/2020</a:t>
             </a:fld>
             <a:endParaRPr lang="en-US" dirty="0"/>
           </a:p>
@@ -8135,7 +8351,7 @@
           <a:p>
             <a:fld id="{48A87A34-81AB-432B-8DAE-1953F412C126}" type="datetimeFigureOut">
               <a:rPr lang="en-US" dirty="0"/>
-              <a:t>5/12/2020</a:t>
+              <a:t>5/16/2020</a:t>
             </a:fld>
             <a:endParaRPr lang="en-US" dirty="0"/>
           </a:p>
@@ -8248,7 +8464,7 @@
           <a:p>
             <a:fld id="{48A87A34-81AB-432B-8DAE-1953F412C126}" type="datetimeFigureOut">
               <a:rPr lang="en-US" dirty="0"/>
-              <a:t>5/12/2020</a:t>
+              <a:t>5/16/2020</a:t>
             </a:fld>
             <a:endParaRPr lang="en-US" dirty="0"/>
           </a:p>
@@ -8338,7 +8554,7 @@
           <a:p>
             <a:fld id="{48A87A34-81AB-432B-8DAE-1953F412C126}" type="datetimeFigureOut">
               <a:rPr lang="en-US" dirty="0"/>
-              <a:t>5/12/2020</a:t>
+              <a:t>5/16/2020</a:t>
             </a:fld>
             <a:endParaRPr lang="en-US" dirty="0"/>
           </a:p>
@@ -8582,7 +8798,7 @@
           <a:p>
             <a:fld id="{48A87A34-81AB-432B-8DAE-1953F412C126}" type="datetimeFigureOut">
               <a:rPr lang="en-US" dirty="0"/>
-              <a:t>5/12/2020</a:t>
+              <a:t>5/16/2020</a:t>
             </a:fld>
             <a:endParaRPr lang="en-US" dirty="0"/>
           </a:p>
@@ -8857,7 +9073,7 @@
           <a:p>
             <a:fld id="{48A87A34-81AB-432B-8DAE-1953F412C126}" type="datetimeFigureOut">
               <a:rPr lang="en-US" dirty="0"/>
-              <a:t>5/12/2020</a:t>
+              <a:t>5/16/2020</a:t>
             </a:fld>
             <a:endParaRPr lang="en-US" dirty="0"/>
           </a:p>
@@ -8968,7 +9184,7 @@
           <a:noFill/>
           <a:extLst>
             <a:ext uri="{909E8E84-426E-40dd-AFC4-6F175D3DCCD1}">
-              <a14:hiddenFill xmlns:a14="http://schemas.microsoft.com/office/drawing/2010/main" xmlns="">
+              <a14:hiddenFill xmlns="" xmlns:a14="http://schemas.microsoft.com/office/drawing/2010/main">
                 <a:solidFill>
                   <a:srgbClr val="FFFFFF"/>
                 </a:solidFill>
@@ -9042,7 +9258,7 @@
               </a:ln>
               <a:extLst>
                 <a:ext uri="{91240B29-F687-4f45-9708-019B960494DF}">
-                  <a14:hiddenLine xmlns:a14="http://schemas.microsoft.com/office/drawing/2010/main" xmlns="" w="9525">
+                  <a14:hiddenLine xmlns="" xmlns:a14="http://schemas.microsoft.com/office/drawing/2010/main" w="9525">
                     <a:solidFill>
                       <a:srgbClr val="000000"/>
                     </a:solidFill>
@@ -9132,7 +9348,7 @@
               </a:ln>
               <a:extLst>
                 <a:ext uri="{91240B29-F687-4f45-9708-019B960494DF}">
-                  <a14:hiddenLine xmlns:a14="http://schemas.microsoft.com/office/drawing/2010/main" xmlns="" w="9525">
+                  <a14:hiddenLine xmlns="" xmlns:a14="http://schemas.microsoft.com/office/drawing/2010/main" w="9525">
                     <a:solidFill>
                       <a:srgbClr val="000000"/>
                     </a:solidFill>
@@ -9222,7 +9438,7 @@
               </a:ln>
               <a:extLst>
                 <a:ext uri="{91240B29-F687-4f45-9708-019B960494DF}">
-                  <a14:hiddenLine xmlns:a14="http://schemas.microsoft.com/office/drawing/2010/main" xmlns="" w="9525">
+                  <a14:hiddenLine xmlns="" xmlns:a14="http://schemas.microsoft.com/office/drawing/2010/main" w="9525">
                     <a:solidFill>
                       <a:srgbClr val="000000"/>
                     </a:solidFill>
@@ -9284,7 +9500,7 @@
               </a:ln>
               <a:extLst>
                 <a:ext uri="{91240B29-F687-4f45-9708-019B960494DF}">
-                  <a14:hiddenLine xmlns:a14="http://schemas.microsoft.com/office/drawing/2010/main" xmlns="" w="9525">
+                  <a14:hiddenLine xmlns="" xmlns:a14="http://schemas.microsoft.com/office/drawing/2010/main" w="9525">
                     <a:solidFill>
                       <a:srgbClr val="000000"/>
                     </a:solidFill>
@@ -9374,7 +9590,7 @@
               </a:ln>
               <a:extLst>
                 <a:ext uri="{91240B29-F687-4f45-9708-019B960494DF}">
-                  <a14:hiddenLine xmlns:a14="http://schemas.microsoft.com/office/drawing/2010/main" xmlns="" w="9525">
+                  <a14:hiddenLine xmlns="" xmlns:a14="http://schemas.microsoft.com/office/drawing/2010/main" w="9525">
                     <a:solidFill>
                       <a:srgbClr val="000000"/>
                     </a:solidFill>
@@ -9436,7 +9652,7 @@
               </a:ln>
               <a:extLst>
                 <a:ext uri="{91240B29-F687-4f45-9708-019B960494DF}">
-                  <a14:hiddenLine xmlns:a14="http://schemas.microsoft.com/office/drawing/2010/main" xmlns="" w="9525">
+                  <a14:hiddenLine xmlns="" xmlns:a14="http://schemas.microsoft.com/office/drawing/2010/main" w="9525">
                     <a:solidFill>
                       <a:srgbClr val="000000"/>
                     </a:solidFill>
@@ -9498,7 +9714,7 @@
               </a:ln>
               <a:extLst>
                 <a:ext uri="{91240B29-F687-4f45-9708-019B960494DF}">
-                  <a14:hiddenLine xmlns:a14="http://schemas.microsoft.com/office/drawing/2010/main" xmlns="" w="9525">
+                  <a14:hiddenLine xmlns="" xmlns:a14="http://schemas.microsoft.com/office/drawing/2010/main" w="9525">
                     <a:solidFill>
                       <a:srgbClr val="000000"/>
                     </a:solidFill>
@@ -9588,7 +9804,7 @@
               </a:ln>
               <a:extLst>
                 <a:ext uri="{91240B29-F687-4f45-9708-019B960494DF}">
-                  <a14:hiddenLine xmlns:a14="http://schemas.microsoft.com/office/drawing/2010/main" xmlns="" w="9525">
+                  <a14:hiddenLine xmlns="" xmlns:a14="http://schemas.microsoft.com/office/drawing/2010/main" w="9525">
                     <a:solidFill>
                       <a:srgbClr val="000000"/>
                     </a:solidFill>
@@ -9678,7 +9894,7 @@
               </a:ln>
               <a:extLst>
                 <a:ext uri="{91240B29-F687-4f45-9708-019B960494DF}">
-                  <a14:hiddenLine xmlns:a14="http://schemas.microsoft.com/office/drawing/2010/main" xmlns="" w="9525">
+                  <a14:hiddenLine xmlns="" xmlns:a14="http://schemas.microsoft.com/office/drawing/2010/main" w="9525">
                     <a:solidFill>
                       <a:srgbClr val="000000"/>
                     </a:solidFill>
@@ -9740,7 +9956,7 @@
               </a:ln>
               <a:extLst>
                 <a:ext uri="{91240B29-F687-4f45-9708-019B960494DF}">
-                  <a14:hiddenLine xmlns:a14="http://schemas.microsoft.com/office/drawing/2010/main" xmlns="" w="9525">
+                  <a14:hiddenLine xmlns="" xmlns:a14="http://schemas.microsoft.com/office/drawing/2010/main" w="9525">
                     <a:solidFill>
                       <a:srgbClr val="000000"/>
                     </a:solidFill>
@@ -9850,7 +10066,7 @@
               </a:ln>
               <a:extLst>
                 <a:ext uri="{91240B29-F687-4f45-9708-019B960494DF}">
-                  <a14:hiddenLine xmlns:a14="http://schemas.microsoft.com/office/drawing/2010/main" xmlns="" w="9525">
+                  <a14:hiddenLine xmlns="" xmlns:a14="http://schemas.microsoft.com/office/drawing/2010/main" w="9525">
                     <a:solidFill>
                       <a:srgbClr val="000000"/>
                     </a:solidFill>
@@ -9934,7 +10150,7 @@
               </a:ln>
               <a:extLst>
                 <a:ext uri="{91240B29-F687-4f45-9708-019B960494DF}">
-                  <a14:hiddenLine xmlns:a14="http://schemas.microsoft.com/office/drawing/2010/main" xmlns="" w="9525">
+                  <a14:hiddenLine xmlns="" xmlns:a14="http://schemas.microsoft.com/office/drawing/2010/main" w="9525">
                     <a:solidFill>
                       <a:srgbClr val="000000"/>
                     </a:solidFill>
@@ -9996,7 +10212,7 @@
               </a:ln>
               <a:extLst>
                 <a:ext uri="{91240B29-F687-4f45-9708-019B960494DF}">
-                  <a14:hiddenLine xmlns:a14="http://schemas.microsoft.com/office/drawing/2010/main" xmlns="" w="9525">
+                  <a14:hiddenLine xmlns="" xmlns:a14="http://schemas.microsoft.com/office/drawing/2010/main" w="9525">
                     <a:solidFill>
                       <a:srgbClr val="000000"/>
                     </a:solidFill>
@@ -10058,7 +10274,7 @@
               </a:ln>
               <a:extLst>
                 <a:ext uri="{91240B29-F687-4f45-9708-019B960494DF}">
-                  <a14:hiddenLine xmlns:a14="http://schemas.microsoft.com/office/drawing/2010/main" xmlns="" w="9525">
+                  <a14:hiddenLine xmlns="" xmlns:a14="http://schemas.microsoft.com/office/drawing/2010/main" w="9525">
                     <a:solidFill>
                       <a:srgbClr val="000000"/>
                     </a:solidFill>
@@ -10148,7 +10364,7 @@
               </a:ln>
               <a:extLst>
                 <a:ext uri="{91240B29-F687-4f45-9708-019B960494DF}">
-                  <a14:hiddenLine xmlns:a14="http://schemas.microsoft.com/office/drawing/2010/main" xmlns="" w="9525">
+                  <a14:hiddenLine xmlns="" xmlns:a14="http://schemas.microsoft.com/office/drawing/2010/main" w="9525">
                     <a:solidFill>
                       <a:srgbClr val="000000"/>
                     </a:solidFill>
@@ -10182,7 +10398,7 @@
               </a:ln>
               <a:extLst>
                 <a:ext uri="{91240B29-F687-4f45-9708-019B960494DF}">
-                  <a14:hiddenLine xmlns:a14="http://schemas.microsoft.com/office/drawing/2010/main" xmlns="" w="9525">
+                  <a14:hiddenLine xmlns="" xmlns:a14="http://schemas.microsoft.com/office/drawing/2010/main" w="9525">
                     <a:solidFill>
                       <a:srgbClr val="000000"/>
                     </a:solidFill>
@@ -10247,7 +10463,7 @@
               </a:ln>
               <a:extLst>
                 <a:ext uri="{91240B29-F687-4f45-9708-019B960494DF}">
-                  <a14:hiddenLine xmlns:a14="http://schemas.microsoft.com/office/drawing/2010/main" xmlns="" w="9525">
+                  <a14:hiddenLine xmlns="" xmlns:a14="http://schemas.microsoft.com/office/drawing/2010/main" w="9525">
                     <a:solidFill>
                       <a:srgbClr val="000000"/>
                     </a:solidFill>
@@ -10337,7 +10553,7 @@
               </a:ln>
               <a:extLst>
                 <a:ext uri="{91240B29-F687-4f45-9708-019B960494DF}">
-                  <a14:hiddenLine xmlns:a14="http://schemas.microsoft.com/office/drawing/2010/main" xmlns="" w="9525">
+                  <a14:hiddenLine xmlns="" xmlns:a14="http://schemas.microsoft.com/office/drawing/2010/main" w="9525">
                     <a:solidFill>
                       <a:srgbClr val="000000"/>
                     </a:solidFill>
@@ -10399,7 +10615,7 @@
               </a:ln>
               <a:extLst>
                 <a:ext uri="{91240B29-F687-4f45-9708-019B960494DF}">
-                  <a14:hiddenLine xmlns:a14="http://schemas.microsoft.com/office/drawing/2010/main" xmlns="" w="9525">
+                  <a14:hiddenLine xmlns="" xmlns:a14="http://schemas.microsoft.com/office/drawing/2010/main" w="9525">
                     <a:solidFill>
                       <a:srgbClr val="000000"/>
                     </a:solidFill>
@@ -10489,7 +10705,7 @@
               </a:ln>
               <a:extLst>
                 <a:ext uri="{91240B29-F687-4f45-9708-019B960494DF}">
-                  <a14:hiddenLine xmlns:a14="http://schemas.microsoft.com/office/drawing/2010/main" xmlns="" w="9525">
+                  <a14:hiddenLine xmlns="" xmlns:a14="http://schemas.microsoft.com/office/drawing/2010/main" w="9525">
                     <a:solidFill>
                       <a:srgbClr val="000000"/>
                     </a:solidFill>
@@ -10554,7 +10770,7 @@
               </a:ln>
               <a:extLst>
                 <a:ext uri="{91240B29-F687-4f45-9708-019B960494DF}">
-                  <a14:hiddenLine xmlns:a14="http://schemas.microsoft.com/office/drawing/2010/main" xmlns="" w="9525">
+                  <a14:hiddenLine xmlns="" xmlns:a14="http://schemas.microsoft.com/office/drawing/2010/main" w="9525">
                     <a:solidFill>
                       <a:srgbClr val="000000"/>
                     </a:solidFill>
@@ -10616,7 +10832,7 @@
               </a:ln>
               <a:extLst>
                 <a:ext uri="{91240B29-F687-4f45-9708-019B960494DF}">
-                  <a14:hiddenLine xmlns:a14="http://schemas.microsoft.com/office/drawing/2010/main" xmlns="" w="9525">
+                  <a14:hiddenLine xmlns="" xmlns:a14="http://schemas.microsoft.com/office/drawing/2010/main" w="9525">
                     <a:solidFill>
                       <a:srgbClr val="000000"/>
                     </a:solidFill>
@@ -10706,7 +10922,7 @@
               </a:ln>
               <a:extLst>
                 <a:ext uri="{91240B29-F687-4f45-9708-019B960494DF}">
-                  <a14:hiddenLine xmlns:a14="http://schemas.microsoft.com/office/drawing/2010/main" xmlns="" w="9525">
+                  <a14:hiddenLine xmlns="" xmlns:a14="http://schemas.microsoft.com/office/drawing/2010/main" w="9525">
                     <a:solidFill>
                       <a:srgbClr val="000000"/>
                     </a:solidFill>
@@ -10796,7 +11012,7 @@
               </a:ln>
               <a:extLst>
                 <a:ext uri="{91240B29-F687-4f45-9708-019B960494DF}">
-                  <a14:hiddenLine xmlns:a14="http://schemas.microsoft.com/office/drawing/2010/main" xmlns="" w="9525">
+                  <a14:hiddenLine xmlns="" xmlns:a14="http://schemas.microsoft.com/office/drawing/2010/main" w="9525">
                     <a:solidFill>
                       <a:srgbClr val="000000"/>
                     </a:solidFill>
@@ -10861,7 +11077,7 @@
               </a:ln>
               <a:extLst>
                 <a:ext uri="{91240B29-F687-4f45-9708-019B960494DF}">
-                  <a14:hiddenLine xmlns:a14="http://schemas.microsoft.com/office/drawing/2010/main" xmlns="" w="9525">
+                  <a14:hiddenLine xmlns="" xmlns:a14="http://schemas.microsoft.com/office/drawing/2010/main" w="9525">
                     <a:solidFill>
                       <a:srgbClr val="000000"/>
                     </a:solidFill>
@@ -10981,7 +11197,7 @@
               </a:ln>
               <a:extLst>
                 <a:ext uri="{91240B29-F687-4f45-9708-019B960494DF}">
-                  <a14:hiddenLine xmlns:a14="http://schemas.microsoft.com/office/drawing/2010/main" xmlns="" w="9525">
+                  <a14:hiddenLine xmlns="" xmlns:a14="http://schemas.microsoft.com/office/drawing/2010/main" w="9525">
                     <a:solidFill>
                       <a:srgbClr val="000000"/>
                     </a:solidFill>
@@ -11079,7 +11295,7 @@
               </a:ln>
               <a:extLst>
                 <a:ext uri="{91240B29-F687-4f45-9708-019B960494DF}">
-                  <a14:hiddenLine xmlns:a14="http://schemas.microsoft.com/office/drawing/2010/main" xmlns="" w="9525">
+                  <a14:hiddenLine xmlns="" xmlns:a14="http://schemas.microsoft.com/office/drawing/2010/main" w="9525">
                     <a:solidFill>
                       <a:srgbClr val="000000"/>
                     </a:solidFill>
@@ -11194,7 +11410,7 @@
               </a:ln>
               <a:extLst>
                 <a:ext uri="{91240B29-F687-4f45-9708-019B960494DF}">
-                  <a14:hiddenLine xmlns:a14="http://schemas.microsoft.com/office/drawing/2010/main" xmlns="" w="9525">
+                  <a14:hiddenLine xmlns="" xmlns:a14="http://schemas.microsoft.com/office/drawing/2010/main" w="9525">
                     <a:solidFill>
                       <a:srgbClr val="000000"/>
                     </a:solidFill>
@@ -11284,7 +11500,7 @@
               </a:ln>
               <a:extLst>
                 <a:ext uri="{91240B29-F687-4f45-9708-019B960494DF}">
-                  <a14:hiddenLine xmlns:a14="http://schemas.microsoft.com/office/drawing/2010/main" xmlns="" w="9525">
+                  <a14:hiddenLine xmlns="" xmlns:a14="http://schemas.microsoft.com/office/drawing/2010/main" w="9525">
                     <a:solidFill>
                       <a:srgbClr val="000000"/>
                     </a:solidFill>
@@ -11349,7 +11565,7 @@
               </a:ln>
               <a:extLst>
                 <a:ext uri="{91240B29-F687-4f45-9708-019B960494DF}">
-                  <a14:hiddenLine xmlns:a14="http://schemas.microsoft.com/office/drawing/2010/main" xmlns="" w="9525">
+                  <a14:hiddenLine xmlns="" xmlns:a14="http://schemas.microsoft.com/office/drawing/2010/main" w="9525">
                     <a:solidFill>
                       <a:srgbClr val="000000"/>
                     </a:solidFill>
@@ -11439,7 +11655,7 @@
               </a:ln>
               <a:extLst>
                 <a:ext uri="{91240B29-F687-4f45-9708-019B960494DF}">
-                  <a14:hiddenLine xmlns:a14="http://schemas.microsoft.com/office/drawing/2010/main" xmlns="" w="9525">
+                  <a14:hiddenLine xmlns="" xmlns:a14="http://schemas.microsoft.com/office/drawing/2010/main" w="9525">
                     <a:solidFill>
                       <a:srgbClr val="000000"/>
                     </a:solidFill>
@@ -11507,7 +11723,7 @@
               </a:ln>
               <a:extLst>
                 <a:ext uri="{91240B29-F687-4f45-9708-019B960494DF}">
-                  <a14:hiddenLine xmlns:a14="http://schemas.microsoft.com/office/drawing/2010/main" xmlns="" w="9525">
+                  <a14:hiddenLine xmlns="" xmlns:a14="http://schemas.microsoft.com/office/drawing/2010/main" w="9525">
                     <a:solidFill>
                       <a:srgbClr val="000000"/>
                     </a:solidFill>
@@ -11597,7 +11813,7 @@
               </a:ln>
               <a:extLst>
                 <a:ext uri="{91240B29-F687-4f45-9708-019B960494DF}">
-                  <a14:hiddenLine xmlns:a14="http://schemas.microsoft.com/office/drawing/2010/main" xmlns="" w="9525">
+                  <a14:hiddenLine xmlns="" xmlns:a14="http://schemas.microsoft.com/office/drawing/2010/main" w="9525">
                     <a:solidFill>
                       <a:srgbClr val="000000"/>
                     </a:solidFill>
@@ -11665,7 +11881,7 @@
               </a:ln>
               <a:extLst>
                 <a:ext uri="{91240B29-F687-4f45-9708-019B960494DF}">
-                  <a14:hiddenLine xmlns:a14="http://schemas.microsoft.com/office/drawing/2010/main" xmlns="" w="9525">
+                  <a14:hiddenLine xmlns="" xmlns:a14="http://schemas.microsoft.com/office/drawing/2010/main" w="9525">
                     <a:solidFill>
                       <a:srgbClr val="000000"/>
                     </a:solidFill>
@@ -11755,7 +11971,7 @@
               </a:ln>
               <a:extLst>
                 <a:ext uri="{91240B29-F687-4f45-9708-019B960494DF}">
-                  <a14:hiddenLine xmlns:a14="http://schemas.microsoft.com/office/drawing/2010/main" xmlns="" w="9525">
+                  <a14:hiddenLine xmlns="" xmlns:a14="http://schemas.microsoft.com/office/drawing/2010/main" w="9525">
                     <a:solidFill>
                       <a:srgbClr val="000000"/>
                     </a:solidFill>
@@ -11789,7 +12005,7 @@
               </a:ln>
               <a:extLst>
                 <a:ext uri="{91240B29-F687-4f45-9708-019B960494DF}">
-                  <a14:hiddenLine xmlns:a14="http://schemas.microsoft.com/office/drawing/2010/main" xmlns="" w="9525">
+                  <a14:hiddenLine xmlns="" xmlns:a14="http://schemas.microsoft.com/office/drawing/2010/main" w="9525">
                     <a:solidFill>
                       <a:srgbClr val="000000"/>
                     </a:solidFill>
@@ -11930,7 +12146,7 @@
             <a:fld id="{48A87A34-81AB-432B-8DAE-1953F412C126}" type="datetimeFigureOut">
               <a:rPr lang="en-US" dirty="0"/>
               <a:pPr/>
-              <a:t>5/12/2020</a:t>
+              <a:t>5/16/2020</a:t>
             </a:fld>
             <a:endParaRPr lang="en-US" dirty="0"/>
           </a:p>
@@ -12462,7 +12678,10 @@
           <a:bodyPr/>
           <a:lstStyle/>
           <a:p>
-            <a:endParaRPr lang="en-US"/>
+            <a:r>
+              <a:rPr lang="en-US" dirty="0"/>
+              <a:t>What is the algorithm?</a:t>
+            </a:r>
           </a:p>
         </p:txBody>
       </p:sp>
@@ -12487,10 +12706,49 @@
           <a:bodyPr/>
           <a:lstStyle/>
           <a:p>
-            <a:endParaRPr lang="en-US"/>
+            <a:r>
+              <a:rPr lang="en-US" dirty="0"/>
+              <a:t>Problem it solves: sorting a list of numbers</a:t>
+            </a:r>
+          </a:p>
+          <a:p>
+            <a:r>
+              <a:rPr lang="en-US" dirty="0"/>
+              <a:t>Goes from front to back of list, sorting elements on the way</a:t>
+            </a:r>
           </a:p>
         </p:txBody>
       </p:sp>
+      <p:pic>
+        <p:nvPicPr>
+          <p:cNvPr id="7" name="Picture 6" descr="A close up of a device&#10;&#10;Description automatically generated">
+            <a:extLst>
+              <a:ext uri="{FF2B5EF4-FFF2-40B4-BE49-F238E27FC236}">
+                <a16:creationId xmlns:a16="http://schemas.microsoft.com/office/drawing/2014/main" id="{22D6AA92-32C8-4CBE-954D-11A9B3FA07C8}"/>
+              </a:ext>
+            </a:extLst>
+          </p:cNvPr>
+          <p:cNvPicPr>
+            <a:picLocks noChangeAspect="1"/>
+          </p:cNvPicPr>
+          <p:nvPr/>
+        </p:nvPicPr>
+        <p:blipFill>
+          <a:blip r:embed="rId2"/>
+          <a:stretch>
+            <a:fillRect/>
+          </a:stretch>
+        </p:blipFill>
+        <p:spPr>
+          <a:xfrm>
+            <a:off x="3358534" y="3585968"/>
+            <a:ext cx="2638425" cy="2447925"/>
+          </a:xfrm>
+          <a:prstGeom prst="rect">
+            <a:avLst/>
+          </a:prstGeom>
+        </p:spPr>
+      </p:pic>
     </p:spTree>
     <p:extLst>
       <p:ext uri="{BB962C8B-B14F-4D97-AF65-F5344CB8AC3E}">
@@ -12542,7 +12800,10 @@
           <a:bodyPr/>
           <a:lstStyle/>
           <a:p>
-            <a:endParaRPr lang="en-US"/>
+            <a:r>
+              <a:rPr lang="en-US" dirty="0"/>
+              <a:t>Background of algorithm</a:t>
+            </a:r>
           </a:p>
         </p:txBody>
       </p:sp>
@@ -12564,10 +12825,33 @@
         </p:nvSpPr>
         <p:spPr/>
         <p:txBody>
-          <a:bodyPr/>
+          <a:bodyPr>
+            <a:normAutofit/>
+          </a:bodyPr>
           <a:lstStyle/>
           <a:p>
-            <a:endParaRPr lang="en-US"/>
+            <a:r>
+              <a:rPr lang="en-US" dirty="0"/>
+              <a:t>Also known as ripple sort, shaker sort, and shuttle sort</a:t>
+            </a:r>
+          </a:p>
+          <a:p>
+            <a:r>
+              <a:rPr lang="en-US" dirty="0"/>
+              <a:t>Variation of bubble sort</a:t>
+            </a:r>
+          </a:p>
+          <a:p>
+            <a:r>
+              <a:rPr lang="en-US" dirty="0"/>
+              <a:t>No official creator</a:t>
+            </a:r>
+          </a:p>
+          <a:p>
+            <a:r>
+              <a:rPr lang="en-US" dirty="0"/>
+              <a:t>Similar algorithm is bubble sort</a:t>
+            </a:r>
           </a:p>
         </p:txBody>
       </p:sp>
@@ -12622,7 +12906,10 @@
           <a:bodyPr/>
           <a:lstStyle/>
           <a:p>
-            <a:endParaRPr lang="en-US"/>
+            <a:r>
+              <a:rPr lang="en-US" dirty="0"/>
+              <a:t>Step by step explanation</a:t>
+            </a:r>
           </a:p>
         </p:txBody>
       </p:sp>
@@ -12647,14 +12934,472 @@
           <a:bodyPr/>
           <a:lstStyle/>
           <a:p>
-            <a:endParaRPr lang="en-US"/>
+            <a:r>
+              <a:rPr lang="en-US" dirty="0"/>
+              <a:t>Starts at first element and iterates towards end of list</a:t>
+            </a:r>
+          </a:p>
+          <a:p>
+            <a:r>
+              <a:rPr lang="en-US" dirty="0"/>
+              <a:t>Swaps elements along the way similarly to bubble sort</a:t>
+            </a:r>
+          </a:p>
+          <a:p>
+            <a:r>
+              <a:rPr lang="en-US" dirty="0"/>
+              <a:t>Reaches last element and iterates towards start of list</a:t>
+            </a:r>
+          </a:p>
+          <a:p>
+            <a:r>
+              <a:rPr lang="en-US" dirty="0"/>
+              <a:t>Swaps elements along the way similarly to bubble sort</a:t>
+            </a:r>
+          </a:p>
+          <a:p>
+            <a:r>
+              <a:rPr lang="en-US" dirty="0"/>
+              <a:t>Process repeated until list is sorted</a:t>
+            </a:r>
+          </a:p>
+        </p:txBody>
+      </p:sp>
+      <p:pic>
+        <p:nvPicPr>
+          <p:cNvPr id="5" name="Picture 4" descr="A close up of a device&#10;&#10;Description automatically generated">
+            <a:extLst>
+              <a:ext uri="{FF2B5EF4-FFF2-40B4-BE49-F238E27FC236}">
+                <a16:creationId xmlns:a16="http://schemas.microsoft.com/office/drawing/2014/main" id="{2D76EDEA-18E2-4A6C-8812-C12B1C4776B3}"/>
+              </a:ext>
+            </a:extLst>
+          </p:cNvPr>
+          <p:cNvPicPr>
+            <a:picLocks noChangeAspect="1"/>
+          </p:cNvPicPr>
+          <p:nvPr/>
+        </p:nvPicPr>
+        <p:blipFill>
+          <a:blip r:embed="rId2"/>
+          <a:stretch>
+            <a:fillRect/>
+          </a:stretch>
+        </p:blipFill>
+        <p:spPr>
+          <a:xfrm>
+            <a:off x="8425817" y="2353128"/>
+            <a:ext cx="2874269" cy="2666741"/>
+          </a:xfrm>
+          <a:prstGeom prst="rect">
+            <a:avLst/>
+          </a:prstGeom>
+        </p:spPr>
+      </p:pic>
+    </p:spTree>
+    <p:extLst>
+      <p:ext uri="{BB962C8B-B14F-4D97-AF65-F5344CB8AC3E}">
+        <p14:creationId xmlns:p14="http://schemas.microsoft.com/office/powerpoint/2010/main" val="2635310036"/>
+      </p:ext>
+    </p:extLst>
+  </p:cSld>
+  <p:clrMapOvr>
+    <a:masterClrMapping/>
+  </p:clrMapOvr>
+</p:sld>
+</file>
+
+<file path=ppt/slides/slide5.xml><?xml version="1.0" encoding="utf-8"?>
+<p:sld xmlns:a="http://schemas.openxmlformats.org/drawingml/2006/main" xmlns:r="http://schemas.openxmlformats.org/officeDocument/2006/relationships" xmlns:p="http://schemas.openxmlformats.org/presentationml/2006/main">
+  <p:cSld>
+    <p:spTree>
+      <p:nvGrpSpPr>
+        <p:cNvPr id="1" name=""/>
+        <p:cNvGrpSpPr/>
+        <p:nvPr/>
+      </p:nvGrpSpPr>
+      <p:grpSpPr>
+        <a:xfrm>
+          <a:off x="0" y="0"/>
+          <a:ext cx="0" cy="0"/>
+          <a:chOff x="0" y="0"/>
+          <a:chExt cx="0" cy="0"/>
+        </a:xfrm>
+      </p:grpSpPr>
+      <p:sp>
+        <p:nvSpPr>
+          <p:cNvPr id="2" name="Title 1">
+            <a:extLst>
+              <a:ext uri="{FF2B5EF4-FFF2-40B4-BE49-F238E27FC236}">
+                <a16:creationId xmlns:a16="http://schemas.microsoft.com/office/drawing/2014/main" id="{689EE6AA-90E3-440A-94DD-EA556DCE0AD8}"/>
+              </a:ext>
+            </a:extLst>
+          </p:cNvPr>
+          <p:cNvSpPr>
+            <a:spLocks noGrp="1"/>
+          </p:cNvSpPr>
+          <p:nvPr>
+            <p:ph type="title"/>
+          </p:nvPr>
+        </p:nvSpPr>
+        <p:spPr/>
+        <p:txBody>
+          <a:bodyPr/>
+          <a:lstStyle/>
+          <a:p>
+            <a:r>
+              <a:rPr lang="en-US" dirty="0"/>
+              <a:t>Our implementation</a:t>
+            </a:r>
+          </a:p>
+        </p:txBody>
+      </p:sp>
+      <p:pic>
+        <p:nvPicPr>
+          <p:cNvPr id="5" name="Content Placeholder 4" descr="A screen shot of a smart phone&#10;&#10;Description automatically generated">
+            <a:extLst>
+              <a:ext uri="{FF2B5EF4-FFF2-40B4-BE49-F238E27FC236}">
+                <a16:creationId xmlns:a16="http://schemas.microsoft.com/office/drawing/2014/main" id="{A3BC2AE1-9DC7-485B-B125-3B865BE45C6F}"/>
+              </a:ext>
+            </a:extLst>
+          </p:cNvPr>
+          <p:cNvPicPr>
+            <a:picLocks noGrp="1" noChangeAspect="1"/>
+          </p:cNvPicPr>
+          <p:nvPr>
+            <p:ph idx="1"/>
+          </p:nvPr>
+        </p:nvPicPr>
+        <p:blipFill>
+          <a:blip r:embed="rId2"/>
+          <a:stretch>
+            <a:fillRect/>
+          </a:stretch>
+        </p:blipFill>
+        <p:spPr>
+          <a:xfrm>
+            <a:off x="5982837" y="690847"/>
+            <a:ext cx="4337971" cy="5240170"/>
+          </a:xfrm>
+        </p:spPr>
+      </p:pic>
+    </p:spTree>
+    <p:extLst>
+      <p:ext uri="{BB962C8B-B14F-4D97-AF65-F5344CB8AC3E}">
+        <p14:creationId xmlns:p14="http://schemas.microsoft.com/office/powerpoint/2010/main" val="1538555576"/>
+      </p:ext>
+    </p:extLst>
+  </p:cSld>
+  <p:clrMapOvr>
+    <a:masterClrMapping/>
+  </p:clrMapOvr>
+</p:sld>
+</file>
+
+<file path=ppt/slides/slide6.xml><?xml version="1.0" encoding="utf-8"?>
+<p:sld xmlns:a="http://schemas.openxmlformats.org/drawingml/2006/main" xmlns:r="http://schemas.openxmlformats.org/officeDocument/2006/relationships" xmlns:p="http://schemas.openxmlformats.org/presentationml/2006/main">
+  <p:cSld>
+    <p:spTree>
+      <p:nvGrpSpPr>
+        <p:cNvPr id="1" name=""/>
+        <p:cNvGrpSpPr/>
+        <p:nvPr/>
+      </p:nvGrpSpPr>
+      <p:grpSpPr>
+        <a:xfrm>
+          <a:off x="0" y="0"/>
+          <a:ext cx="0" cy="0"/>
+          <a:chOff x="0" y="0"/>
+          <a:chExt cx="0" cy="0"/>
+        </a:xfrm>
+      </p:grpSpPr>
+      <p:sp>
+        <p:nvSpPr>
+          <p:cNvPr id="2" name="Title 1">
+            <a:extLst>
+              <a:ext uri="{FF2B5EF4-FFF2-40B4-BE49-F238E27FC236}">
+                <a16:creationId xmlns:a16="http://schemas.microsoft.com/office/drawing/2014/main" id="{8E3D5069-4E87-4125-83B8-E7C052D52E7E}"/>
+              </a:ext>
+            </a:extLst>
+          </p:cNvPr>
+          <p:cNvSpPr>
+            <a:spLocks noGrp="1"/>
+          </p:cNvSpPr>
+          <p:nvPr>
+            <p:ph type="title"/>
+          </p:nvPr>
+        </p:nvSpPr>
+        <p:spPr/>
+        <p:txBody>
+          <a:bodyPr/>
+          <a:lstStyle/>
+          <a:p>
+            <a:r>
+              <a:rPr lang="en-US" dirty="0"/>
+              <a:t>Result of benchmark</a:t>
+            </a:r>
+          </a:p>
+        </p:txBody>
+      </p:sp>
+      <p:sp>
+        <p:nvSpPr>
+          <p:cNvPr id="3" name="Content Placeholder 2">
+            <a:extLst>
+              <a:ext uri="{FF2B5EF4-FFF2-40B4-BE49-F238E27FC236}">
+                <a16:creationId xmlns:a16="http://schemas.microsoft.com/office/drawing/2014/main" id="{1180D718-9729-4D00-B35D-12023989FBDD}"/>
+              </a:ext>
+            </a:extLst>
+          </p:cNvPr>
+          <p:cNvSpPr>
+            <a:spLocks noGrp="1"/>
+          </p:cNvSpPr>
+          <p:nvPr>
+            <p:ph idx="1"/>
+          </p:nvPr>
+        </p:nvSpPr>
+        <p:spPr>
+          <a:xfrm>
+            <a:off x="865722" y="2241098"/>
+            <a:ext cx="9905999" cy="3541714"/>
+          </a:xfrm>
+        </p:spPr>
+        <p:txBody>
+          <a:bodyPr/>
+          <a:lstStyle/>
+          <a:p>
+            <a:r>
+              <a:rPr lang="en-US" dirty="0"/>
+              <a:t>Sorted completed immediately</a:t>
+            </a:r>
+          </a:p>
+          <a:p>
+            <a:r>
+              <a:rPr lang="en-US" dirty="0"/>
+              <a:t>Shuffle completed in around 1000s</a:t>
+            </a:r>
+          </a:p>
+          <a:p>
+            <a:r>
+              <a:rPr lang="en-US" dirty="0"/>
+              <a:t>Reverse sorted completed with time</a:t>
+            </a:r>
+          </a:p>
+          <a:p>
+            <a:pPr marL="0" indent="0">
+              <a:buNone/>
+            </a:pPr>
+            <a:r>
+              <a:rPr lang="en-US" dirty="0"/>
+              <a:t>over 3000s</a:t>
+            </a:r>
+          </a:p>
+          <a:p>
+            <a:r>
+              <a:rPr lang="en-US" dirty="0"/>
+              <a:t>Benchmark took approximately</a:t>
+            </a:r>
+          </a:p>
+          <a:p>
+            <a:pPr marL="0" indent="0">
+              <a:buNone/>
+            </a:pPr>
+            <a:r>
+              <a:rPr lang="en-US" dirty="0"/>
+              <a:t>9 hours to fully run all trials</a:t>
+            </a:r>
+          </a:p>
+        </p:txBody>
+      </p:sp>
+      <p:pic>
+        <p:nvPicPr>
+          <p:cNvPr id="7" name="Picture 6" descr="A screenshot of a cell phone&#10;&#10;Description automatically generated">
+            <a:extLst>
+              <a:ext uri="{FF2B5EF4-FFF2-40B4-BE49-F238E27FC236}">
+                <a16:creationId xmlns:a16="http://schemas.microsoft.com/office/drawing/2014/main" id="{DCC66136-172D-429B-9863-AE5DB214BA42}"/>
+              </a:ext>
+            </a:extLst>
+          </p:cNvPr>
+          <p:cNvPicPr>
+            <a:picLocks noChangeAspect="1"/>
+          </p:cNvPicPr>
+          <p:nvPr/>
+        </p:nvPicPr>
+        <p:blipFill>
+          <a:blip r:embed="rId2"/>
+          <a:stretch>
+            <a:fillRect/>
+          </a:stretch>
+        </p:blipFill>
+        <p:spPr>
+          <a:xfrm>
+            <a:off x="5818722" y="1889453"/>
+            <a:ext cx="5844542" cy="3764727"/>
+          </a:xfrm>
+          <a:prstGeom prst="rect">
+            <a:avLst/>
+          </a:prstGeom>
+        </p:spPr>
+      </p:pic>
+    </p:spTree>
+    <p:extLst>
+      <p:ext uri="{BB962C8B-B14F-4D97-AF65-F5344CB8AC3E}">
+        <p14:creationId xmlns:p14="http://schemas.microsoft.com/office/powerpoint/2010/main" val="3166054258"/>
+      </p:ext>
+    </p:extLst>
+  </p:cSld>
+  <p:clrMapOvr>
+    <a:masterClrMapping/>
+  </p:clrMapOvr>
+</p:sld>
+</file>
+
+<file path=ppt/slides/slide7.xml><?xml version="1.0" encoding="utf-8"?>
+<p:sld xmlns:a="http://schemas.openxmlformats.org/drawingml/2006/main" xmlns:r="http://schemas.openxmlformats.org/officeDocument/2006/relationships" xmlns:p="http://schemas.openxmlformats.org/presentationml/2006/main">
+  <p:cSld>
+    <p:spTree>
+      <p:nvGrpSpPr>
+        <p:cNvPr id="1" name=""/>
+        <p:cNvGrpSpPr/>
+        <p:nvPr/>
+      </p:nvGrpSpPr>
+      <p:grpSpPr>
+        <a:xfrm>
+          <a:off x="0" y="0"/>
+          <a:ext cx="0" cy="0"/>
+          <a:chOff x="0" y="0"/>
+          <a:chExt cx="0" cy="0"/>
+        </a:xfrm>
+      </p:grpSpPr>
+      <p:sp>
+        <p:nvSpPr>
+          <p:cNvPr id="2" name="Title 1">
+            <a:extLst>
+              <a:ext uri="{FF2B5EF4-FFF2-40B4-BE49-F238E27FC236}">
+                <a16:creationId xmlns:a16="http://schemas.microsoft.com/office/drawing/2014/main" id="{C3F72BEF-4739-46BB-8A7E-F39C654C673B}"/>
+              </a:ext>
+            </a:extLst>
+          </p:cNvPr>
+          <p:cNvSpPr>
+            <a:spLocks noGrp="1"/>
+          </p:cNvSpPr>
+          <p:nvPr>
+            <p:ph type="title"/>
+          </p:nvPr>
+        </p:nvSpPr>
+        <p:spPr/>
+        <p:txBody>
+          <a:bodyPr/>
+          <a:lstStyle/>
+          <a:p>
+            <a:r>
+              <a:rPr lang="en-US" dirty="0"/>
+              <a:t>Pros and cons</a:t>
+            </a:r>
+          </a:p>
+        </p:txBody>
+      </p:sp>
+      <p:sp>
+        <p:nvSpPr>
+          <p:cNvPr id="3" name="Content Placeholder 2">
+            <a:extLst>
+              <a:ext uri="{FF2B5EF4-FFF2-40B4-BE49-F238E27FC236}">
+                <a16:creationId xmlns:a16="http://schemas.microsoft.com/office/drawing/2014/main" id="{523FC326-DD52-41D5-8764-FA314CD8A0B8}"/>
+              </a:ext>
+            </a:extLst>
+          </p:cNvPr>
+          <p:cNvSpPr>
+            <a:spLocks noGrp="1"/>
+          </p:cNvSpPr>
+          <p:nvPr>
+            <p:ph idx="1"/>
+          </p:nvPr>
+        </p:nvSpPr>
+        <p:spPr/>
+        <p:txBody>
+          <a:bodyPr>
+            <a:normAutofit fontScale="85000" lnSpcReduction="10000"/>
+          </a:bodyPr>
+          <a:lstStyle/>
+          <a:p>
+            <a:r>
+              <a:rPr lang="en-US" dirty="0"/>
+              <a:t>Time complexity</a:t>
+            </a:r>
+          </a:p>
+          <a:p>
+            <a:pPr lvl="1"/>
+            <a:r>
+              <a:rPr lang="en-US" dirty="0"/>
+              <a:t>Best case: O(n)</a:t>
+            </a:r>
+          </a:p>
+          <a:p>
+            <a:pPr lvl="1"/>
+            <a:r>
+              <a:rPr lang="en-US" dirty="0"/>
+              <a:t>Average/worst case: O(n</a:t>
+            </a:r>
+            <a:r>
+              <a:rPr lang="en-US" baseline="30000" dirty="0"/>
+              <a:t>2</a:t>
+            </a:r>
+            <a:r>
+              <a:rPr lang="en-US" dirty="0"/>
+              <a:t>)</a:t>
+            </a:r>
+          </a:p>
+          <a:p>
+            <a:r>
+              <a:rPr lang="en-US" dirty="0"/>
+              <a:t>Space complexity: O(1)</a:t>
+            </a:r>
+          </a:p>
+          <a:p>
+            <a:r>
+              <a:rPr lang="en-US" dirty="0"/>
+              <a:t>Pros</a:t>
+            </a:r>
+          </a:p>
+          <a:p>
+            <a:pPr lvl="1"/>
+            <a:r>
+              <a:rPr lang="en-US" dirty="0"/>
+              <a:t>Sorts through </a:t>
+            </a:r>
+            <a:r>
+              <a:rPr lang="en-US"/>
+              <a:t>elements slightly faster </a:t>
+            </a:r>
+            <a:r>
+              <a:rPr lang="en-US" dirty="0"/>
+              <a:t>than bubble sort</a:t>
+            </a:r>
+          </a:p>
+          <a:p>
+            <a:pPr lvl="1"/>
+            <a:r>
+              <a:rPr lang="en-US" dirty="0"/>
+              <a:t>Better space complexity than bubble sort</a:t>
+            </a:r>
+          </a:p>
+          <a:p>
+            <a:r>
+              <a:rPr lang="en-US" dirty="0"/>
+              <a:t>Cons</a:t>
+            </a:r>
+          </a:p>
+          <a:p>
+            <a:pPr lvl="1"/>
+            <a:r>
+              <a:rPr lang="en-US" dirty="0"/>
+              <a:t>Still slow with larger n lists</a:t>
+            </a:r>
           </a:p>
         </p:txBody>
       </p:sp>
     </p:spTree>
     <p:extLst>
       <p:ext uri="{BB962C8B-B14F-4D97-AF65-F5344CB8AC3E}">
-        <p14:creationId xmlns:p14="http://schemas.microsoft.com/office/powerpoint/2010/main" val="2635310036"/>
+        <p14:creationId xmlns:p14="http://schemas.microsoft.com/office/powerpoint/2010/main" val="1509338378"/>
       </p:ext>
     </p:extLst>
   </p:cSld>

</xml_diff>

<commit_message>
Slight alteration to slides
</commit_message>
<xml_diff>
--- a/FinalPresentation.pptx
+++ b/FinalPresentation.pptx
@@ -128,6 +128,30 @@
 
 <file path=ppt/changesInfos/changesInfo1.xml><?xml version="1.0" encoding="utf-8"?>
 <pc:chgInfo xmlns:a="http://schemas.openxmlformats.org/drawingml/2006/main" xmlns:r="http://schemas.openxmlformats.org/officeDocument/2006/relationships" xmlns:ac="http://schemas.microsoft.com/office/drawing/2013/main/command" xmlns:pc="http://schemas.microsoft.com/office/powerpoint/2013/main/command">
+  <pc:docChgLst>
+    <pc:chgData name="Andrew Lindsley" userId="74a0f4885c134500" providerId="LiveId" clId="{6282F153-2F01-487F-AACE-36919C1DB2CD}"/>
+    <pc:docChg chg="modSld">
+      <pc:chgData name="Andrew Lindsley" userId="74a0f4885c134500" providerId="LiveId" clId="{6282F153-2F01-487F-AACE-36919C1DB2CD}" dt="2020-05-17T00:05:50.788" v="2" actId="20577"/>
+      <pc:docMkLst>
+        <pc:docMk/>
+      </pc:docMkLst>
+      <pc:sldChg chg="modSp mod">
+        <pc:chgData name="Andrew Lindsley" userId="74a0f4885c134500" providerId="LiveId" clId="{6282F153-2F01-487F-AACE-36919C1DB2CD}" dt="2020-05-17T00:05:50.788" v="2" actId="20577"/>
+        <pc:sldMkLst>
+          <pc:docMk/>
+          <pc:sldMk cId="3166054258" sldId="261"/>
+        </pc:sldMkLst>
+        <pc:spChg chg="mod">
+          <ac:chgData name="Andrew Lindsley" userId="74a0f4885c134500" providerId="LiveId" clId="{6282F153-2F01-487F-AACE-36919C1DB2CD}" dt="2020-05-17T00:05:50.788" v="2" actId="20577"/>
+          <ac:spMkLst>
+            <pc:docMk/>
+            <pc:sldMk cId="3166054258" sldId="261"/>
+            <ac:spMk id="3" creationId="{1180D718-9729-4D00-B35D-12023989FBDD}"/>
+          </ac:spMkLst>
+        </pc:spChg>
+      </pc:sldChg>
+    </pc:docChg>
+  </pc:docChgLst>
   <pc:docChgLst>
     <pc:chgData name="Andrew Lindsley" userId="74a0f4885c134500" providerId="LiveId" clId="{139E8E0A-F4F5-4069-9B79-8584EA1D7BE1}"/>
     <pc:docChg chg="undo custSel addSld modSld">
@@ -376,7 +400,7 @@
           <a:noFill/>
           <a:extLst>
             <a:ext uri="{909E8E84-426E-40dd-AFC4-6F175D3DCCD1}">
-              <a14:hiddenFill xmlns="" xmlns:a14="http://schemas.microsoft.com/office/drawing/2010/main">
+              <a14:hiddenFill xmlns:a14="http://schemas.microsoft.com/office/drawing/2010/main" xmlns="">
                 <a:solidFill>
                   <a:srgbClr val="FFFFFF"/>
                 </a:solidFill>
@@ -436,7 +460,7 @@
             </a:ln>
             <a:extLst>
               <a:ext uri="{91240B29-F687-4f45-9708-019B960494DF}">
-                <a14:hiddenLine xmlns="" xmlns:a14="http://schemas.microsoft.com/office/drawing/2010/main" w="9525">
+                <a14:hiddenLine xmlns:a14="http://schemas.microsoft.com/office/drawing/2010/main" xmlns="" w="9525">
                   <a:solidFill>
                     <a:srgbClr val="000000"/>
                   </a:solidFill>
@@ -526,7 +550,7 @@
             </a:ln>
             <a:extLst>
               <a:ext uri="{91240B29-F687-4f45-9708-019B960494DF}">
-                <a14:hiddenLine xmlns="" xmlns:a14="http://schemas.microsoft.com/office/drawing/2010/main" w="9525">
+                <a14:hiddenLine xmlns:a14="http://schemas.microsoft.com/office/drawing/2010/main" xmlns="" w="9525">
                   <a:solidFill>
                     <a:srgbClr val="000000"/>
                   </a:solidFill>
@@ -616,7 +640,7 @@
             </a:ln>
             <a:extLst>
               <a:ext uri="{91240B29-F687-4f45-9708-019B960494DF}">
-                <a14:hiddenLine xmlns="" xmlns:a14="http://schemas.microsoft.com/office/drawing/2010/main" w="9525">
+                <a14:hiddenLine xmlns:a14="http://schemas.microsoft.com/office/drawing/2010/main" xmlns="" w="9525">
                   <a:solidFill>
                     <a:srgbClr val="000000"/>
                   </a:solidFill>
@@ -650,7 +674,7 @@
             </a:ln>
             <a:extLst>
               <a:ext uri="{91240B29-F687-4f45-9708-019B960494DF}">
-                <a14:hiddenLine xmlns="" xmlns:a14="http://schemas.microsoft.com/office/drawing/2010/main" w="9525">
+                <a14:hiddenLine xmlns:a14="http://schemas.microsoft.com/office/drawing/2010/main" xmlns="" w="9525">
                   <a:solidFill>
                     <a:srgbClr val="000000"/>
                   </a:solidFill>
@@ -740,7 +764,7 @@
             </a:ln>
             <a:extLst>
               <a:ext uri="{91240B29-F687-4f45-9708-019B960494DF}">
-                <a14:hiddenLine xmlns="" xmlns:a14="http://schemas.microsoft.com/office/drawing/2010/main" w="9525">
+                <a14:hiddenLine xmlns:a14="http://schemas.microsoft.com/office/drawing/2010/main" xmlns="" w="9525">
                   <a:solidFill>
                     <a:srgbClr val="000000"/>
                   </a:solidFill>
@@ -802,7 +826,7 @@
             </a:ln>
             <a:extLst>
               <a:ext uri="{91240B29-F687-4f45-9708-019B960494DF}">
-                <a14:hiddenLine xmlns="" xmlns:a14="http://schemas.microsoft.com/office/drawing/2010/main" w="9525">
+                <a14:hiddenLine xmlns:a14="http://schemas.microsoft.com/office/drawing/2010/main" xmlns="" w="9525">
                   <a:solidFill>
                     <a:srgbClr val="000000"/>
                   </a:solidFill>
@@ -864,7 +888,7 @@
             </a:ln>
             <a:extLst>
               <a:ext uri="{91240B29-F687-4f45-9708-019B960494DF}">
-                <a14:hiddenLine xmlns="" xmlns:a14="http://schemas.microsoft.com/office/drawing/2010/main" w="9525">
+                <a14:hiddenLine xmlns:a14="http://schemas.microsoft.com/office/drawing/2010/main" xmlns="" w="9525">
                   <a:solidFill>
                     <a:srgbClr val="000000"/>
                   </a:solidFill>
@@ -954,7 +978,7 @@
             </a:ln>
             <a:extLst>
               <a:ext uri="{91240B29-F687-4f45-9708-019B960494DF}">
-                <a14:hiddenLine xmlns="" xmlns:a14="http://schemas.microsoft.com/office/drawing/2010/main" w="9525">
+                <a14:hiddenLine xmlns:a14="http://schemas.microsoft.com/office/drawing/2010/main" xmlns="" w="9525">
                   <a:solidFill>
                     <a:srgbClr val="000000"/>
                   </a:solidFill>
@@ -1016,7 +1040,7 @@
             </a:ln>
             <a:extLst>
               <a:ext uri="{91240B29-F687-4f45-9708-019B960494DF}">
-                <a14:hiddenLine xmlns="" xmlns:a14="http://schemas.microsoft.com/office/drawing/2010/main" w="9525">
+                <a14:hiddenLine xmlns:a14="http://schemas.microsoft.com/office/drawing/2010/main" xmlns="" w="9525">
                   <a:solidFill>
                     <a:srgbClr val="000000"/>
                   </a:solidFill>
@@ -1078,7 +1102,7 @@
             </a:ln>
             <a:extLst>
               <a:ext uri="{91240B29-F687-4f45-9708-019B960494DF}">
-                <a14:hiddenLine xmlns="" xmlns:a14="http://schemas.microsoft.com/office/drawing/2010/main" w="9525">
+                <a14:hiddenLine xmlns:a14="http://schemas.microsoft.com/office/drawing/2010/main" xmlns="" w="9525">
                   <a:solidFill>
                     <a:srgbClr val="000000"/>
                   </a:solidFill>
@@ -1168,7 +1192,7 @@
             </a:ln>
             <a:extLst>
               <a:ext uri="{91240B29-F687-4f45-9708-019B960494DF}">
-                <a14:hiddenLine xmlns="" xmlns:a14="http://schemas.microsoft.com/office/drawing/2010/main" w="9525">
+                <a14:hiddenLine xmlns:a14="http://schemas.microsoft.com/office/drawing/2010/main" xmlns="" w="9525">
                   <a:solidFill>
                     <a:srgbClr val="000000"/>
                   </a:solidFill>
@@ -1258,7 +1282,7 @@
             </a:ln>
             <a:extLst>
               <a:ext uri="{91240B29-F687-4f45-9708-019B960494DF}">
-                <a14:hiddenLine xmlns="" xmlns:a14="http://schemas.microsoft.com/office/drawing/2010/main" w="9525">
+                <a14:hiddenLine xmlns:a14="http://schemas.microsoft.com/office/drawing/2010/main" xmlns="" w="9525">
                   <a:solidFill>
                     <a:srgbClr val="000000"/>
                   </a:solidFill>
@@ -1320,7 +1344,7 @@
             </a:ln>
             <a:extLst>
               <a:ext uri="{91240B29-F687-4f45-9708-019B960494DF}">
-                <a14:hiddenLine xmlns="" xmlns:a14="http://schemas.microsoft.com/office/drawing/2010/main" w="9525">
+                <a14:hiddenLine xmlns:a14="http://schemas.microsoft.com/office/drawing/2010/main" xmlns="" w="9525">
                   <a:solidFill>
                     <a:srgbClr val="000000"/>
                   </a:solidFill>
@@ -1430,7 +1454,7 @@
             </a:ln>
             <a:extLst>
               <a:ext uri="{91240B29-F687-4f45-9708-019B960494DF}">
-                <a14:hiddenLine xmlns="" xmlns:a14="http://schemas.microsoft.com/office/drawing/2010/main" w="9525">
+                <a14:hiddenLine xmlns:a14="http://schemas.microsoft.com/office/drawing/2010/main" xmlns="" w="9525">
                   <a:solidFill>
                     <a:srgbClr val="000000"/>
                   </a:solidFill>
@@ -1492,7 +1516,7 @@
             </a:ln>
             <a:extLst>
               <a:ext uri="{91240B29-F687-4f45-9708-019B960494DF}">
-                <a14:hiddenLine xmlns="" xmlns:a14="http://schemas.microsoft.com/office/drawing/2010/main" w="9525">
+                <a14:hiddenLine xmlns:a14="http://schemas.microsoft.com/office/drawing/2010/main" xmlns="" w="9525">
                   <a:solidFill>
                     <a:srgbClr val="000000"/>
                   </a:solidFill>
@@ -1582,7 +1606,7 @@
             </a:ln>
             <a:extLst>
               <a:ext uri="{91240B29-F687-4f45-9708-019B960494DF}">
-                <a14:hiddenLine xmlns="" xmlns:a14="http://schemas.microsoft.com/office/drawing/2010/main" w="9525">
+                <a14:hiddenLine xmlns:a14="http://schemas.microsoft.com/office/drawing/2010/main" xmlns="" w="9525">
                   <a:solidFill>
                     <a:srgbClr val="000000"/>
                   </a:solidFill>
@@ -1672,7 +1696,7 @@
             </a:ln>
             <a:extLst>
               <a:ext uri="{91240B29-F687-4f45-9708-019B960494DF}">
-                <a14:hiddenLine xmlns="" xmlns:a14="http://schemas.microsoft.com/office/drawing/2010/main" w="9525">
+                <a14:hiddenLine xmlns:a14="http://schemas.microsoft.com/office/drawing/2010/main" xmlns="" w="9525">
                   <a:solidFill>
                     <a:srgbClr val="000000"/>
                   </a:solidFill>
@@ -1734,7 +1758,7 @@
             </a:ln>
             <a:extLst>
               <a:ext uri="{91240B29-F687-4f45-9708-019B960494DF}">
-                <a14:hiddenLine xmlns="" xmlns:a14="http://schemas.microsoft.com/office/drawing/2010/main" w="9525">
+                <a14:hiddenLine xmlns:a14="http://schemas.microsoft.com/office/drawing/2010/main" xmlns="" w="9525">
                   <a:solidFill>
                     <a:srgbClr val="000000"/>
                   </a:solidFill>
@@ -1824,7 +1848,7 @@
             </a:ln>
             <a:extLst>
               <a:ext uri="{91240B29-F687-4f45-9708-019B960494DF}">
-                <a14:hiddenLine xmlns="" xmlns:a14="http://schemas.microsoft.com/office/drawing/2010/main" w="9525">
+                <a14:hiddenLine xmlns:a14="http://schemas.microsoft.com/office/drawing/2010/main" xmlns="" w="9525">
                   <a:solidFill>
                     <a:srgbClr val="000000"/>
                   </a:solidFill>
@@ -1914,7 +1938,7 @@
             </a:ln>
             <a:extLst>
               <a:ext uri="{91240B29-F687-4f45-9708-019B960494DF}">
-                <a14:hiddenLine xmlns="" xmlns:a14="http://schemas.microsoft.com/office/drawing/2010/main" w="9525">
+                <a14:hiddenLine xmlns:a14="http://schemas.microsoft.com/office/drawing/2010/main" xmlns="" w="9525">
                   <a:solidFill>
                     <a:srgbClr val="000000"/>
                   </a:solidFill>
@@ -1970,7 +1994,7 @@
             </a:ln>
             <a:extLst>
               <a:ext uri="{91240B29-F687-4f45-9708-019B960494DF}">
-                <a14:hiddenLine xmlns="" xmlns:a14="http://schemas.microsoft.com/office/drawing/2010/main" w="9525">
+                <a14:hiddenLine xmlns:a14="http://schemas.microsoft.com/office/drawing/2010/main" xmlns="" w="9525">
                   <a:solidFill>
                     <a:srgbClr val="000000"/>
                   </a:solidFill>
@@ -2060,7 +2084,7 @@
             </a:ln>
             <a:extLst>
               <a:ext uri="{91240B29-F687-4f45-9708-019B960494DF}">
-                <a14:hiddenLine xmlns="" xmlns:a14="http://schemas.microsoft.com/office/drawing/2010/main" w="9525">
+                <a14:hiddenLine xmlns:a14="http://schemas.microsoft.com/office/drawing/2010/main" xmlns="" w="9525">
                   <a:solidFill>
                     <a:srgbClr val="000000"/>
                   </a:solidFill>
@@ -2116,7 +2140,7 @@
             </a:ln>
             <a:extLst>
               <a:ext uri="{91240B29-F687-4f45-9708-019B960494DF}">
-                <a14:hiddenLine xmlns="" xmlns:a14="http://schemas.microsoft.com/office/drawing/2010/main" w="9525">
+                <a14:hiddenLine xmlns:a14="http://schemas.microsoft.com/office/drawing/2010/main" xmlns="" w="9525">
                   <a:solidFill>
                     <a:srgbClr val="000000"/>
                   </a:solidFill>
@@ -2206,7 +2230,7 @@
             </a:ln>
             <a:extLst>
               <a:ext uri="{91240B29-F687-4f45-9708-019B960494DF}">
-                <a14:hiddenLine xmlns="" xmlns:a14="http://schemas.microsoft.com/office/drawing/2010/main" w="9525">
+                <a14:hiddenLine xmlns:a14="http://schemas.microsoft.com/office/drawing/2010/main" xmlns="" w="9525">
                   <a:solidFill>
                     <a:srgbClr val="000000"/>
                   </a:solidFill>
@@ -2274,7 +2298,7 @@
             </a:ln>
             <a:extLst>
               <a:ext uri="{91240B29-F687-4f45-9708-019B960494DF}">
-                <a14:hiddenLine xmlns="" xmlns:a14="http://schemas.microsoft.com/office/drawing/2010/main" w="9525">
+                <a14:hiddenLine xmlns:a14="http://schemas.microsoft.com/office/drawing/2010/main" xmlns="" w="9525">
                   <a:solidFill>
                     <a:srgbClr val="000000"/>
                   </a:solidFill>
@@ -2364,7 +2388,7 @@
             </a:ln>
             <a:extLst>
               <a:ext uri="{91240B29-F687-4f45-9708-019B960494DF}">
-                <a14:hiddenLine xmlns="" xmlns:a14="http://schemas.microsoft.com/office/drawing/2010/main" w="9525">
+                <a14:hiddenLine xmlns:a14="http://schemas.microsoft.com/office/drawing/2010/main" xmlns="" w="9525">
                   <a:solidFill>
                     <a:srgbClr val="000000"/>
                   </a:solidFill>
@@ -2432,7 +2456,7 @@
             </a:ln>
             <a:extLst>
               <a:ext uri="{91240B29-F687-4f45-9708-019B960494DF}">
-                <a14:hiddenLine xmlns="" xmlns:a14="http://schemas.microsoft.com/office/drawing/2010/main" w="9525">
+                <a14:hiddenLine xmlns:a14="http://schemas.microsoft.com/office/drawing/2010/main" xmlns="" w="9525">
                   <a:solidFill>
                     <a:srgbClr val="000000"/>
                   </a:solidFill>
@@ -2522,7 +2546,7 @@
             </a:ln>
             <a:extLst>
               <a:ext uri="{91240B29-F687-4f45-9708-019B960494DF}">
-                <a14:hiddenLine xmlns="" xmlns:a14="http://schemas.microsoft.com/office/drawing/2010/main" w="9525">
+                <a14:hiddenLine xmlns:a14="http://schemas.microsoft.com/office/drawing/2010/main" xmlns="" w="9525">
                   <a:solidFill>
                     <a:srgbClr val="000000"/>
                   </a:solidFill>
@@ -2556,7 +2580,7 @@
             </a:ln>
             <a:extLst>
               <a:ext uri="{91240B29-F687-4f45-9708-019B960494DF}">
-                <a14:hiddenLine xmlns="" xmlns:a14="http://schemas.microsoft.com/office/drawing/2010/main" w="9525">
+                <a14:hiddenLine xmlns:a14="http://schemas.microsoft.com/office/drawing/2010/main" xmlns="" w="9525">
                   <a:solidFill>
                     <a:srgbClr val="000000"/>
                   </a:solidFill>
@@ -2646,7 +2670,7 @@
             </a:ln>
             <a:extLst>
               <a:ext uri="{91240B29-F687-4f45-9708-019B960494DF}">
-                <a14:hiddenLine xmlns="" xmlns:a14="http://schemas.microsoft.com/office/drawing/2010/main" w="9525">
+                <a14:hiddenLine xmlns:a14="http://schemas.microsoft.com/office/drawing/2010/main" xmlns="" w="9525">
                   <a:solidFill>
                     <a:srgbClr val="000000"/>
                   </a:solidFill>
@@ -2708,7 +2732,7 @@
             </a:ln>
             <a:extLst>
               <a:ext uri="{91240B29-F687-4f45-9708-019B960494DF}">
-                <a14:hiddenLine xmlns="" xmlns:a14="http://schemas.microsoft.com/office/drawing/2010/main" w="9525">
+                <a14:hiddenLine xmlns:a14="http://schemas.microsoft.com/office/drawing/2010/main" xmlns="" w="9525">
                   <a:solidFill>
                     <a:srgbClr val="000000"/>
                   </a:solidFill>
@@ -2770,7 +2794,7 @@
             </a:ln>
             <a:extLst>
               <a:ext uri="{91240B29-F687-4f45-9708-019B960494DF}">
-                <a14:hiddenLine xmlns="" xmlns:a14="http://schemas.microsoft.com/office/drawing/2010/main" w="9525">
+                <a14:hiddenLine xmlns:a14="http://schemas.microsoft.com/office/drawing/2010/main" xmlns="" w="9525">
                   <a:solidFill>
                     <a:srgbClr val="000000"/>
                   </a:solidFill>
@@ -2860,7 +2884,7 @@
             </a:ln>
             <a:extLst>
               <a:ext uri="{91240B29-F687-4f45-9708-019B960494DF}">
-                <a14:hiddenLine xmlns="" xmlns:a14="http://schemas.microsoft.com/office/drawing/2010/main" w="9525">
+                <a14:hiddenLine xmlns:a14="http://schemas.microsoft.com/office/drawing/2010/main" xmlns="" w="9525">
                   <a:solidFill>
                     <a:srgbClr val="000000"/>
                   </a:solidFill>
@@ -2928,7 +2952,7 @@
             </a:ln>
             <a:extLst>
               <a:ext uri="{91240B29-F687-4f45-9708-019B960494DF}">
-                <a14:hiddenLine xmlns="" xmlns:a14="http://schemas.microsoft.com/office/drawing/2010/main" w="9525">
+                <a14:hiddenLine xmlns:a14="http://schemas.microsoft.com/office/drawing/2010/main" xmlns="" w="9525">
                   <a:solidFill>
                     <a:srgbClr val="000000"/>
                   </a:solidFill>
@@ -2990,7 +3014,7 @@
             </a:ln>
             <a:extLst>
               <a:ext uri="{91240B29-F687-4f45-9708-019B960494DF}">
-                <a14:hiddenLine xmlns="" xmlns:a14="http://schemas.microsoft.com/office/drawing/2010/main" w="9525">
+                <a14:hiddenLine xmlns:a14="http://schemas.microsoft.com/office/drawing/2010/main" xmlns="" w="9525">
                   <a:solidFill>
                     <a:srgbClr val="000000"/>
                   </a:solidFill>
@@ -3080,7 +3104,7 @@
             </a:ln>
             <a:extLst>
               <a:ext uri="{91240B29-F687-4f45-9708-019B960494DF}">
-                <a14:hiddenLine xmlns="" xmlns:a14="http://schemas.microsoft.com/office/drawing/2010/main" w="9525">
+                <a14:hiddenLine xmlns:a14="http://schemas.microsoft.com/office/drawing/2010/main" xmlns="" w="9525">
                   <a:solidFill>
                     <a:srgbClr val="000000"/>
                   </a:solidFill>
@@ -3142,7 +3166,7 @@
             </a:ln>
             <a:extLst>
               <a:ext uri="{91240B29-F687-4f45-9708-019B960494DF}">
-                <a14:hiddenLine xmlns="" xmlns:a14="http://schemas.microsoft.com/office/drawing/2010/main" w="9525">
+                <a14:hiddenLine xmlns:a14="http://schemas.microsoft.com/office/drawing/2010/main" xmlns="" w="9525">
                   <a:solidFill>
                     <a:srgbClr val="000000"/>
                   </a:solidFill>
@@ -3232,7 +3256,7 @@
             </a:ln>
             <a:extLst>
               <a:ext uri="{91240B29-F687-4f45-9708-019B960494DF}">
-                <a14:hiddenLine xmlns="" xmlns:a14="http://schemas.microsoft.com/office/drawing/2010/main" w="9525">
+                <a14:hiddenLine xmlns:a14="http://schemas.microsoft.com/office/drawing/2010/main" xmlns="" w="9525">
                   <a:solidFill>
                     <a:srgbClr val="000000"/>
                   </a:solidFill>
@@ -3294,7 +3318,7 @@
             </a:ln>
             <a:extLst>
               <a:ext uri="{91240B29-F687-4f45-9708-019B960494DF}">
-                <a14:hiddenLine xmlns="" xmlns:a14="http://schemas.microsoft.com/office/drawing/2010/main" w="9525">
+                <a14:hiddenLine xmlns:a14="http://schemas.microsoft.com/office/drawing/2010/main" xmlns="" w="9525">
                   <a:solidFill>
                     <a:srgbClr val="000000"/>
                   </a:solidFill>
@@ -3384,7 +3408,7 @@
             </a:ln>
             <a:extLst>
               <a:ext uri="{91240B29-F687-4f45-9708-019B960494DF}">
-                <a14:hiddenLine xmlns="" xmlns:a14="http://schemas.microsoft.com/office/drawing/2010/main" w="9525">
+                <a14:hiddenLine xmlns:a14="http://schemas.microsoft.com/office/drawing/2010/main" xmlns="" w="9525">
                   <a:solidFill>
                     <a:srgbClr val="000000"/>
                   </a:solidFill>
@@ -3418,7 +3442,7 @@
             </a:ln>
             <a:extLst>
               <a:ext uri="{91240B29-F687-4f45-9708-019B960494DF}">
-                <a14:hiddenLine xmlns="" xmlns:a14="http://schemas.microsoft.com/office/drawing/2010/main" w="9525">
+                <a14:hiddenLine xmlns:a14="http://schemas.microsoft.com/office/drawing/2010/main" xmlns="" w="9525">
                   <a:solidFill>
                     <a:srgbClr val="000000"/>
                   </a:solidFill>
@@ -3483,7 +3507,7 @@
             </a:ln>
             <a:extLst>
               <a:ext uri="{91240B29-F687-4f45-9708-019B960494DF}">
-                <a14:hiddenLine xmlns="" xmlns:a14="http://schemas.microsoft.com/office/drawing/2010/main" w="9525">
+                <a14:hiddenLine xmlns:a14="http://schemas.microsoft.com/office/drawing/2010/main" xmlns="" w="9525">
                   <a:solidFill>
                     <a:srgbClr val="000000"/>
                   </a:solidFill>
@@ -3573,7 +3597,7 @@
             </a:ln>
             <a:extLst>
               <a:ext uri="{91240B29-F687-4f45-9708-019B960494DF}">
-                <a14:hiddenLine xmlns="" xmlns:a14="http://schemas.microsoft.com/office/drawing/2010/main" w="9525">
+                <a14:hiddenLine xmlns:a14="http://schemas.microsoft.com/office/drawing/2010/main" xmlns="" w="9525">
                   <a:solidFill>
                     <a:srgbClr val="000000"/>
                   </a:solidFill>
@@ -3635,7 +3659,7 @@
             </a:ln>
             <a:extLst>
               <a:ext uri="{91240B29-F687-4f45-9708-019B960494DF}">
-                <a14:hiddenLine xmlns="" xmlns:a14="http://schemas.microsoft.com/office/drawing/2010/main" w="9525">
+                <a14:hiddenLine xmlns:a14="http://schemas.microsoft.com/office/drawing/2010/main" xmlns="" w="9525">
                   <a:solidFill>
                     <a:srgbClr val="000000"/>
                   </a:solidFill>
@@ -3725,7 +3749,7 @@
             </a:ln>
             <a:extLst>
               <a:ext uri="{91240B29-F687-4f45-9708-019B960494DF}">
-                <a14:hiddenLine xmlns="" xmlns:a14="http://schemas.microsoft.com/office/drawing/2010/main" w="9525">
+                <a14:hiddenLine xmlns:a14="http://schemas.microsoft.com/office/drawing/2010/main" xmlns="" w="9525">
                   <a:solidFill>
                     <a:srgbClr val="000000"/>
                   </a:solidFill>
@@ -3815,7 +3839,7 @@
             </a:ln>
             <a:extLst>
               <a:ext uri="{91240B29-F687-4f45-9708-019B960494DF}">
-                <a14:hiddenLine xmlns="" xmlns:a14="http://schemas.microsoft.com/office/drawing/2010/main" w="9525">
+                <a14:hiddenLine xmlns:a14="http://schemas.microsoft.com/office/drawing/2010/main" xmlns="" w="9525">
                   <a:solidFill>
                     <a:srgbClr val="000000"/>
                   </a:solidFill>
@@ -3880,7 +3904,7 @@
             </a:ln>
             <a:extLst>
               <a:ext uri="{91240B29-F687-4f45-9708-019B960494DF}">
-                <a14:hiddenLine xmlns="" xmlns:a14="http://schemas.microsoft.com/office/drawing/2010/main" w="9525">
+                <a14:hiddenLine xmlns:a14="http://schemas.microsoft.com/office/drawing/2010/main" xmlns="" w="9525">
                   <a:solidFill>
                     <a:srgbClr val="000000"/>
                   </a:solidFill>
@@ -3942,7 +3966,7 @@
             </a:ln>
             <a:extLst>
               <a:ext uri="{91240B29-F687-4f45-9708-019B960494DF}">
-                <a14:hiddenLine xmlns="" xmlns:a14="http://schemas.microsoft.com/office/drawing/2010/main" w="9525">
+                <a14:hiddenLine xmlns:a14="http://schemas.microsoft.com/office/drawing/2010/main" xmlns="" w="9525">
                   <a:solidFill>
                     <a:srgbClr val="000000"/>
                   </a:solidFill>
@@ -4032,7 +4056,7 @@
             </a:ln>
             <a:extLst>
               <a:ext uri="{91240B29-F687-4f45-9708-019B960494DF}">
-                <a14:hiddenLine xmlns="" xmlns:a14="http://schemas.microsoft.com/office/drawing/2010/main" w="9525">
+                <a14:hiddenLine xmlns:a14="http://schemas.microsoft.com/office/drawing/2010/main" xmlns="" w="9525">
                   <a:solidFill>
                     <a:srgbClr val="000000"/>
                   </a:solidFill>
@@ -4122,7 +4146,7 @@
             </a:ln>
             <a:extLst>
               <a:ext uri="{91240B29-F687-4f45-9708-019B960494DF}">
-                <a14:hiddenLine xmlns="" xmlns:a14="http://schemas.microsoft.com/office/drawing/2010/main" w="9525">
+                <a14:hiddenLine xmlns:a14="http://schemas.microsoft.com/office/drawing/2010/main" xmlns="" w="9525">
                   <a:solidFill>
                     <a:srgbClr val="000000"/>
                   </a:solidFill>
@@ -4184,7 +4208,7 @@
             </a:ln>
             <a:extLst>
               <a:ext uri="{91240B29-F687-4f45-9708-019B960494DF}">
-                <a14:hiddenLine xmlns="" xmlns:a14="http://schemas.microsoft.com/office/drawing/2010/main" w="9525">
+                <a14:hiddenLine xmlns:a14="http://schemas.microsoft.com/office/drawing/2010/main" xmlns="" w="9525">
                   <a:solidFill>
                     <a:srgbClr val="000000"/>
                   </a:solidFill>
@@ -4304,7 +4328,7 @@
             </a:ln>
             <a:extLst>
               <a:ext uri="{91240B29-F687-4f45-9708-019B960494DF}">
-                <a14:hiddenLine xmlns="" xmlns:a14="http://schemas.microsoft.com/office/drawing/2010/main" w="9525">
+                <a14:hiddenLine xmlns:a14="http://schemas.microsoft.com/office/drawing/2010/main" xmlns="" w="9525">
                   <a:solidFill>
                     <a:srgbClr val="000000"/>
                   </a:solidFill>
@@ -4372,7 +4396,7 @@
             </a:ln>
             <a:extLst>
               <a:ext uri="{91240B29-F687-4f45-9708-019B960494DF}">
-                <a14:hiddenLine xmlns="" xmlns:a14="http://schemas.microsoft.com/office/drawing/2010/main" w="9525">
+                <a14:hiddenLine xmlns:a14="http://schemas.microsoft.com/office/drawing/2010/main" xmlns="" w="9525">
                   <a:solidFill>
                     <a:srgbClr val="000000"/>
                   </a:solidFill>
@@ -4462,7 +4486,7 @@
             </a:ln>
             <a:extLst>
               <a:ext uri="{91240B29-F687-4f45-9708-019B960494DF}">
-                <a14:hiddenLine xmlns="" xmlns:a14="http://schemas.microsoft.com/office/drawing/2010/main" w="9525">
+                <a14:hiddenLine xmlns:a14="http://schemas.microsoft.com/office/drawing/2010/main" xmlns="" w="9525">
                   <a:solidFill>
                     <a:srgbClr val="000000"/>
                   </a:solidFill>
@@ -9184,7 +9208,7 @@
           <a:noFill/>
           <a:extLst>
             <a:ext uri="{909E8E84-426E-40dd-AFC4-6F175D3DCCD1}">
-              <a14:hiddenFill xmlns="" xmlns:a14="http://schemas.microsoft.com/office/drawing/2010/main">
+              <a14:hiddenFill xmlns:a14="http://schemas.microsoft.com/office/drawing/2010/main" xmlns="">
                 <a:solidFill>
                   <a:srgbClr val="FFFFFF"/>
                 </a:solidFill>
@@ -9258,7 +9282,7 @@
               </a:ln>
               <a:extLst>
                 <a:ext uri="{91240B29-F687-4f45-9708-019B960494DF}">
-                  <a14:hiddenLine xmlns="" xmlns:a14="http://schemas.microsoft.com/office/drawing/2010/main" w="9525">
+                  <a14:hiddenLine xmlns:a14="http://schemas.microsoft.com/office/drawing/2010/main" xmlns="" w="9525">
                     <a:solidFill>
                       <a:srgbClr val="000000"/>
                     </a:solidFill>
@@ -9348,7 +9372,7 @@
               </a:ln>
               <a:extLst>
                 <a:ext uri="{91240B29-F687-4f45-9708-019B960494DF}">
-                  <a14:hiddenLine xmlns="" xmlns:a14="http://schemas.microsoft.com/office/drawing/2010/main" w="9525">
+                  <a14:hiddenLine xmlns:a14="http://schemas.microsoft.com/office/drawing/2010/main" xmlns="" w="9525">
                     <a:solidFill>
                       <a:srgbClr val="000000"/>
                     </a:solidFill>
@@ -9438,7 +9462,7 @@
               </a:ln>
               <a:extLst>
                 <a:ext uri="{91240B29-F687-4f45-9708-019B960494DF}">
-                  <a14:hiddenLine xmlns="" xmlns:a14="http://schemas.microsoft.com/office/drawing/2010/main" w="9525">
+                  <a14:hiddenLine xmlns:a14="http://schemas.microsoft.com/office/drawing/2010/main" xmlns="" w="9525">
                     <a:solidFill>
                       <a:srgbClr val="000000"/>
                     </a:solidFill>
@@ -9500,7 +9524,7 @@
               </a:ln>
               <a:extLst>
                 <a:ext uri="{91240B29-F687-4f45-9708-019B960494DF}">
-                  <a14:hiddenLine xmlns="" xmlns:a14="http://schemas.microsoft.com/office/drawing/2010/main" w="9525">
+                  <a14:hiddenLine xmlns:a14="http://schemas.microsoft.com/office/drawing/2010/main" xmlns="" w="9525">
                     <a:solidFill>
                       <a:srgbClr val="000000"/>
                     </a:solidFill>
@@ -9590,7 +9614,7 @@
               </a:ln>
               <a:extLst>
                 <a:ext uri="{91240B29-F687-4f45-9708-019B960494DF}">
-                  <a14:hiddenLine xmlns="" xmlns:a14="http://schemas.microsoft.com/office/drawing/2010/main" w="9525">
+                  <a14:hiddenLine xmlns:a14="http://schemas.microsoft.com/office/drawing/2010/main" xmlns="" w="9525">
                     <a:solidFill>
                       <a:srgbClr val="000000"/>
                     </a:solidFill>
@@ -9652,7 +9676,7 @@
               </a:ln>
               <a:extLst>
                 <a:ext uri="{91240B29-F687-4f45-9708-019B960494DF}">
-                  <a14:hiddenLine xmlns="" xmlns:a14="http://schemas.microsoft.com/office/drawing/2010/main" w="9525">
+                  <a14:hiddenLine xmlns:a14="http://schemas.microsoft.com/office/drawing/2010/main" xmlns="" w="9525">
                     <a:solidFill>
                       <a:srgbClr val="000000"/>
                     </a:solidFill>
@@ -9714,7 +9738,7 @@
               </a:ln>
               <a:extLst>
                 <a:ext uri="{91240B29-F687-4f45-9708-019B960494DF}">
-                  <a14:hiddenLine xmlns="" xmlns:a14="http://schemas.microsoft.com/office/drawing/2010/main" w="9525">
+                  <a14:hiddenLine xmlns:a14="http://schemas.microsoft.com/office/drawing/2010/main" xmlns="" w="9525">
                     <a:solidFill>
                       <a:srgbClr val="000000"/>
                     </a:solidFill>
@@ -9804,7 +9828,7 @@
               </a:ln>
               <a:extLst>
                 <a:ext uri="{91240B29-F687-4f45-9708-019B960494DF}">
-                  <a14:hiddenLine xmlns="" xmlns:a14="http://schemas.microsoft.com/office/drawing/2010/main" w="9525">
+                  <a14:hiddenLine xmlns:a14="http://schemas.microsoft.com/office/drawing/2010/main" xmlns="" w="9525">
                     <a:solidFill>
                       <a:srgbClr val="000000"/>
                     </a:solidFill>
@@ -9894,7 +9918,7 @@
               </a:ln>
               <a:extLst>
                 <a:ext uri="{91240B29-F687-4f45-9708-019B960494DF}">
-                  <a14:hiddenLine xmlns="" xmlns:a14="http://schemas.microsoft.com/office/drawing/2010/main" w="9525">
+                  <a14:hiddenLine xmlns:a14="http://schemas.microsoft.com/office/drawing/2010/main" xmlns="" w="9525">
                     <a:solidFill>
                       <a:srgbClr val="000000"/>
                     </a:solidFill>
@@ -9956,7 +9980,7 @@
               </a:ln>
               <a:extLst>
                 <a:ext uri="{91240B29-F687-4f45-9708-019B960494DF}">
-                  <a14:hiddenLine xmlns="" xmlns:a14="http://schemas.microsoft.com/office/drawing/2010/main" w="9525">
+                  <a14:hiddenLine xmlns:a14="http://schemas.microsoft.com/office/drawing/2010/main" xmlns="" w="9525">
                     <a:solidFill>
                       <a:srgbClr val="000000"/>
                     </a:solidFill>
@@ -10066,7 +10090,7 @@
               </a:ln>
               <a:extLst>
                 <a:ext uri="{91240B29-F687-4f45-9708-019B960494DF}">
-                  <a14:hiddenLine xmlns="" xmlns:a14="http://schemas.microsoft.com/office/drawing/2010/main" w="9525">
+                  <a14:hiddenLine xmlns:a14="http://schemas.microsoft.com/office/drawing/2010/main" xmlns="" w="9525">
                     <a:solidFill>
                       <a:srgbClr val="000000"/>
                     </a:solidFill>
@@ -10150,7 +10174,7 @@
               </a:ln>
               <a:extLst>
                 <a:ext uri="{91240B29-F687-4f45-9708-019B960494DF}">
-                  <a14:hiddenLine xmlns="" xmlns:a14="http://schemas.microsoft.com/office/drawing/2010/main" w="9525">
+                  <a14:hiddenLine xmlns:a14="http://schemas.microsoft.com/office/drawing/2010/main" xmlns="" w="9525">
                     <a:solidFill>
                       <a:srgbClr val="000000"/>
                     </a:solidFill>
@@ -10212,7 +10236,7 @@
               </a:ln>
               <a:extLst>
                 <a:ext uri="{91240B29-F687-4f45-9708-019B960494DF}">
-                  <a14:hiddenLine xmlns="" xmlns:a14="http://schemas.microsoft.com/office/drawing/2010/main" w="9525">
+                  <a14:hiddenLine xmlns:a14="http://schemas.microsoft.com/office/drawing/2010/main" xmlns="" w="9525">
                     <a:solidFill>
                       <a:srgbClr val="000000"/>
                     </a:solidFill>
@@ -10274,7 +10298,7 @@
               </a:ln>
               <a:extLst>
                 <a:ext uri="{91240B29-F687-4f45-9708-019B960494DF}">
-                  <a14:hiddenLine xmlns="" xmlns:a14="http://schemas.microsoft.com/office/drawing/2010/main" w="9525">
+                  <a14:hiddenLine xmlns:a14="http://schemas.microsoft.com/office/drawing/2010/main" xmlns="" w="9525">
                     <a:solidFill>
                       <a:srgbClr val="000000"/>
                     </a:solidFill>
@@ -10364,7 +10388,7 @@
               </a:ln>
               <a:extLst>
                 <a:ext uri="{91240B29-F687-4f45-9708-019B960494DF}">
-                  <a14:hiddenLine xmlns="" xmlns:a14="http://schemas.microsoft.com/office/drawing/2010/main" w="9525">
+                  <a14:hiddenLine xmlns:a14="http://schemas.microsoft.com/office/drawing/2010/main" xmlns="" w="9525">
                     <a:solidFill>
                       <a:srgbClr val="000000"/>
                     </a:solidFill>
@@ -10398,7 +10422,7 @@
               </a:ln>
               <a:extLst>
                 <a:ext uri="{91240B29-F687-4f45-9708-019B960494DF}">
-                  <a14:hiddenLine xmlns="" xmlns:a14="http://schemas.microsoft.com/office/drawing/2010/main" w="9525">
+                  <a14:hiddenLine xmlns:a14="http://schemas.microsoft.com/office/drawing/2010/main" xmlns="" w="9525">
                     <a:solidFill>
                       <a:srgbClr val="000000"/>
                     </a:solidFill>
@@ -10463,7 +10487,7 @@
               </a:ln>
               <a:extLst>
                 <a:ext uri="{91240B29-F687-4f45-9708-019B960494DF}">
-                  <a14:hiddenLine xmlns="" xmlns:a14="http://schemas.microsoft.com/office/drawing/2010/main" w="9525">
+                  <a14:hiddenLine xmlns:a14="http://schemas.microsoft.com/office/drawing/2010/main" xmlns="" w="9525">
                     <a:solidFill>
                       <a:srgbClr val="000000"/>
                     </a:solidFill>
@@ -10553,7 +10577,7 @@
               </a:ln>
               <a:extLst>
                 <a:ext uri="{91240B29-F687-4f45-9708-019B960494DF}">
-                  <a14:hiddenLine xmlns="" xmlns:a14="http://schemas.microsoft.com/office/drawing/2010/main" w="9525">
+                  <a14:hiddenLine xmlns:a14="http://schemas.microsoft.com/office/drawing/2010/main" xmlns="" w="9525">
                     <a:solidFill>
                       <a:srgbClr val="000000"/>
                     </a:solidFill>
@@ -10615,7 +10639,7 @@
               </a:ln>
               <a:extLst>
                 <a:ext uri="{91240B29-F687-4f45-9708-019B960494DF}">
-                  <a14:hiddenLine xmlns="" xmlns:a14="http://schemas.microsoft.com/office/drawing/2010/main" w="9525">
+                  <a14:hiddenLine xmlns:a14="http://schemas.microsoft.com/office/drawing/2010/main" xmlns="" w="9525">
                     <a:solidFill>
                       <a:srgbClr val="000000"/>
                     </a:solidFill>
@@ -10705,7 +10729,7 @@
               </a:ln>
               <a:extLst>
                 <a:ext uri="{91240B29-F687-4f45-9708-019B960494DF}">
-                  <a14:hiddenLine xmlns="" xmlns:a14="http://schemas.microsoft.com/office/drawing/2010/main" w="9525">
+                  <a14:hiddenLine xmlns:a14="http://schemas.microsoft.com/office/drawing/2010/main" xmlns="" w="9525">
                     <a:solidFill>
                       <a:srgbClr val="000000"/>
                     </a:solidFill>
@@ -10770,7 +10794,7 @@
               </a:ln>
               <a:extLst>
                 <a:ext uri="{91240B29-F687-4f45-9708-019B960494DF}">
-                  <a14:hiddenLine xmlns="" xmlns:a14="http://schemas.microsoft.com/office/drawing/2010/main" w="9525">
+                  <a14:hiddenLine xmlns:a14="http://schemas.microsoft.com/office/drawing/2010/main" xmlns="" w="9525">
                     <a:solidFill>
                       <a:srgbClr val="000000"/>
                     </a:solidFill>
@@ -10832,7 +10856,7 @@
               </a:ln>
               <a:extLst>
                 <a:ext uri="{91240B29-F687-4f45-9708-019B960494DF}">
-                  <a14:hiddenLine xmlns="" xmlns:a14="http://schemas.microsoft.com/office/drawing/2010/main" w="9525">
+                  <a14:hiddenLine xmlns:a14="http://schemas.microsoft.com/office/drawing/2010/main" xmlns="" w="9525">
                     <a:solidFill>
                       <a:srgbClr val="000000"/>
                     </a:solidFill>
@@ -10922,7 +10946,7 @@
               </a:ln>
               <a:extLst>
                 <a:ext uri="{91240B29-F687-4f45-9708-019B960494DF}">
-                  <a14:hiddenLine xmlns="" xmlns:a14="http://schemas.microsoft.com/office/drawing/2010/main" w="9525">
+                  <a14:hiddenLine xmlns:a14="http://schemas.microsoft.com/office/drawing/2010/main" xmlns="" w="9525">
                     <a:solidFill>
                       <a:srgbClr val="000000"/>
                     </a:solidFill>
@@ -11012,7 +11036,7 @@
               </a:ln>
               <a:extLst>
                 <a:ext uri="{91240B29-F687-4f45-9708-019B960494DF}">
-                  <a14:hiddenLine xmlns="" xmlns:a14="http://schemas.microsoft.com/office/drawing/2010/main" w="9525">
+                  <a14:hiddenLine xmlns:a14="http://schemas.microsoft.com/office/drawing/2010/main" xmlns="" w="9525">
                     <a:solidFill>
                       <a:srgbClr val="000000"/>
                     </a:solidFill>
@@ -11077,7 +11101,7 @@
               </a:ln>
               <a:extLst>
                 <a:ext uri="{91240B29-F687-4f45-9708-019B960494DF}">
-                  <a14:hiddenLine xmlns="" xmlns:a14="http://schemas.microsoft.com/office/drawing/2010/main" w="9525">
+                  <a14:hiddenLine xmlns:a14="http://schemas.microsoft.com/office/drawing/2010/main" xmlns="" w="9525">
                     <a:solidFill>
                       <a:srgbClr val="000000"/>
                     </a:solidFill>
@@ -11197,7 +11221,7 @@
               </a:ln>
               <a:extLst>
                 <a:ext uri="{91240B29-F687-4f45-9708-019B960494DF}">
-                  <a14:hiddenLine xmlns="" xmlns:a14="http://schemas.microsoft.com/office/drawing/2010/main" w="9525">
+                  <a14:hiddenLine xmlns:a14="http://schemas.microsoft.com/office/drawing/2010/main" xmlns="" w="9525">
                     <a:solidFill>
                       <a:srgbClr val="000000"/>
                     </a:solidFill>
@@ -11295,7 +11319,7 @@
               </a:ln>
               <a:extLst>
                 <a:ext uri="{91240B29-F687-4f45-9708-019B960494DF}">
-                  <a14:hiddenLine xmlns="" xmlns:a14="http://schemas.microsoft.com/office/drawing/2010/main" w="9525">
+                  <a14:hiddenLine xmlns:a14="http://schemas.microsoft.com/office/drawing/2010/main" xmlns="" w="9525">
                     <a:solidFill>
                       <a:srgbClr val="000000"/>
                     </a:solidFill>
@@ -11410,7 +11434,7 @@
               </a:ln>
               <a:extLst>
                 <a:ext uri="{91240B29-F687-4f45-9708-019B960494DF}">
-                  <a14:hiddenLine xmlns="" xmlns:a14="http://schemas.microsoft.com/office/drawing/2010/main" w="9525">
+                  <a14:hiddenLine xmlns:a14="http://schemas.microsoft.com/office/drawing/2010/main" xmlns="" w="9525">
                     <a:solidFill>
                       <a:srgbClr val="000000"/>
                     </a:solidFill>
@@ -11500,7 +11524,7 @@
               </a:ln>
               <a:extLst>
                 <a:ext uri="{91240B29-F687-4f45-9708-019B960494DF}">
-                  <a14:hiddenLine xmlns="" xmlns:a14="http://schemas.microsoft.com/office/drawing/2010/main" w="9525">
+                  <a14:hiddenLine xmlns:a14="http://schemas.microsoft.com/office/drawing/2010/main" xmlns="" w="9525">
                     <a:solidFill>
                       <a:srgbClr val="000000"/>
                     </a:solidFill>
@@ -11565,7 +11589,7 @@
               </a:ln>
               <a:extLst>
                 <a:ext uri="{91240B29-F687-4f45-9708-019B960494DF}">
-                  <a14:hiddenLine xmlns="" xmlns:a14="http://schemas.microsoft.com/office/drawing/2010/main" w="9525">
+                  <a14:hiddenLine xmlns:a14="http://schemas.microsoft.com/office/drawing/2010/main" xmlns="" w="9525">
                     <a:solidFill>
                       <a:srgbClr val="000000"/>
                     </a:solidFill>
@@ -11655,7 +11679,7 @@
               </a:ln>
               <a:extLst>
                 <a:ext uri="{91240B29-F687-4f45-9708-019B960494DF}">
-                  <a14:hiddenLine xmlns="" xmlns:a14="http://schemas.microsoft.com/office/drawing/2010/main" w="9525">
+                  <a14:hiddenLine xmlns:a14="http://schemas.microsoft.com/office/drawing/2010/main" xmlns="" w="9525">
                     <a:solidFill>
                       <a:srgbClr val="000000"/>
                     </a:solidFill>
@@ -11723,7 +11747,7 @@
               </a:ln>
               <a:extLst>
                 <a:ext uri="{91240B29-F687-4f45-9708-019B960494DF}">
-                  <a14:hiddenLine xmlns="" xmlns:a14="http://schemas.microsoft.com/office/drawing/2010/main" w="9525">
+                  <a14:hiddenLine xmlns:a14="http://schemas.microsoft.com/office/drawing/2010/main" xmlns="" w="9525">
                     <a:solidFill>
                       <a:srgbClr val="000000"/>
                     </a:solidFill>
@@ -11813,7 +11837,7 @@
               </a:ln>
               <a:extLst>
                 <a:ext uri="{91240B29-F687-4f45-9708-019B960494DF}">
-                  <a14:hiddenLine xmlns="" xmlns:a14="http://schemas.microsoft.com/office/drawing/2010/main" w="9525">
+                  <a14:hiddenLine xmlns:a14="http://schemas.microsoft.com/office/drawing/2010/main" xmlns="" w="9525">
                     <a:solidFill>
                       <a:srgbClr val="000000"/>
                     </a:solidFill>
@@ -11881,7 +11905,7 @@
               </a:ln>
               <a:extLst>
                 <a:ext uri="{91240B29-F687-4f45-9708-019B960494DF}">
-                  <a14:hiddenLine xmlns="" xmlns:a14="http://schemas.microsoft.com/office/drawing/2010/main" w="9525">
+                  <a14:hiddenLine xmlns:a14="http://schemas.microsoft.com/office/drawing/2010/main" xmlns="" w="9525">
                     <a:solidFill>
                       <a:srgbClr val="000000"/>
                     </a:solidFill>
@@ -11971,7 +11995,7 @@
               </a:ln>
               <a:extLst>
                 <a:ext uri="{91240B29-F687-4f45-9708-019B960494DF}">
-                  <a14:hiddenLine xmlns="" xmlns:a14="http://schemas.microsoft.com/office/drawing/2010/main" w="9525">
+                  <a14:hiddenLine xmlns:a14="http://schemas.microsoft.com/office/drawing/2010/main" xmlns="" w="9525">
                     <a:solidFill>
                       <a:srgbClr val="000000"/>
                     </a:solidFill>
@@ -12005,7 +12029,7 @@
               </a:ln>
               <a:extLst>
                 <a:ext uri="{91240B29-F687-4f45-9708-019B960494DF}">
-                  <a14:hiddenLine xmlns="" xmlns:a14="http://schemas.microsoft.com/office/drawing/2010/main" w="9525">
+                  <a14:hiddenLine xmlns:a14="http://schemas.microsoft.com/office/drawing/2010/main" xmlns="" w="9525">
                     <a:solidFill>
                       <a:srgbClr val="000000"/>
                     </a:solidFill>
@@ -13203,8 +13227,20 @@
               <a:buNone/>
             </a:pPr>
             <a:r>
+              <a:rPr lang="en-US"/>
+              <a:t>1</a:t>
+            </a:r>
+            <a:r>
               <a:rPr lang="en-US" dirty="0"/>
-              <a:t>9 hours to fully run all trials</a:t>
+              <a:t>2</a:t>
+            </a:r>
+            <a:r>
+              <a:rPr lang="en-US"/>
+              <a:t> </a:t>
+            </a:r>
+            <a:r>
+              <a:rPr lang="en-US" dirty="0"/>
+              <a:t>hours to fully run all trials</a:t>
             </a:r>
           </a:p>
         </p:txBody>

</xml_diff>

<commit_message>
Modified presentation to give application examples of sorting algorithm.
</commit_message>
<xml_diff>
--- a/FinalPresentation.pptx
+++ b/FinalPresentation.pptx
@@ -400,7 +400,7 @@
           <a:noFill/>
           <a:extLst>
             <a:ext uri="{909E8E84-426E-40dd-AFC4-6F175D3DCCD1}">
-              <a14:hiddenFill xmlns:a14="http://schemas.microsoft.com/office/drawing/2010/main" xmlns="">
+              <a14:hiddenFill xmlns="" xmlns:a14="http://schemas.microsoft.com/office/drawing/2010/main">
                 <a:solidFill>
                   <a:srgbClr val="FFFFFF"/>
                 </a:solidFill>
@@ -460,7 +460,7 @@
             </a:ln>
             <a:extLst>
               <a:ext uri="{91240B29-F687-4f45-9708-019B960494DF}">
-                <a14:hiddenLine xmlns:a14="http://schemas.microsoft.com/office/drawing/2010/main" xmlns="" w="9525">
+                <a14:hiddenLine xmlns="" xmlns:a14="http://schemas.microsoft.com/office/drawing/2010/main" w="9525">
                   <a:solidFill>
                     <a:srgbClr val="000000"/>
                   </a:solidFill>
@@ -550,7 +550,7 @@
             </a:ln>
             <a:extLst>
               <a:ext uri="{91240B29-F687-4f45-9708-019B960494DF}">
-                <a14:hiddenLine xmlns:a14="http://schemas.microsoft.com/office/drawing/2010/main" xmlns="" w="9525">
+                <a14:hiddenLine xmlns="" xmlns:a14="http://schemas.microsoft.com/office/drawing/2010/main" w="9525">
                   <a:solidFill>
                     <a:srgbClr val="000000"/>
                   </a:solidFill>
@@ -640,7 +640,7 @@
             </a:ln>
             <a:extLst>
               <a:ext uri="{91240B29-F687-4f45-9708-019B960494DF}">
-                <a14:hiddenLine xmlns:a14="http://schemas.microsoft.com/office/drawing/2010/main" xmlns="" w="9525">
+                <a14:hiddenLine xmlns="" xmlns:a14="http://schemas.microsoft.com/office/drawing/2010/main" w="9525">
                   <a:solidFill>
                     <a:srgbClr val="000000"/>
                   </a:solidFill>
@@ -674,7 +674,7 @@
             </a:ln>
             <a:extLst>
               <a:ext uri="{91240B29-F687-4f45-9708-019B960494DF}">
-                <a14:hiddenLine xmlns:a14="http://schemas.microsoft.com/office/drawing/2010/main" xmlns="" w="9525">
+                <a14:hiddenLine xmlns="" xmlns:a14="http://schemas.microsoft.com/office/drawing/2010/main" w="9525">
                   <a:solidFill>
                     <a:srgbClr val="000000"/>
                   </a:solidFill>
@@ -764,7 +764,7 @@
             </a:ln>
             <a:extLst>
               <a:ext uri="{91240B29-F687-4f45-9708-019B960494DF}">
-                <a14:hiddenLine xmlns:a14="http://schemas.microsoft.com/office/drawing/2010/main" xmlns="" w="9525">
+                <a14:hiddenLine xmlns="" xmlns:a14="http://schemas.microsoft.com/office/drawing/2010/main" w="9525">
                   <a:solidFill>
                     <a:srgbClr val="000000"/>
                   </a:solidFill>
@@ -826,7 +826,7 @@
             </a:ln>
             <a:extLst>
               <a:ext uri="{91240B29-F687-4f45-9708-019B960494DF}">
-                <a14:hiddenLine xmlns:a14="http://schemas.microsoft.com/office/drawing/2010/main" xmlns="" w="9525">
+                <a14:hiddenLine xmlns="" xmlns:a14="http://schemas.microsoft.com/office/drawing/2010/main" w="9525">
                   <a:solidFill>
                     <a:srgbClr val="000000"/>
                   </a:solidFill>
@@ -888,7 +888,7 @@
             </a:ln>
             <a:extLst>
               <a:ext uri="{91240B29-F687-4f45-9708-019B960494DF}">
-                <a14:hiddenLine xmlns:a14="http://schemas.microsoft.com/office/drawing/2010/main" xmlns="" w="9525">
+                <a14:hiddenLine xmlns="" xmlns:a14="http://schemas.microsoft.com/office/drawing/2010/main" w="9525">
                   <a:solidFill>
                     <a:srgbClr val="000000"/>
                   </a:solidFill>
@@ -978,7 +978,7 @@
             </a:ln>
             <a:extLst>
               <a:ext uri="{91240B29-F687-4f45-9708-019B960494DF}">
-                <a14:hiddenLine xmlns:a14="http://schemas.microsoft.com/office/drawing/2010/main" xmlns="" w="9525">
+                <a14:hiddenLine xmlns="" xmlns:a14="http://schemas.microsoft.com/office/drawing/2010/main" w="9525">
                   <a:solidFill>
                     <a:srgbClr val="000000"/>
                   </a:solidFill>
@@ -1040,7 +1040,7 @@
             </a:ln>
             <a:extLst>
               <a:ext uri="{91240B29-F687-4f45-9708-019B960494DF}">
-                <a14:hiddenLine xmlns:a14="http://schemas.microsoft.com/office/drawing/2010/main" xmlns="" w="9525">
+                <a14:hiddenLine xmlns="" xmlns:a14="http://schemas.microsoft.com/office/drawing/2010/main" w="9525">
                   <a:solidFill>
                     <a:srgbClr val="000000"/>
                   </a:solidFill>
@@ -1102,7 +1102,7 @@
             </a:ln>
             <a:extLst>
               <a:ext uri="{91240B29-F687-4f45-9708-019B960494DF}">
-                <a14:hiddenLine xmlns:a14="http://schemas.microsoft.com/office/drawing/2010/main" xmlns="" w="9525">
+                <a14:hiddenLine xmlns="" xmlns:a14="http://schemas.microsoft.com/office/drawing/2010/main" w="9525">
                   <a:solidFill>
                     <a:srgbClr val="000000"/>
                   </a:solidFill>
@@ -1192,7 +1192,7 @@
             </a:ln>
             <a:extLst>
               <a:ext uri="{91240B29-F687-4f45-9708-019B960494DF}">
-                <a14:hiddenLine xmlns:a14="http://schemas.microsoft.com/office/drawing/2010/main" xmlns="" w="9525">
+                <a14:hiddenLine xmlns="" xmlns:a14="http://schemas.microsoft.com/office/drawing/2010/main" w="9525">
                   <a:solidFill>
                     <a:srgbClr val="000000"/>
                   </a:solidFill>
@@ -1282,7 +1282,7 @@
             </a:ln>
             <a:extLst>
               <a:ext uri="{91240B29-F687-4f45-9708-019B960494DF}">
-                <a14:hiddenLine xmlns:a14="http://schemas.microsoft.com/office/drawing/2010/main" xmlns="" w="9525">
+                <a14:hiddenLine xmlns="" xmlns:a14="http://schemas.microsoft.com/office/drawing/2010/main" w="9525">
                   <a:solidFill>
                     <a:srgbClr val="000000"/>
                   </a:solidFill>
@@ -1344,7 +1344,7 @@
             </a:ln>
             <a:extLst>
               <a:ext uri="{91240B29-F687-4f45-9708-019B960494DF}">
-                <a14:hiddenLine xmlns:a14="http://schemas.microsoft.com/office/drawing/2010/main" xmlns="" w="9525">
+                <a14:hiddenLine xmlns="" xmlns:a14="http://schemas.microsoft.com/office/drawing/2010/main" w="9525">
                   <a:solidFill>
                     <a:srgbClr val="000000"/>
                   </a:solidFill>
@@ -1454,7 +1454,7 @@
             </a:ln>
             <a:extLst>
               <a:ext uri="{91240B29-F687-4f45-9708-019B960494DF}">
-                <a14:hiddenLine xmlns:a14="http://schemas.microsoft.com/office/drawing/2010/main" xmlns="" w="9525">
+                <a14:hiddenLine xmlns="" xmlns:a14="http://schemas.microsoft.com/office/drawing/2010/main" w="9525">
                   <a:solidFill>
                     <a:srgbClr val="000000"/>
                   </a:solidFill>
@@ -1516,7 +1516,7 @@
             </a:ln>
             <a:extLst>
               <a:ext uri="{91240B29-F687-4f45-9708-019B960494DF}">
-                <a14:hiddenLine xmlns:a14="http://schemas.microsoft.com/office/drawing/2010/main" xmlns="" w="9525">
+                <a14:hiddenLine xmlns="" xmlns:a14="http://schemas.microsoft.com/office/drawing/2010/main" w="9525">
                   <a:solidFill>
                     <a:srgbClr val="000000"/>
                   </a:solidFill>
@@ -1606,7 +1606,7 @@
             </a:ln>
             <a:extLst>
               <a:ext uri="{91240B29-F687-4f45-9708-019B960494DF}">
-                <a14:hiddenLine xmlns:a14="http://schemas.microsoft.com/office/drawing/2010/main" xmlns="" w="9525">
+                <a14:hiddenLine xmlns="" xmlns:a14="http://schemas.microsoft.com/office/drawing/2010/main" w="9525">
                   <a:solidFill>
                     <a:srgbClr val="000000"/>
                   </a:solidFill>
@@ -1696,7 +1696,7 @@
             </a:ln>
             <a:extLst>
               <a:ext uri="{91240B29-F687-4f45-9708-019B960494DF}">
-                <a14:hiddenLine xmlns:a14="http://schemas.microsoft.com/office/drawing/2010/main" xmlns="" w="9525">
+                <a14:hiddenLine xmlns="" xmlns:a14="http://schemas.microsoft.com/office/drawing/2010/main" w="9525">
                   <a:solidFill>
                     <a:srgbClr val="000000"/>
                   </a:solidFill>
@@ -1758,7 +1758,7 @@
             </a:ln>
             <a:extLst>
               <a:ext uri="{91240B29-F687-4f45-9708-019B960494DF}">
-                <a14:hiddenLine xmlns:a14="http://schemas.microsoft.com/office/drawing/2010/main" xmlns="" w="9525">
+                <a14:hiddenLine xmlns="" xmlns:a14="http://schemas.microsoft.com/office/drawing/2010/main" w="9525">
                   <a:solidFill>
                     <a:srgbClr val="000000"/>
                   </a:solidFill>
@@ -1848,7 +1848,7 @@
             </a:ln>
             <a:extLst>
               <a:ext uri="{91240B29-F687-4f45-9708-019B960494DF}">
-                <a14:hiddenLine xmlns:a14="http://schemas.microsoft.com/office/drawing/2010/main" xmlns="" w="9525">
+                <a14:hiddenLine xmlns="" xmlns:a14="http://schemas.microsoft.com/office/drawing/2010/main" w="9525">
                   <a:solidFill>
                     <a:srgbClr val="000000"/>
                   </a:solidFill>
@@ -1938,7 +1938,7 @@
             </a:ln>
             <a:extLst>
               <a:ext uri="{91240B29-F687-4f45-9708-019B960494DF}">
-                <a14:hiddenLine xmlns:a14="http://schemas.microsoft.com/office/drawing/2010/main" xmlns="" w="9525">
+                <a14:hiddenLine xmlns="" xmlns:a14="http://schemas.microsoft.com/office/drawing/2010/main" w="9525">
                   <a:solidFill>
                     <a:srgbClr val="000000"/>
                   </a:solidFill>
@@ -1994,7 +1994,7 @@
             </a:ln>
             <a:extLst>
               <a:ext uri="{91240B29-F687-4f45-9708-019B960494DF}">
-                <a14:hiddenLine xmlns:a14="http://schemas.microsoft.com/office/drawing/2010/main" xmlns="" w="9525">
+                <a14:hiddenLine xmlns="" xmlns:a14="http://schemas.microsoft.com/office/drawing/2010/main" w="9525">
                   <a:solidFill>
                     <a:srgbClr val="000000"/>
                   </a:solidFill>
@@ -2084,7 +2084,7 @@
             </a:ln>
             <a:extLst>
               <a:ext uri="{91240B29-F687-4f45-9708-019B960494DF}">
-                <a14:hiddenLine xmlns:a14="http://schemas.microsoft.com/office/drawing/2010/main" xmlns="" w="9525">
+                <a14:hiddenLine xmlns="" xmlns:a14="http://schemas.microsoft.com/office/drawing/2010/main" w="9525">
                   <a:solidFill>
                     <a:srgbClr val="000000"/>
                   </a:solidFill>
@@ -2140,7 +2140,7 @@
             </a:ln>
             <a:extLst>
               <a:ext uri="{91240B29-F687-4f45-9708-019B960494DF}">
-                <a14:hiddenLine xmlns:a14="http://schemas.microsoft.com/office/drawing/2010/main" xmlns="" w="9525">
+                <a14:hiddenLine xmlns="" xmlns:a14="http://schemas.microsoft.com/office/drawing/2010/main" w="9525">
                   <a:solidFill>
                     <a:srgbClr val="000000"/>
                   </a:solidFill>
@@ -2230,7 +2230,7 @@
             </a:ln>
             <a:extLst>
               <a:ext uri="{91240B29-F687-4f45-9708-019B960494DF}">
-                <a14:hiddenLine xmlns:a14="http://schemas.microsoft.com/office/drawing/2010/main" xmlns="" w="9525">
+                <a14:hiddenLine xmlns="" xmlns:a14="http://schemas.microsoft.com/office/drawing/2010/main" w="9525">
                   <a:solidFill>
                     <a:srgbClr val="000000"/>
                   </a:solidFill>
@@ -2298,7 +2298,7 @@
             </a:ln>
             <a:extLst>
               <a:ext uri="{91240B29-F687-4f45-9708-019B960494DF}">
-                <a14:hiddenLine xmlns:a14="http://schemas.microsoft.com/office/drawing/2010/main" xmlns="" w="9525">
+                <a14:hiddenLine xmlns="" xmlns:a14="http://schemas.microsoft.com/office/drawing/2010/main" w="9525">
                   <a:solidFill>
                     <a:srgbClr val="000000"/>
                   </a:solidFill>
@@ -2388,7 +2388,7 @@
             </a:ln>
             <a:extLst>
               <a:ext uri="{91240B29-F687-4f45-9708-019B960494DF}">
-                <a14:hiddenLine xmlns:a14="http://schemas.microsoft.com/office/drawing/2010/main" xmlns="" w="9525">
+                <a14:hiddenLine xmlns="" xmlns:a14="http://schemas.microsoft.com/office/drawing/2010/main" w="9525">
                   <a:solidFill>
                     <a:srgbClr val="000000"/>
                   </a:solidFill>
@@ -2456,7 +2456,7 @@
             </a:ln>
             <a:extLst>
               <a:ext uri="{91240B29-F687-4f45-9708-019B960494DF}">
-                <a14:hiddenLine xmlns:a14="http://schemas.microsoft.com/office/drawing/2010/main" xmlns="" w="9525">
+                <a14:hiddenLine xmlns="" xmlns:a14="http://schemas.microsoft.com/office/drawing/2010/main" w="9525">
                   <a:solidFill>
                     <a:srgbClr val="000000"/>
                   </a:solidFill>
@@ -2546,7 +2546,7 @@
             </a:ln>
             <a:extLst>
               <a:ext uri="{91240B29-F687-4f45-9708-019B960494DF}">
-                <a14:hiddenLine xmlns:a14="http://schemas.microsoft.com/office/drawing/2010/main" xmlns="" w="9525">
+                <a14:hiddenLine xmlns="" xmlns:a14="http://schemas.microsoft.com/office/drawing/2010/main" w="9525">
                   <a:solidFill>
                     <a:srgbClr val="000000"/>
                   </a:solidFill>
@@ -2580,7 +2580,7 @@
             </a:ln>
             <a:extLst>
               <a:ext uri="{91240B29-F687-4f45-9708-019B960494DF}">
-                <a14:hiddenLine xmlns:a14="http://schemas.microsoft.com/office/drawing/2010/main" xmlns="" w="9525">
+                <a14:hiddenLine xmlns="" xmlns:a14="http://schemas.microsoft.com/office/drawing/2010/main" w="9525">
                   <a:solidFill>
                     <a:srgbClr val="000000"/>
                   </a:solidFill>
@@ -2670,7 +2670,7 @@
             </a:ln>
             <a:extLst>
               <a:ext uri="{91240B29-F687-4f45-9708-019B960494DF}">
-                <a14:hiddenLine xmlns:a14="http://schemas.microsoft.com/office/drawing/2010/main" xmlns="" w="9525">
+                <a14:hiddenLine xmlns="" xmlns:a14="http://schemas.microsoft.com/office/drawing/2010/main" w="9525">
                   <a:solidFill>
                     <a:srgbClr val="000000"/>
                   </a:solidFill>
@@ -2732,7 +2732,7 @@
             </a:ln>
             <a:extLst>
               <a:ext uri="{91240B29-F687-4f45-9708-019B960494DF}">
-                <a14:hiddenLine xmlns:a14="http://schemas.microsoft.com/office/drawing/2010/main" xmlns="" w="9525">
+                <a14:hiddenLine xmlns="" xmlns:a14="http://schemas.microsoft.com/office/drawing/2010/main" w="9525">
                   <a:solidFill>
                     <a:srgbClr val="000000"/>
                   </a:solidFill>
@@ -2794,7 +2794,7 @@
             </a:ln>
             <a:extLst>
               <a:ext uri="{91240B29-F687-4f45-9708-019B960494DF}">
-                <a14:hiddenLine xmlns:a14="http://schemas.microsoft.com/office/drawing/2010/main" xmlns="" w="9525">
+                <a14:hiddenLine xmlns="" xmlns:a14="http://schemas.microsoft.com/office/drawing/2010/main" w="9525">
                   <a:solidFill>
                     <a:srgbClr val="000000"/>
                   </a:solidFill>
@@ -2884,7 +2884,7 @@
             </a:ln>
             <a:extLst>
               <a:ext uri="{91240B29-F687-4f45-9708-019B960494DF}">
-                <a14:hiddenLine xmlns:a14="http://schemas.microsoft.com/office/drawing/2010/main" xmlns="" w="9525">
+                <a14:hiddenLine xmlns="" xmlns:a14="http://schemas.microsoft.com/office/drawing/2010/main" w="9525">
                   <a:solidFill>
                     <a:srgbClr val="000000"/>
                   </a:solidFill>
@@ -2952,7 +2952,7 @@
             </a:ln>
             <a:extLst>
               <a:ext uri="{91240B29-F687-4f45-9708-019B960494DF}">
-                <a14:hiddenLine xmlns:a14="http://schemas.microsoft.com/office/drawing/2010/main" xmlns="" w="9525">
+                <a14:hiddenLine xmlns="" xmlns:a14="http://schemas.microsoft.com/office/drawing/2010/main" w="9525">
                   <a:solidFill>
                     <a:srgbClr val="000000"/>
                   </a:solidFill>
@@ -3014,7 +3014,7 @@
             </a:ln>
             <a:extLst>
               <a:ext uri="{91240B29-F687-4f45-9708-019B960494DF}">
-                <a14:hiddenLine xmlns:a14="http://schemas.microsoft.com/office/drawing/2010/main" xmlns="" w="9525">
+                <a14:hiddenLine xmlns="" xmlns:a14="http://schemas.microsoft.com/office/drawing/2010/main" w="9525">
                   <a:solidFill>
                     <a:srgbClr val="000000"/>
                   </a:solidFill>
@@ -3104,7 +3104,7 @@
             </a:ln>
             <a:extLst>
               <a:ext uri="{91240B29-F687-4f45-9708-019B960494DF}">
-                <a14:hiddenLine xmlns:a14="http://schemas.microsoft.com/office/drawing/2010/main" xmlns="" w="9525">
+                <a14:hiddenLine xmlns="" xmlns:a14="http://schemas.microsoft.com/office/drawing/2010/main" w="9525">
                   <a:solidFill>
                     <a:srgbClr val="000000"/>
                   </a:solidFill>
@@ -3166,7 +3166,7 @@
             </a:ln>
             <a:extLst>
               <a:ext uri="{91240B29-F687-4f45-9708-019B960494DF}">
-                <a14:hiddenLine xmlns:a14="http://schemas.microsoft.com/office/drawing/2010/main" xmlns="" w="9525">
+                <a14:hiddenLine xmlns="" xmlns:a14="http://schemas.microsoft.com/office/drawing/2010/main" w="9525">
                   <a:solidFill>
                     <a:srgbClr val="000000"/>
                   </a:solidFill>
@@ -3256,7 +3256,7 @@
             </a:ln>
             <a:extLst>
               <a:ext uri="{91240B29-F687-4f45-9708-019B960494DF}">
-                <a14:hiddenLine xmlns:a14="http://schemas.microsoft.com/office/drawing/2010/main" xmlns="" w="9525">
+                <a14:hiddenLine xmlns="" xmlns:a14="http://schemas.microsoft.com/office/drawing/2010/main" w="9525">
                   <a:solidFill>
                     <a:srgbClr val="000000"/>
                   </a:solidFill>
@@ -3318,7 +3318,7 @@
             </a:ln>
             <a:extLst>
               <a:ext uri="{91240B29-F687-4f45-9708-019B960494DF}">
-                <a14:hiddenLine xmlns:a14="http://schemas.microsoft.com/office/drawing/2010/main" xmlns="" w="9525">
+                <a14:hiddenLine xmlns="" xmlns:a14="http://schemas.microsoft.com/office/drawing/2010/main" w="9525">
                   <a:solidFill>
                     <a:srgbClr val="000000"/>
                   </a:solidFill>
@@ -3408,7 +3408,7 @@
             </a:ln>
             <a:extLst>
               <a:ext uri="{91240B29-F687-4f45-9708-019B960494DF}">
-                <a14:hiddenLine xmlns:a14="http://schemas.microsoft.com/office/drawing/2010/main" xmlns="" w="9525">
+                <a14:hiddenLine xmlns="" xmlns:a14="http://schemas.microsoft.com/office/drawing/2010/main" w="9525">
                   <a:solidFill>
                     <a:srgbClr val="000000"/>
                   </a:solidFill>
@@ -3442,7 +3442,7 @@
             </a:ln>
             <a:extLst>
               <a:ext uri="{91240B29-F687-4f45-9708-019B960494DF}">
-                <a14:hiddenLine xmlns:a14="http://schemas.microsoft.com/office/drawing/2010/main" xmlns="" w="9525">
+                <a14:hiddenLine xmlns="" xmlns:a14="http://schemas.microsoft.com/office/drawing/2010/main" w="9525">
                   <a:solidFill>
                     <a:srgbClr val="000000"/>
                   </a:solidFill>
@@ -3507,7 +3507,7 @@
             </a:ln>
             <a:extLst>
               <a:ext uri="{91240B29-F687-4f45-9708-019B960494DF}">
-                <a14:hiddenLine xmlns:a14="http://schemas.microsoft.com/office/drawing/2010/main" xmlns="" w="9525">
+                <a14:hiddenLine xmlns="" xmlns:a14="http://schemas.microsoft.com/office/drawing/2010/main" w="9525">
                   <a:solidFill>
                     <a:srgbClr val="000000"/>
                   </a:solidFill>
@@ -3597,7 +3597,7 @@
             </a:ln>
             <a:extLst>
               <a:ext uri="{91240B29-F687-4f45-9708-019B960494DF}">
-                <a14:hiddenLine xmlns:a14="http://schemas.microsoft.com/office/drawing/2010/main" xmlns="" w="9525">
+                <a14:hiddenLine xmlns="" xmlns:a14="http://schemas.microsoft.com/office/drawing/2010/main" w="9525">
                   <a:solidFill>
                     <a:srgbClr val="000000"/>
                   </a:solidFill>
@@ -3659,7 +3659,7 @@
             </a:ln>
             <a:extLst>
               <a:ext uri="{91240B29-F687-4f45-9708-019B960494DF}">
-                <a14:hiddenLine xmlns:a14="http://schemas.microsoft.com/office/drawing/2010/main" xmlns="" w="9525">
+                <a14:hiddenLine xmlns="" xmlns:a14="http://schemas.microsoft.com/office/drawing/2010/main" w="9525">
                   <a:solidFill>
                     <a:srgbClr val="000000"/>
                   </a:solidFill>
@@ -3749,7 +3749,7 @@
             </a:ln>
             <a:extLst>
               <a:ext uri="{91240B29-F687-4f45-9708-019B960494DF}">
-                <a14:hiddenLine xmlns:a14="http://schemas.microsoft.com/office/drawing/2010/main" xmlns="" w="9525">
+                <a14:hiddenLine xmlns="" xmlns:a14="http://schemas.microsoft.com/office/drawing/2010/main" w="9525">
                   <a:solidFill>
                     <a:srgbClr val="000000"/>
                   </a:solidFill>
@@ -3839,7 +3839,7 @@
             </a:ln>
             <a:extLst>
               <a:ext uri="{91240B29-F687-4f45-9708-019B960494DF}">
-                <a14:hiddenLine xmlns:a14="http://schemas.microsoft.com/office/drawing/2010/main" xmlns="" w="9525">
+                <a14:hiddenLine xmlns="" xmlns:a14="http://schemas.microsoft.com/office/drawing/2010/main" w="9525">
                   <a:solidFill>
                     <a:srgbClr val="000000"/>
                   </a:solidFill>
@@ -3904,7 +3904,7 @@
             </a:ln>
             <a:extLst>
               <a:ext uri="{91240B29-F687-4f45-9708-019B960494DF}">
-                <a14:hiddenLine xmlns:a14="http://schemas.microsoft.com/office/drawing/2010/main" xmlns="" w="9525">
+                <a14:hiddenLine xmlns="" xmlns:a14="http://schemas.microsoft.com/office/drawing/2010/main" w="9525">
                   <a:solidFill>
                     <a:srgbClr val="000000"/>
                   </a:solidFill>
@@ -3966,7 +3966,7 @@
             </a:ln>
             <a:extLst>
               <a:ext uri="{91240B29-F687-4f45-9708-019B960494DF}">
-                <a14:hiddenLine xmlns:a14="http://schemas.microsoft.com/office/drawing/2010/main" xmlns="" w="9525">
+                <a14:hiddenLine xmlns="" xmlns:a14="http://schemas.microsoft.com/office/drawing/2010/main" w="9525">
                   <a:solidFill>
                     <a:srgbClr val="000000"/>
                   </a:solidFill>
@@ -4056,7 +4056,7 @@
             </a:ln>
             <a:extLst>
               <a:ext uri="{91240B29-F687-4f45-9708-019B960494DF}">
-                <a14:hiddenLine xmlns:a14="http://schemas.microsoft.com/office/drawing/2010/main" xmlns="" w="9525">
+                <a14:hiddenLine xmlns="" xmlns:a14="http://schemas.microsoft.com/office/drawing/2010/main" w="9525">
                   <a:solidFill>
                     <a:srgbClr val="000000"/>
                   </a:solidFill>
@@ -4146,7 +4146,7 @@
             </a:ln>
             <a:extLst>
               <a:ext uri="{91240B29-F687-4f45-9708-019B960494DF}">
-                <a14:hiddenLine xmlns:a14="http://schemas.microsoft.com/office/drawing/2010/main" xmlns="" w="9525">
+                <a14:hiddenLine xmlns="" xmlns:a14="http://schemas.microsoft.com/office/drawing/2010/main" w="9525">
                   <a:solidFill>
                     <a:srgbClr val="000000"/>
                   </a:solidFill>
@@ -4208,7 +4208,7 @@
             </a:ln>
             <a:extLst>
               <a:ext uri="{91240B29-F687-4f45-9708-019B960494DF}">
-                <a14:hiddenLine xmlns:a14="http://schemas.microsoft.com/office/drawing/2010/main" xmlns="" w="9525">
+                <a14:hiddenLine xmlns="" xmlns:a14="http://schemas.microsoft.com/office/drawing/2010/main" w="9525">
                   <a:solidFill>
                     <a:srgbClr val="000000"/>
                   </a:solidFill>
@@ -4328,7 +4328,7 @@
             </a:ln>
             <a:extLst>
               <a:ext uri="{91240B29-F687-4f45-9708-019B960494DF}">
-                <a14:hiddenLine xmlns:a14="http://schemas.microsoft.com/office/drawing/2010/main" xmlns="" w="9525">
+                <a14:hiddenLine xmlns="" xmlns:a14="http://schemas.microsoft.com/office/drawing/2010/main" w="9525">
                   <a:solidFill>
                     <a:srgbClr val="000000"/>
                   </a:solidFill>
@@ -4396,7 +4396,7 @@
             </a:ln>
             <a:extLst>
               <a:ext uri="{91240B29-F687-4f45-9708-019B960494DF}">
-                <a14:hiddenLine xmlns:a14="http://schemas.microsoft.com/office/drawing/2010/main" xmlns="" w="9525">
+                <a14:hiddenLine xmlns="" xmlns:a14="http://schemas.microsoft.com/office/drawing/2010/main" w="9525">
                   <a:solidFill>
                     <a:srgbClr val="000000"/>
                   </a:solidFill>
@@ -4486,7 +4486,7 @@
             </a:ln>
             <a:extLst>
               <a:ext uri="{91240B29-F687-4f45-9708-019B960494DF}">
-                <a14:hiddenLine xmlns:a14="http://schemas.microsoft.com/office/drawing/2010/main" xmlns="" w="9525">
+                <a14:hiddenLine xmlns="" xmlns:a14="http://schemas.microsoft.com/office/drawing/2010/main" w="9525">
                   <a:solidFill>
                     <a:srgbClr val="000000"/>
                   </a:solidFill>
@@ -4626,7 +4626,7 @@
           <a:p>
             <a:fld id="{48A87A34-81AB-432B-8DAE-1953F412C126}" type="datetimeFigureOut">
               <a:rPr lang="en-US" dirty="0"/>
-              <a:t>5/16/2020</a:t>
+              <a:t>5/18/2020</a:t>
             </a:fld>
             <a:endParaRPr lang="en-US" dirty="0"/>
           </a:p>
@@ -4888,7 +4888,7 @@
           <a:p>
             <a:fld id="{48A87A34-81AB-432B-8DAE-1953F412C126}" type="datetimeFigureOut">
               <a:rPr lang="en-US" dirty="0"/>
-              <a:t>5/16/2020</a:t>
+              <a:t>5/18/2020</a:t>
             </a:fld>
             <a:endParaRPr lang="en-US" dirty="0"/>
           </a:p>
@@ -5079,7 +5079,7 @@
           <a:p>
             <a:fld id="{48A87A34-81AB-432B-8DAE-1953F412C126}" type="datetimeFigureOut">
               <a:rPr lang="en-US" dirty="0"/>
-              <a:t>5/16/2020</a:t>
+              <a:t>5/18/2020</a:t>
             </a:fld>
             <a:endParaRPr lang="en-US" dirty="0"/>
           </a:p>
@@ -5337,7 +5337,7 @@
           <a:p>
             <a:fld id="{48A87A34-81AB-432B-8DAE-1953F412C126}" type="datetimeFigureOut">
               <a:rPr lang="en-US" dirty="0"/>
-              <a:t>5/16/2020</a:t>
+              <a:t>5/18/2020</a:t>
             </a:fld>
             <a:endParaRPr lang="en-US" dirty="0"/>
           </a:p>
@@ -5766,7 +5766,7 @@
           <a:p>
             <a:fld id="{48A87A34-81AB-432B-8DAE-1953F412C126}" type="datetimeFigureOut">
               <a:rPr lang="en-US" dirty="0"/>
-              <a:t>5/16/2020</a:t>
+              <a:t>5/18/2020</a:t>
             </a:fld>
             <a:endParaRPr lang="en-US" dirty="0"/>
           </a:p>
@@ -6307,7 +6307,7 @@
           <a:p>
             <a:fld id="{48A87A34-81AB-432B-8DAE-1953F412C126}" type="datetimeFigureOut">
               <a:rPr lang="en-US" dirty="0"/>
-              <a:t>5/16/2020</a:t>
+              <a:t>5/18/2020</a:t>
             </a:fld>
             <a:endParaRPr lang="en-US" dirty="0"/>
           </a:p>
@@ -7022,7 +7022,7 @@
           <a:p>
             <a:fld id="{48A87A34-81AB-432B-8DAE-1953F412C126}" type="datetimeFigureOut">
               <a:rPr lang="en-US" dirty="0"/>
-              <a:t>5/16/2020</a:t>
+              <a:t>5/18/2020</a:t>
             </a:fld>
             <a:endParaRPr lang="en-US" dirty="0"/>
           </a:p>
@@ -7187,7 +7187,7 @@
           <a:p>
             <a:fld id="{48A87A34-81AB-432B-8DAE-1953F412C126}" type="datetimeFigureOut">
               <a:rPr lang="en-US" dirty="0"/>
-              <a:t>5/16/2020</a:t>
+              <a:t>5/18/2020</a:t>
             </a:fld>
             <a:endParaRPr lang="en-US" dirty="0"/>
           </a:p>
@@ -7362,7 +7362,7 @@
           <a:p>
             <a:fld id="{48A87A34-81AB-432B-8DAE-1953F412C126}" type="datetimeFigureOut">
               <a:rPr lang="en-US" dirty="0"/>
-              <a:t>5/16/2020</a:t>
+              <a:t>5/18/2020</a:t>
             </a:fld>
             <a:endParaRPr lang="en-US" dirty="0"/>
           </a:p>
@@ -7527,7 +7527,7 @@
           <a:p>
             <a:fld id="{48A87A34-81AB-432B-8DAE-1953F412C126}" type="datetimeFigureOut">
               <a:rPr lang="en-US" dirty="0"/>
-              <a:t>5/16/2020</a:t>
+              <a:t>5/18/2020</a:t>
             </a:fld>
             <a:endParaRPr lang="en-US" dirty="0"/>
           </a:p>
@@ -7772,7 +7772,7 @@
           <a:p>
             <a:fld id="{48A87A34-81AB-432B-8DAE-1953F412C126}" type="datetimeFigureOut">
               <a:rPr lang="en-US" dirty="0"/>
-              <a:t>5/16/2020</a:t>
+              <a:t>5/18/2020</a:t>
             </a:fld>
             <a:endParaRPr lang="en-US" dirty="0"/>
           </a:p>
@@ -7999,7 +7999,7 @@
           <a:p>
             <a:fld id="{48A87A34-81AB-432B-8DAE-1953F412C126}" type="datetimeFigureOut">
               <a:rPr lang="en-US" dirty="0"/>
-              <a:t>5/16/2020</a:t>
+              <a:t>5/18/2020</a:t>
             </a:fld>
             <a:endParaRPr lang="en-US" dirty="0"/>
           </a:p>
@@ -8375,7 +8375,7 @@
           <a:p>
             <a:fld id="{48A87A34-81AB-432B-8DAE-1953F412C126}" type="datetimeFigureOut">
               <a:rPr lang="en-US" dirty="0"/>
-              <a:t>5/16/2020</a:t>
+              <a:t>5/18/2020</a:t>
             </a:fld>
             <a:endParaRPr lang="en-US" dirty="0"/>
           </a:p>
@@ -8488,7 +8488,7 @@
           <a:p>
             <a:fld id="{48A87A34-81AB-432B-8DAE-1953F412C126}" type="datetimeFigureOut">
               <a:rPr lang="en-US" dirty="0"/>
-              <a:t>5/16/2020</a:t>
+              <a:t>5/18/2020</a:t>
             </a:fld>
             <a:endParaRPr lang="en-US" dirty="0"/>
           </a:p>
@@ -8578,7 +8578,7 @@
           <a:p>
             <a:fld id="{48A87A34-81AB-432B-8DAE-1953F412C126}" type="datetimeFigureOut">
               <a:rPr lang="en-US" dirty="0"/>
-              <a:t>5/16/2020</a:t>
+              <a:t>5/18/2020</a:t>
             </a:fld>
             <a:endParaRPr lang="en-US" dirty="0"/>
           </a:p>
@@ -8822,7 +8822,7 @@
           <a:p>
             <a:fld id="{48A87A34-81AB-432B-8DAE-1953F412C126}" type="datetimeFigureOut">
               <a:rPr lang="en-US" dirty="0"/>
-              <a:t>5/16/2020</a:t>
+              <a:t>5/18/2020</a:t>
             </a:fld>
             <a:endParaRPr lang="en-US" dirty="0"/>
           </a:p>
@@ -9097,7 +9097,7 @@
           <a:p>
             <a:fld id="{48A87A34-81AB-432B-8DAE-1953F412C126}" type="datetimeFigureOut">
               <a:rPr lang="en-US" dirty="0"/>
-              <a:t>5/16/2020</a:t>
+              <a:t>5/18/2020</a:t>
             </a:fld>
             <a:endParaRPr lang="en-US" dirty="0"/>
           </a:p>
@@ -9208,7 +9208,7 @@
           <a:noFill/>
           <a:extLst>
             <a:ext uri="{909E8E84-426E-40dd-AFC4-6F175D3DCCD1}">
-              <a14:hiddenFill xmlns:a14="http://schemas.microsoft.com/office/drawing/2010/main" xmlns="">
+              <a14:hiddenFill xmlns="" xmlns:a14="http://schemas.microsoft.com/office/drawing/2010/main">
                 <a:solidFill>
                   <a:srgbClr val="FFFFFF"/>
                 </a:solidFill>
@@ -9282,7 +9282,7 @@
               </a:ln>
               <a:extLst>
                 <a:ext uri="{91240B29-F687-4f45-9708-019B960494DF}">
-                  <a14:hiddenLine xmlns:a14="http://schemas.microsoft.com/office/drawing/2010/main" xmlns="" w="9525">
+                  <a14:hiddenLine xmlns="" xmlns:a14="http://schemas.microsoft.com/office/drawing/2010/main" w="9525">
                     <a:solidFill>
                       <a:srgbClr val="000000"/>
                     </a:solidFill>
@@ -9372,7 +9372,7 @@
               </a:ln>
               <a:extLst>
                 <a:ext uri="{91240B29-F687-4f45-9708-019B960494DF}">
-                  <a14:hiddenLine xmlns:a14="http://schemas.microsoft.com/office/drawing/2010/main" xmlns="" w="9525">
+                  <a14:hiddenLine xmlns="" xmlns:a14="http://schemas.microsoft.com/office/drawing/2010/main" w="9525">
                     <a:solidFill>
                       <a:srgbClr val="000000"/>
                     </a:solidFill>
@@ -9462,7 +9462,7 @@
               </a:ln>
               <a:extLst>
                 <a:ext uri="{91240B29-F687-4f45-9708-019B960494DF}">
-                  <a14:hiddenLine xmlns:a14="http://schemas.microsoft.com/office/drawing/2010/main" xmlns="" w="9525">
+                  <a14:hiddenLine xmlns="" xmlns:a14="http://schemas.microsoft.com/office/drawing/2010/main" w="9525">
                     <a:solidFill>
                       <a:srgbClr val="000000"/>
                     </a:solidFill>
@@ -9524,7 +9524,7 @@
               </a:ln>
               <a:extLst>
                 <a:ext uri="{91240B29-F687-4f45-9708-019B960494DF}">
-                  <a14:hiddenLine xmlns:a14="http://schemas.microsoft.com/office/drawing/2010/main" xmlns="" w="9525">
+                  <a14:hiddenLine xmlns="" xmlns:a14="http://schemas.microsoft.com/office/drawing/2010/main" w="9525">
                     <a:solidFill>
                       <a:srgbClr val="000000"/>
                     </a:solidFill>
@@ -9614,7 +9614,7 @@
               </a:ln>
               <a:extLst>
                 <a:ext uri="{91240B29-F687-4f45-9708-019B960494DF}">
-                  <a14:hiddenLine xmlns:a14="http://schemas.microsoft.com/office/drawing/2010/main" xmlns="" w="9525">
+                  <a14:hiddenLine xmlns="" xmlns:a14="http://schemas.microsoft.com/office/drawing/2010/main" w="9525">
                     <a:solidFill>
                       <a:srgbClr val="000000"/>
                     </a:solidFill>
@@ -9676,7 +9676,7 @@
               </a:ln>
               <a:extLst>
                 <a:ext uri="{91240B29-F687-4f45-9708-019B960494DF}">
-                  <a14:hiddenLine xmlns:a14="http://schemas.microsoft.com/office/drawing/2010/main" xmlns="" w="9525">
+                  <a14:hiddenLine xmlns="" xmlns:a14="http://schemas.microsoft.com/office/drawing/2010/main" w="9525">
                     <a:solidFill>
                       <a:srgbClr val="000000"/>
                     </a:solidFill>
@@ -9738,7 +9738,7 @@
               </a:ln>
               <a:extLst>
                 <a:ext uri="{91240B29-F687-4f45-9708-019B960494DF}">
-                  <a14:hiddenLine xmlns:a14="http://schemas.microsoft.com/office/drawing/2010/main" xmlns="" w="9525">
+                  <a14:hiddenLine xmlns="" xmlns:a14="http://schemas.microsoft.com/office/drawing/2010/main" w="9525">
                     <a:solidFill>
                       <a:srgbClr val="000000"/>
                     </a:solidFill>
@@ -9828,7 +9828,7 @@
               </a:ln>
               <a:extLst>
                 <a:ext uri="{91240B29-F687-4f45-9708-019B960494DF}">
-                  <a14:hiddenLine xmlns:a14="http://schemas.microsoft.com/office/drawing/2010/main" xmlns="" w="9525">
+                  <a14:hiddenLine xmlns="" xmlns:a14="http://schemas.microsoft.com/office/drawing/2010/main" w="9525">
                     <a:solidFill>
                       <a:srgbClr val="000000"/>
                     </a:solidFill>
@@ -9918,7 +9918,7 @@
               </a:ln>
               <a:extLst>
                 <a:ext uri="{91240B29-F687-4f45-9708-019B960494DF}">
-                  <a14:hiddenLine xmlns:a14="http://schemas.microsoft.com/office/drawing/2010/main" xmlns="" w="9525">
+                  <a14:hiddenLine xmlns="" xmlns:a14="http://schemas.microsoft.com/office/drawing/2010/main" w="9525">
                     <a:solidFill>
                       <a:srgbClr val="000000"/>
                     </a:solidFill>
@@ -9980,7 +9980,7 @@
               </a:ln>
               <a:extLst>
                 <a:ext uri="{91240B29-F687-4f45-9708-019B960494DF}">
-                  <a14:hiddenLine xmlns:a14="http://schemas.microsoft.com/office/drawing/2010/main" xmlns="" w="9525">
+                  <a14:hiddenLine xmlns="" xmlns:a14="http://schemas.microsoft.com/office/drawing/2010/main" w="9525">
                     <a:solidFill>
                       <a:srgbClr val="000000"/>
                     </a:solidFill>
@@ -10090,7 +10090,7 @@
               </a:ln>
               <a:extLst>
                 <a:ext uri="{91240B29-F687-4f45-9708-019B960494DF}">
-                  <a14:hiddenLine xmlns:a14="http://schemas.microsoft.com/office/drawing/2010/main" xmlns="" w="9525">
+                  <a14:hiddenLine xmlns="" xmlns:a14="http://schemas.microsoft.com/office/drawing/2010/main" w="9525">
                     <a:solidFill>
                       <a:srgbClr val="000000"/>
                     </a:solidFill>
@@ -10174,7 +10174,7 @@
               </a:ln>
               <a:extLst>
                 <a:ext uri="{91240B29-F687-4f45-9708-019B960494DF}">
-                  <a14:hiddenLine xmlns:a14="http://schemas.microsoft.com/office/drawing/2010/main" xmlns="" w="9525">
+                  <a14:hiddenLine xmlns="" xmlns:a14="http://schemas.microsoft.com/office/drawing/2010/main" w="9525">
                     <a:solidFill>
                       <a:srgbClr val="000000"/>
                     </a:solidFill>
@@ -10236,7 +10236,7 @@
               </a:ln>
               <a:extLst>
                 <a:ext uri="{91240B29-F687-4f45-9708-019B960494DF}">
-                  <a14:hiddenLine xmlns:a14="http://schemas.microsoft.com/office/drawing/2010/main" xmlns="" w="9525">
+                  <a14:hiddenLine xmlns="" xmlns:a14="http://schemas.microsoft.com/office/drawing/2010/main" w="9525">
                     <a:solidFill>
                       <a:srgbClr val="000000"/>
                     </a:solidFill>
@@ -10298,7 +10298,7 @@
               </a:ln>
               <a:extLst>
                 <a:ext uri="{91240B29-F687-4f45-9708-019B960494DF}">
-                  <a14:hiddenLine xmlns:a14="http://schemas.microsoft.com/office/drawing/2010/main" xmlns="" w="9525">
+                  <a14:hiddenLine xmlns="" xmlns:a14="http://schemas.microsoft.com/office/drawing/2010/main" w="9525">
                     <a:solidFill>
                       <a:srgbClr val="000000"/>
                     </a:solidFill>
@@ -10388,7 +10388,7 @@
               </a:ln>
               <a:extLst>
                 <a:ext uri="{91240B29-F687-4f45-9708-019B960494DF}">
-                  <a14:hiddenLine xmlns:a14="http://schemas.microsoft.com/office/drawing/2010/main" xmlns="" w="9525">
+                  <a14:hiddenLine xmlns="" xmlns:a14="http://schemas.microsoft.com/office/drawing/2010/main" w="9525">
                     <a:solidFill>
                       <a:srgbClr val="000000"/>
                     </a:solidFill>
@@ -10422,7 +10422,7 @@
               </a:ln>
               <a:extLst>
                 <a:ext uri="{91240B29-F687-4f45-9708-019B960494DF}">
-                  <a14:hiddenLine xmlns:a14="http://schemas.microsoft.com/office/drawing/2010/main" xmlns="" w="9525">
+                  <a14:hiddenLine xmlns="" xmlns:a14="http://schemas.microsoft.com/office/drawing/2010/main" w="9525">
                     <a:solidFill>
                       <a:srgbClr val="000000"/>
                     </a:solidFill>
@@ -10487,7 +10487,7 @@
               </a:ln>
               <a:extLst>
                 <a:ext uri="{91240B29-F687-4f45-9708-019B960494DF}">
-                  <a14:hiddenLine xmlns:a14="http://schemas.microsoft.com/office/drawing/2010/main" xmlns="" w="9525">
+                  <a14:hiddenLine xmlns="" xmlns:a14="http://schemas.microsoft.com/office/drawing/2010/main" w="9525">
                     <a:solidFill>
                       <a:srgbClr val="000000"/>
                     </a:solidFill>
@@ -10577,7 +10577,7 @@
               </a:ln>
               <a:extLst>
                 <a:ext uri="{91240B29-F687-4f45-9708-019B960494DF}">
-                  <a14:hiddenLine xmlns:a14="http://schemas.microsoft.com/office/drawing/2010/main" xmlns="" w="9525">
+                  <a14:hiddenLine xmlns="" xmlns:a14="http://schemas.microsoft.com/office/drawing/2010/main" w="9525">
                     <a:solidFill>
                       <a:srgbClr val="000000"/>
                     </a:solidFill>
@@ -10639,7 +10639,7 @@
               </a:ln>
               <a:extLst>
                 <a:ext uri="{91240B29-F687-4f45-9708-019B960494DF}">
-                  <a14:hiddenLine xmlns:a14="http://schemas.microsoft.com/office/drawing/2010/main" xmlns="" w="9525">
+                  <a14:hiddenLine xmlns="" xmlns:a14="http://schemas.microsoft.com/office/drawing/2010/main" w="9525">
                     <a:solidFill>
                       <a:srgbClr val="000000"/>
                     </a:solidFill>
@@ -10729,7 +10729,7 @@
               </a:ln>
               <a:extLst>
                 <a:ext uri="{91240B29-F687-4f45-9708-019B960494DF}">
-                  <a14:hiddenLine xmlns:a14="http://schemas.microsoft.com/office/drawing/2010/main" xmlns="" w="9525">
+                  <a14:hiddenLine xmlns="" xmlns:a14="http://schemas.microsoft.com/office/drawing/2010/main" w="9525">
                     <a:solidFill>
                       <a:srgbClr val="000000"/>
                     </a:solidFill>
@@ -10794,7 +10794,7 @@
               </a:ln>
               <a:extLst>
                 <a:ext uri="{91240B29-F687-4f45-9708-019B960494DF}">
-                  <a14:hiddenLine xmlns:a14="http://schemas.microsoft.com/office/drawing/2010/main" xmlns="" w="9525">
+                  <a14:hiddenLine xmlns="" xmlns:a14="http://schemas.microsoft.com/office/drawing/2010/main" w="9525">
                     <a:solidFill>
                       <a:srgbClr val="000000"/>
                     </a:solidFill>
@@ -10856,7 +10856,7 @@
               </a:ln>
               <a:extLst>
                 <a:ext uri="{91240B29-F687-4f45-9708-019B960494DF}">
-                  <a14:hiddenLine xmlns:a14="http://schemas.microsoft.com/office/drawing/2010/main" xmlns="" w="9525">
+                  <a14:hiddenLine xmlns="" xmlns:a14="http://schemas.microsoft.com/office/drawing/2010/main" w="9525">
                     <a:solidFill>
                       <a:srgbClr val="000000"/>
                     </a:solidFill>
@@ -10946,7 +10946,7 @@
               </a:ln>
               <a:extLst>
                 <a:ext uri="{91240B29-F687-4f45-9708-019B960494DF}">
-                  <a14:hiddenLine xmlns:a14="http://schemas.microsoft.com/office/drawing/2010/main" xmlns="" w="9525">
+                  <a14:hiddenLine xmlns="" xmlns:a14="http://schemas.microsoft.com/office/drawing/2010/main" w="9525">
                     <a:solidFill>
                       <a:srgbClr val="000000"/>
                     </a:solidFill>
@@ -11036,7 +11036,7 @@
               </a:ln>
               <a:extLst>
                 <a:ext uri="{91240B29-F687-4f45-9708-019B960494DF}">
-                  <a14:hiddenLine xmlns:a14="http://schemas.microsoft.com/office/drawing/2010/main" xmlns="" w="9525">
+                  <a14:hiddenLine xmlns="" xmlns:a14="http://schemas.microsoft.com/office/drawing/2010/main" w="9525">
                     <a:solidFill>
                       <a:srgbClr val="000000"/>
                     </a:solidFill>
@@ -11101,7 +11101,7 @@
               </a:ln>
               <a:extLst>
                 <a:ext uri="{91240B29-F687-4f45-9708-019B960494DF}">
-                  <a14:hiddenLine xmlns:a14="http://schemas.microsoft.com/office/drawing/2010/main" xmlns="" w="9525">
+                  <a14:hiddenLine xmlns="" xmlns:a14="http://schemas.microsoft.com/office/drawing/2010/main" w="9525">
                     <a:solidFill>
                       <a:srgbClr val="000000"/>
                     </a:solidFill>
@@ -11221,7 +11221,7 @@
               </a:ln>
               <a:extLst>
                 <a:ext uri="{91240B29-F687-4f45-9708-019B960494DF}">
-                  <a14:hiddenLine xmlns:a14="http://schemas.microsoft.com/office/drawing/2010/main" xmlns="" w="9525">
+                  <a14:hiddenLine xmlns="" xmlns:a14="http://schemas.microsoft.com/office/drawing/2010/main" w="9525">
                     <a:solidFill>
                       <a:srgbClr val="000000"/>
                     </a:solidFill>
@@ -11319,7 +11319,7 @@
               </a:ln>
               <a:extLst>
                 <a:ext uri="{91240B29-F687-4f45-9708-019B960494DF}">
-                  <a14:hiddenLine xmlns:a14="http://schemas.microsoft.com/office/drawing/2010/main" xmlns="" w="9525">
+                  <a14:hiddenLine xmlns="" xmlns:a14="http://schemas.microsoft.com/office/drawing/2010/main" w="9525">
                     <a:solidFill>
                       <a:srgbClr val="000000"/>
                     </a:solidFill>
@@ -11434,7 +11434,7 @@
               </a:ln>
               <a:extLst>
                 <a:ext uri="{91240B29-F687-4f45-9708-019B960494DF}">
-                  <a14:hiddenLine xmlns:a14="http://schemas.microsoft.com/office/drawing/2010/main" xmlns="" w="9525">
+                  <a14:hiddenLine xmlns="" xmlns:a14="http://schemas.microsoft.com/office/drawing/2010/main" w="9525">
                     <a:solidFill>
                       <a:srgbClr val="000000"/>
                     </a:solidFill>
@@ -11524,7 +11524,7 @@
               </a:ln>
               <a:extLst>
                 <a:ext uri="{91240B29-F687-4f45-9708-019B960494DF}">
-                  <a14:hiddenLine xmlns:a14="http://schemas.microsoft.com/office/drawing/2010/main" xmlns="" w="9525">
+                  <a14:hiddenLine xmlns="" xmlns:a14="http://schemas.microsoft.com/office/drawing/2010/main" w="9525">
                     <a:solidFill>
                       <a:srgbClr val="000000"/>
                     </a:solidFill>
@@ -11589,7 +11589,7 @@
               </a:ln>
               <a:extLst>
                 <a:ext uri="{91240B29-F687-4f45-9708-019B960494DF}">
-                  <a14:hiddenLine xmlns:a14="http://schemas.microsoft.com/office/drawing/2010/main" xmlns="" w="9525">
+                  <a14:hiddenLine xmlns="" xmlns:a14="http://schemas.microsoft.com/office/drawing/2010/main" w="9525">
                     <a:solidFill>
                       <a:srgbClr val="000000"/>
                     </a:solidFill>
@@ -11679,7 +11679,7 @@
               </a:ln>
               <a:extLst>
                 <a:ext uri="{91240B29-F687-4f45-9708-019B960494DF}">
-                  <a14:hiddenLine xmlns:a14="http://schemas.microsoft.com/office/drawing/2010/main" xmlns="" w="9525">
+                  <a14:hiddenLine xmlns="" xmlns:a14="http://schemas.microsoft.com/office/drawing/2010/main" w="9525">
                     <a:solidFill>
                       <a:srgbClr val="000000"/>
                     </a:solidFill>
@@ -11747,7 +11747,7 @@
               </a:ln>
               <a:extLst>
                 <a:ext uri="{91240B29-F687-4f45-9708-019B960494DF}">
-                  <a14:hiddenLine xmlns:a14="http://schemas.microsoft.com/office/drawing/2010/main" xmlns="" w="9525">
+                  <a14:hiddenLine xmlns="" xmlns:a14="http://schemas.microsoft.com/office/drawing/2010/main" w="9525">
                     <a:solidFill>
                       <a:srgbClr val="000000"/>
                     </a:solidFill>
@@ -11837,7 +11837,7 @@
               </a:ln>
               <a:extLst>
                 <a:ext uri="{91240B29-F687-4f45-9708-019B960494DF}">
-                  <a14:hiddenLine xmlns:a14="http://schemas.microsoft.com/office/drawing/2010/main" xmlns="" w="9525">
+                  <a14:hiddenLine xmlns="" xmlns:a14="http://schemas.microsoft.com/office/drawing/2010/main" w="9525">
                     <a:solidFill>
                       <a:srgbClr val="000000"/>
                     </a:solidFill>
@@ -11905,7 +11905,7 @@
               </a:ln>
               <a:extLst>
                 <a:ext uri="{91240B29-F687-4f45-9708-019B960494DF}">
-                  <a14:hiddenLine xmlns:a14="http://schemas.microsoft.com/office/drawing/2010/main" xmlns="" w="9525">
+                  <a14:hiddenLine xmlns="" xmlns:a14="http://schemas.microsoft.com/office/drawing/2010/main" w="9525">
                     <a:solidFill>
                       <a:srgbClr val="000000"/>
                     </a:solidFill>
@@ -11995,7 +11995,7 @@
               </a:ln>
               <a:extLst>
                 <a:ext uri="{91240B29-F687-4f45-9708-019B960494DF}">
-                  <a14:hiddenLine xmlns:a14="http://schemas.microsoft.com/office/drawing/2010/main" xmlns="" w="9525">
+                  <a14:hiddenLine xmlns="" xmlns:a14="http://schemas.microsoft.com/office/drawing/2010/main" w="9525">
                     <a:solidFill>
                       <a:srgbClr val="000000"/>
                     </a:solidFill>
@@ -12029,7 +12029,7 @@
               </a:ln>
               <a:extLst>
                 <a:ext uri="{91240B29-F687-4f45-9708-019B960494DF}">
-                  <a14:hiddenLine xmlns:a14="http://schemas.microsoft.com/office/drawing/2010/main" xmlns="" w="9525">
+                  <a14:hiddenLine xmlns="" xmlns:a14="http://schemas.microsoft.com/office/drawing/2010/main" w="9525">
                     <a:solidFill>
                       <a:srgbClr val="000000"/>
                     </a:solidFill>
@@ -12170,7 +12170,7 @@
             <a:fld id="{48A87A34-81AB-432B-8DAE-1953F412C126}" type="datetimeFigureOut">
               <a:rPr lang="en-US" dirty="0"/>
               <a:pPr/>
-              <a:t>5/16/2020</a:t>
+              <a:t>5/18/2020</a:t>
             </a:fld>
             <a:endParaRPr lang="en-US" dirty="0"/>
           </a:p>
@@ -12736,6 +12736,20 @@
             </a:r>
           </a:p>
           <a:p>
+            <a:pPr lvl="1"/>
+            <a:r>
+              <a:rPr lang="en-US" dirty="0"/>
+              <a:t>One application is a program that tracks the height of all animals and the program needs to track animal information from shortest height to tallest height.</a:t>
+            </a:r>
+          </a:p>
+          <a:p>
+            <a:pPr lvl="1"/>
+            <a:r>
+              <a:rPr lang="en-US" dirty="0"/>
+              <a:t>Another example is organizing names(if it’s modified to track alphabetical instead of numerical order).</a:t>
+            </a:r>
+          </a:p>
+          <a:p>
             <a:r>
               <a:rPr lang="en-US" dirty="0"/>
               <a:t>Goes from front to back of list, sorting elements on the way</a:t>
@@ -12765,7 +12779,7 @@
         </p:blipFill>
         <p:spPr>
           <a:xfrm>
-            <a:off x="3358534" y="3585968"/>
+            <a:off x="8729025" y="4020344"/>
             <a:ext cx="2638425" cy="2447925"/>
           </a:xfrm>
           <a:prstGeom prst="rect">

</xml_diff>

<commit_message>
Modifed slideshow one more time after doing practice.
</commit_message>
<xml_diff>
--- a/FinalPresentation.pptx
+++ b/FinalPresentation.pptx
@@ -4,6 +4,9 @@
   <p:sldMasterIdLst>
     <p:sldMasterId id="2147483648" r:id="rId1"/>
   </p:sldMasterIdLst>
+  <p:notesMasterIdLst>
+    <p:notesMasterId r:id="rId10"/>
+  </p:notesMasterIdLst>
   <p:sldIdLst>
     <p:sldId id="256" r:id="rId2"/>
     <p:sldId id="257" r:id="rId3"/>
@@ -12,6 +15,7 @@
     <p:sldId id="260" r:id="rId6"/>
     <p:sldId id="261" r:id="rId7"/>
     <p:sldId id="262" r:id="rId8"/>
+    <p:sldId id="263" r:id="rId9"/>
   </p:sldIdLst>
   <p:sldSz cx="12192000" cy="6858000"/>
   <p:notesSz cx="6858000" cy="9144000"/>
@@ -350,6 +354,711 @@
 </pc:chgInfo>
 </file>
 
+<file path=ppt/notesMasters/notesMaster1.xml><?xml version="1.0" encoding="utf-8"?>
+<p:notesMaster xmlns:a="http://schemas.openxmlformats.org/drawingml/2006/main" xmlns:r="http://schemas.openxmlformats.org/officeDocument/2006/relationships" xmlns:p="http://schemas.openxmlformats.org/presentationml/2006/main">
+  <p:cSld>
+    <p:bg>
+      <p:bgRef idx="1001">
+        <a:schemeClr val="bg1"/>
+      </p:bgRef>
+    </p:bg>
+    <p:spTree>
+      <p:nvGrpSpPr>
+        <p:cNvPr id="1" name=""/>
+        <p:cNvGrpSpPr/>
+        <p:nvPr/>
+      </p:nvGrpSpPr>
+      <p:grpSpPr>
+        <a:xfrm>
+          <a:off x="0" y="0"/>
+          <a:ext cx="0" cy="0"/>
+          <a:chOff x="0" y="0"/>
+          <a:chExt cx="0" cy="0"/>
+        </a:xfrm>
+      </p:grpSpPr>
+      <p:sp>
+        <p:nvSpPr>
+          <p:cNvPr id="2" name="Header Placeholder 1"/>
+          <p:cNvSpPr>
+            <a:spLocks noGrp="1"/>
+          </p:cNvSpPr>
+          <p:nvPr>
+            <p:ph type="hdr" sz="quarter"/>
+          </p:nvPr>
+        </p:nvSpPr>
+        <p:spPr>
+          <a:xfrm>
+            <a:off x="0" y="0"/>
+            <a:ext cx="2971800" cy="458788"/>
+          </a:xfrm>
+          <a:prstGeom prst="rect">
+            <a:avLst/>
+          </a:prstGeom>
+        </p:spPr>
+        <p:txBody>
+          <a:bodyPr vert="horz" lIns="91440" tIns="45720" rIns="91440" bIns="45720" rtlCol="0"/>
+          <a:lstStyle>
+            <a:lvl1pPr algn="l">
+              <a:defRPr sz="1200"/>
+            </a:lvl1pPr>
+          </a:lstStyle>
+          <a:p>
+            <a:endParaRPr lang="en-US"/>
+          </a:p>
+        </p:txBody>
+      </p:sp>
+      <p:sp>
+        <p:nvSpPr>
+          <p:cNvPr id="3" name="Date Placeholder 2"/>
+          <p:cNvSpPr>
+            <a:spLocks noGrp="1"/>
+          </p:cNvSpPr>
+          <p:nvPr>
+            <p:ph type="dt" idx="1"/>
+          </p:nvPr>
+        </p:nvSpPr>
+        <p:spPr>
+          <a:xfrm>
+            <a:off x="3884613" y="0"/>
+            <a:ext cx="2971800" cy="458788"/>
+          </a:xfrm>
+          <a:prstGeom prst="rect">
+            <a:avLst/>
+          </a:prstGeom>
+        </p:spPr>
+        <p:txBody>
+          <a:bodyPr vert="horz" lIns="91440" tIns="45720" rIns="91440" bIns="45720" rtlCol="0"/>
+          <a:lstStyle>
+            <a:lvl1pPr algn="r">
+              <a:defRPr sz="1200"/>
+            </a:lvl1pPr>
+          </a:lstStyle>
+          <a:p>
+            <a:fld id="{CF1E79B3-D9EA-4A60-98AB-7CFEA2F35D22}" type="datetimeFigureOut">
+              <a:rPr lang="en-US" smtClean="0"/>
+              <a:t>5/19/2020</a:t>
+            </a:fld>
+            <a:endParaRPr lang="en-US"/>
+          </a:p>
+        </p:txBody>
+      </p:sp>
+      <p:sp>
+        <p:nvSpPr>
+          <p:cNvPr id="4" name="Slide Image Placeholder 3"/>
+          <p:cNvSpPr>
+            <a:spLocks noGrp="1" noRot="1" noChangeAspect="1"/>
+          </p:cNvSpPr>
+          <p:nvPr>
+            <p:ph type="sldImg" idx="2"/>
+          </p:nvPr>
+        </p:nvSpPr>
+        <p:spPr>
+          <a:xfrm>
+            <a:off x="685800" y="1143000"/>
+            <a:ext cx="5486400" cy="3086100"/>
+          </a:xfrm>
+          <a:prstGeom prst="rect">
+            <a:avLst/>
+          </a:prstGeom>
+          <a:noFill/>
+          <a:ln w="12700">
+            <a:solidFill>
+              <a:prstClr val="black"/>
+            </a:solidFill>
+          </a:ln>
+        </p:spPr>
+        <p:txBody>
+          <a:bodyPr vert="horz" lIns="91440" tIns="45720" rIns="91440" bIns="45720" rtlCol="0" anchor="ctr"/>
+          <a:lstStyle/>
+          <a:p>
+            <a:endParaRPr lang="en-US"/>
+          </a:p>
+        </p:txBody>
+      </p:sp>
+      <p:sp>
+        <p:nvSpPr>
+          <p:cNvPr id="5" name="Notes Placeholder 4"/>
+          <p:cNvSpPr>
+            <a:spLocks noGrp="1"/>
+          </p:cNvSpPr>
+          <p:nvPr>
+            <p:ph type="body" sz="quarter" idx="3"/>
+          </p:nvPr>
+        </p:nvSpPr>
+        <p:spPr>
+          <a:xfrm>
+            <a:off x="685800" y="4400550"/>
+            <a:ext cx="5486400" cy="3600450"/>
+          </a:xfrm>
+          <a:prstGeom prst="rect">
+            <a:avLst/>
+          </a:prstGeom>
+        </p:spPr>
+        <p:txBody>
+          <a:bodyPr vert="horz" lIns="91440" tIns="45720" rIns="91440" bIns="45720" rtlCol="0"/>
+          <a:lstStyle/>
+          <a:p>
+            <a:pPr lvl="0"/>
+            <a:r>
+              <a:rPr lang="en-US"/>
+              <a:t>Click to edit Master text styles</a:t>
+            </a:r>
+          </a:p>
+          <a:p>
+            <a:pPr lvl="1"/>
+            <a:r>
+              <a:rPr lang="en-US"/>
+              <a:t>Second level</a:t>
+            </a:r>
+          </a:p>
+          <a:p>
+            <a:pPr lvl="2"/>
+            <a:r>
+              <a:rPr lang="en-US"/>
+              <a:t>Third level</a:t>
+            </a:r>
+          </a:p>
+          <a:p>
+            <a:pPr lvl="3"/>
+            <a:r>
+              <a:rPr lang="en-US"/>
+              <a:t>Fourth level</a:t>
+            </a:r>
+          </a:p>
+          <a:p>
+            <a:pPr lvl="4"/>
+            <a:r>
+              <a:rPr lang="en-US"/>
+              <a:t>Fifth level</a:t>
+            </a:r>
+          </a:p>
+        </p:txBody>
+      </p:sp>
+      <p:sp>
+        <p:nvSpPr>
+          <p:cNvPr id="6" name="Footer Placeholder 5"/>
+          <p:cNvSpPr>
+            <a:spLocks noGrp="1"/>
+          </p:cNvSpPr>
+          <p:nvPr>
+            <p:ph type="ftr" sz="quarter" idx="4"/>
+          </p:nvPr>
+        </p:nvSpPr>
+        <p:spPr>
+          <a:xfrm>
+            <a:off x="0" y="8685213"/>
+            <a:ext cx="2971800" cy="458787"/>
+          </a:xfrm>
+          <a:prstGeom prst="rect">
+            <a:avLst/>
+          </a:prstGeom>
+        </p:spPr>
+        <p:txBody>
+          <a:bodyPr vert="horz" lIns="91440" tIns="45720" rIns="91440" bIns="45720" rtlCol="0" anchor="b"/>
+          <a:lstStyle>
+            <a:lvl1pPr algn="l">
+              <a:defRPr sz="1200"/>
+            </a:lvl1pPr>
+          </a:lstStyle>
+          <a:p>
+            <a:endParaRPr lang="en-US"/>
+          </a:p>
+        </p:txBody>
+      </p:sp>
+      <p:sp>
+        <p:nvSpPr>
+          <p:cNvPr id="7" name="Slide Number Placeholder 6"/>
+          <p:cNvSpPr>
+            <a:spLocks noGrp="1"/>
+          </p:cNvSpPr>
+          <p:nvPr>
+            <p:ph type="sldNum" sz="quarter" idx="5"/>
+          </p:nvPr>
+        </p:nvSpPr>
+        <p:spPr>
+          <a:xfrm>
+            <a:off x="3884613" y="8685213"/>
+            <a:ext cx="2971800" cy="458787"/>
+          </a:xfrm>
+          <a:prstGeom prst="rect">
+            <a:avLst/>
+          </a:prstGeom>
+        </p:spPr>
+        <p:txBody>
+          <a:bodyPr vert="horz" lIns="91440" tIns="45720" rIns="91440" bIns="45720" rtlCol="0" anchor="b"/>
+          <a:lstStyle>
+            <a:lvl1pPr algn="r">
+              <a:defRPr sz="1200"/>
+            </a:lvl1pPr>
+          </a:lstStyle>
+          <a:p>
+            <a:fld id="{37A0A5C6-5E4A-4784-9FF7-C7F273799E85}" type="slidenum">
+              <a:rPr lang="en-US" smtClean="0"/>
+              <a:t>‹#›</a:t>
+            </a:fld>
+            <a:endParaRPr lang="en-US"/>
+          </a:p>
+        </p:txBody>
+      </p:sp>
+    </p:spTree>
+    <p:extLst>
+      <p:ext uri="{BB962C8B-B14F-4D97-AF65-F5344CB8AC3E}">
+        <p14:creationId xmlns:p14="http://schemas.microsoft.com/office/powerpoint/2010/main" val="4234184256"/>
+      </p:ext>
+    </p:extLst>
+  </p:cSld>
+  <p:clrMap bg1="lt1" tx1="dk1" bg2="lt2" tx2="dk2" accent1="accent1" accent2="accent2" accent3="accent3" accent4="accent4" accent5="accent5" accent6="accent6" hlink="hlink" folHlink="folHlink"/>
+  <p:notesStyle>
+    <a:lvl1pPr marL="0" algn="l" defTabSz="914400" rtl="0" eaLnBrk="1" latinLnBrk="0" hangingPunct="1">
+      <a:defRPr sz="1200" kern="1200">
+        <a:solidFill>
+          <a:schemeClr val="tx1"/>
+        </a:solidFill>
+        <a:latin typeface="+mn-lt"/>
+        <a:ea typeface="+mn-ea"/>
+        <a:cs typeface="+mn-cs"/>
+      </a:defRPr>
+    </a:lvl1pPr>
+    <a:lvl2pPr marL="457200" algn="l" defTabSz="914400" rtl="0" eaLnBrk="1" latinLnBrk="0" hangingPunct="1">
+      <a:defRPr sz="1200" kern="1200">
+        <a:solidFill>
+          <a:schemeClr val="tx1"/>
+        </a:solidFill>
+        <a:latin typeface="+mn-lt"/>
+        <a:ea typeface="+mn-ea"/>
+        <a:cs typeface="+mn-cs"/>
+      </a:defRPr>
+    </a:lvl2pPr>
+    <a:lvl3pPr marL="914400" algn="l" defTabSz="914400" rtl="0" eaLnBrk="1" latinLnBrk="0" hangingPunct="1">
+      <a:defRPr sz="1200" kern="1200">
+        <a:solidFill>
+          <a:schemeClr val="tx1"/>
+        </a:solidFill>
+        <a:latin typeface="+mn-lt"/>
+        <a:ea typeface="+mn-ea"/>
+        <a:cs typeface="+mn-cs"/>
+      </a:defRPr>
+    </a:lvl3pPr>
+    <a:lvl4pPr marL="1371600" algn="l" defTabSz="914400" rtl="0" eaLnBrk="1" latinLnBrk="0" hangingPunct="1">
+      <a:defRPr sz="1200" kern="1200">
+        <a:solidFill>
+          <a:schemeClr val="tx1"/>
+        </a:solidFill>
+        <a:latin typeface="+mn-lt"/>
+        <a:ea typeface="+mn-ea"/>
+        <a:cs typeface="+mn-cs"/>
+      </a:defRPr>
+    </a:lvl4pPr>
+    <a:lvl5pPr marL="1828800" algn="l" defTabSz="914400" rtl="0" eaLnBrk="1" latinLnBrk="0" hangingPunct="1">
+      <a:defRPr sz="1200" kern="1200">
+        <a:solidFill>
+          <a:schemeClr val="tx1"/>
+        </a:solidFill>
+        <a:latin typeface="+mn-lt"/>
+        <a:ea typeface="+mn-ea"/>
+        <a:cs typeface="+mn-cs"/>
+      </a:defRPr>
+    </a:lvl5pPr>
+    <a:lvl6pPr marL="2286000" algn="l" defTabSz="914400" rtl="0" eaLnBrk="1" latinLnBrk="0" hangingPunct="1">
+      <a:defRPr sz="1200" kern="1200">
+        <a:solidFill>
+          <a:schemeClr val="tx1"/>
+        </a:solidFill>
+        <a:latin typeface="+mn-lt"/>
+        <a:ea typeface="+mn-ea"/>
+        <a:cs typeface="+mn-cs"/>
+      </a:defRPr>
+    </a:lvl6pPr>
+    <a:lvl7pPr marL="2743200" algn="l" defTabSz="914400" rtl="0" eaLnBrk="1" latinLnBrk="0" hangingPunct="1">
+      <a:defRPr sz="1200" kern="1200">
+        <a:solidFill>
+          <a:schemeClr val="tx1"/>
+        </a:solidFill>
+        <a:latin typeface="+mn-lt"/>
+        <a:ea typeface="+mn-ea"/>
+        <a:cs typeface="+mn-cs"/>
+      </a:defRPr>
+    </a:lvl7pPr>
+    <a:lvl8pPr marL="3200400" algn="l" defTabSz="914400" rtl="0" eaLnBrk="1" latinLnBrk="0" hangingPunct="1">
+      <a:defRPr sz="1200" kern="1200">
+        <a:solidFill>
+          <a:schemeClr val="tx1"/>
+        </a:solidFill>
+        <a:latin typeface="+mn-lt"/>
+        <a:ea typeface="+mn-ea"/>
+        <a:cs typeface="+mn-cs"/>
+      </a:defRPr>
+    </a:lvl8pPr>
+    <a:lvl9pPr marL="3657600" algn="l" defTabSz="914400" rtl="0" eaLnBrk="1" latinLnBrk="0" hangingPunct="1">
+      <a:defRPr sz="1200" kern="1200">
+        <a:solidFill>
+          <a:schemeClr val="tx1"/>
+        </a:solidFill>
+        <a:latin typeface="+mn-lt"/>
+        <a:ea typeface="+mn-ea"/>
+        <a:cs typeface="+mn-cs"/>
+      </a:defRPr>
+    </a:lvl9pPr>
+  </p:notesStyle>
+</p:notesMaster>
+</file>
+
+<file path=ppt/notesSlides/notesSlide1.xml><?xml version="1.0" encoding="utf-8"?>
+<p:notes xmlns:a="http://schemas.openxmlformats.org/drawingml/2006/main" xmlns:r="http://schemas.openxmlformats.org/officeDocument/2006/relationships" xmlns:p="http://schemas.openxmlformats.org/presentationml/2006/main">
+  <p:cSld>
+    <p:spTree>
+      <p:nvGrpSpPr>
+        <p:cNvPr id="1" name=""/>
+        <p:cNvGrpSpPr/>
+        <p:nvPr/>
+      </p:nvGrpSpPr>
+      <p:grpSpPr>
+        <a:xfrm>
+          <a:off x="0" y="0"/>
+          <a:ext cx="0" cy="0"/>
+          <a:chOff x="0" y="0"/>
+          <a:chExt cx="0" cy="0"/>
+        </a:xfrm>
+      </p:grpSpPr>
+      <p:sp>
+        <p:nvSpPr>
+          <p:cNvPr id="2" name="Slide Image Placeholder 1"/>
+          <p:cNvSpPr>
+            <a:spLocks noGrp="1" noRot="1" noChangeAspect="1"/>
+          </p:cNvSpPr>
+          <p:nvPr>
+            <p:ph type="sldImg"/>
+          </p:nvPr>
+        </p:nvSpPr>
+        <p:spPr/>
+      </p:sp>
+      <p:sp>
+        <p:nvSpPr>
+          <p:cNvPr id="3" name="Notes Placeholder 2"/>
+          <p:cNvSpPr>
+            <a:spLocks noGrp="1"/>
+          </p:cNvSpPr>
+          <p:nvPr>
+            <p:ph type="body" idx="1"/>
+          </p:nvPr>
+        </p:nvSpPr>
+        <p:spPr/>
+        <p:txBody>
+          <a:bodyPr/>
+          <a:lstStyle/>
+          <a:p>
+            <a:r>
+              <a:rPr lang="en-US" dirty="0"/>
+              <a:t>Andrew: “What is the algorithm”, “step by step explanation”, “our implementation(explaining the code)”</a:t>
+            </a:r>
+          </a:p>
+          <a:p>
+            <a:r>
+              <a:rPr lang="en-US" dirty="0"/>
+              <a:t>Alex: “background of algorithm”, “our implementation(show test cases)”, “benchmark</a:t>
+            </a:r>
+            <a:r>
+              <a:rPr lang="en-US"/>
+              <a:t>”, “pros and cons”</a:t>
+            </a:r>
+            <a:endParaRPr lang="en-US" dirty="0"/>
+          </a:p>
+        </p:txBody>
+      </p:sp>
+      <p:sp>
+        <p:nvSpPr>
+          <p:cNvPr id="4" name="Slide Number Placeholder 3"/>
+          <p:cNvSpPr>
+            <a:spLocks noGrp="1"/>
+          </p:cNvSpPr>
+          <p:nvPr>
+            <p:ph type="sldNum" sz="quarter" idx="5"/>
+          </p:nvPr>
+        </p:nvSpPr>
+        <p:spPr/>
+        <p:txBody>
+          <a:bodyPr/>
+          <a:lstStyle/>
+          <a:p>
+            <a:fld id="{37A0A5C6-5E4A-4784-9FF7-C7F273799E85}" type="slidenum">
+              <a:rPr lang="en-US" smtClean="0"/>
+              <a:t>1</a:t>
+            </a:fld>
+            <a:endParaRPr lang="en-US"/>
+          </a:p>
+        </p:txBody>
+      </p:sp>
+    </p:spTree>
+    <p:extLst>
+      <p:ext uri="{BB962C8B-B14F-4D97-AF65-F5344CB8AC3E}">
+        <p14:creationId xmlns:p14="http://schemas.microsoft.com/office/powerpoint/2010/main" val="4060704024"/>
+      </p:ext>
+    </p:extLst>
+  </p:cSld>
+  <p:clrMapOvr>
+    <a:masterClrMapping/>
+  </p:clrMapOvr>
+</p:notes>
+</file>
+
+<file path=ppt/notesSlides/notesSlide2.xml><?xml version="1.0" encoding="utf-8"?>
+<p:notes xmlns:a="http://schemas.openxmlformats.org/drawingml/2006/main" xmlns:r="http://schemas.openxmlformats.org/officeDocument/2006/relationships" xmlns:p="http://schemas.openxmlformats.org/presentationml/2006/main">
+  <p:cSld>
+    <p:spTree>
+      <p:nvGrpSpPr>
+        <p:cNvPr id="1" name=""/>
+        <p:cNvGrpSpPr/>
+        <p:nvPr/>
+      </p:nvGrpSpPr>
+      <p:grpSpPr>
+        <a:xfrm>
+          <a:off x="0" y="0"/>
+          <a:ext cx="0" cy="0"/>
+          <a:chOff x="0" y="0"/>
+          <a:chExt cx="0" cy="0"/>
+        </a:xfrm>
+      </p:grpSpPr>
+      <p:sp>
+        <p:nvSpPr>
+          <p:cNvPr id="2" name="Slide Image Placeholder 1"/>
+          <p:cNvSpPr>
+            <a:spLocks noGrp="1" noRot="1" noChangeAspect="1"/>
+          </p:cNvSpPr>
+          <p:nvPr>
+            <p:ph type="sldImg"/>
+          </p:nvPr>
+        </p:nvSpPr>
+        <p:spPr/>
+      </p:sp>
+      <p:sp>
+        <p:nvSpPr>
+          <p:cNvPr id="3" name="Notes Placeholder 2"/>
+          <p:cNvSpPr>
+            <a:spLocks noGrp="1"/>
+          </p:cNvSpPr>
+          <p:nvPr>
+            <p:ph type="body" idx="1"/>
+          </p:nvPr>
+        </p:nvSpPr>
+        <p:spPr/>
+        <p:txBody>
+          <a:bodyPr/>
+          <a:lstStyle/>
+          <a:p>
+            <a:endParaRPr lang="en-US" dirty="0"/>
+          </a:p>
+          <a:p>
+            <a:endParaRPr lang="en-US" dirty="0"/>
+          </a:p>
+        </p:txBody>
+      </p:sp>
+      <p:sp>
+        <p:nvSpPr>
+          <p:cNvPr id="4" name="Slide Number Placeholder 3"/>
+          <p:cNvSpPr>
+            <a:spLocks noGrp="1"/>
+          </p:cNvSpPr>
+          <p:nvPr>
+            <p:ph type="sldNum" sz="quarter" idx="5"/>
+          </p:nvPr>
+        </p:nvSpPr>
+        <p:spPr/>
+        <p:txBody>
+          <a:bodyPr/>
+          <a:lstStyle/>
+          <a:p>
+            <a:fld id="{37A0A5C6-5E4A-4784-9FF7-C7F273799E85}" type="slidenum">
+              <a:rPr lang="en-US" smtClean="0"/>
+              <a:t>2</a:t>
+            </a:fld>
+            <a:endParaRPr lang="en-US"/>
+          </a:p>
+        </p:txBody>
+      </p:sp>
+    </p:spTree>
+    <p:extLst>
+      <p:ext uri="{BB962C8B-B14F-4D97-AF65-F5344CB8AC3E}">
+        <p14:creationId xmlns:p14="http://schemas.microsoft.com/office/powerpoint/2010/main" val="2606018982"/>
+      </p:ext>
+    </p:extLst>
+  </p:cSld>
+  <p:clrMapOvr>
+    <a:masterClrMapping/>
+  </p:clrMapOvr>
+</p:notes>
+</file>
+
+<file path=ppt/notesSlides/notesSlide3.xml><?xml version="1.0" encoding="utf-8"?>
+<p:notes xmlns:a="http://schemas.openxmlformats.org/drawingml/2006/main" xmlns:r="http://schemas.openxmlformats.org/officeDocument/2006/relationships" xmlns:p="http://schemas.openxmlformats.org/presentationml/2006/main">
+  <p:cSld>
+    <p:spTree>
+      <p:nvGrpSpPr>
+        <p:cNvPr id="1" name=""/>
+        <p:cNvGrpSpPr/>
+        <p:nvPr/>
+      </p:nvGrpSpPr>
+      <p:grpSpPr>
+        <a:xfrm>
+          <a:off x="0" y="0"/>
+          <a:ext cx="0" cy="0"/>
+          <a:chOff x="0" y="0"/>
+          <a:chExt cx="0" cy="0"/>
+        </a:xfrm>
+      </p:grpSpPr>
+      <p:sp>
+        <p:nvSpPr>
+          <p:cNvPr id="2" name="Slide Image Placeholder 1"/>
+          <p:cNvSpPr>
+            <a:spLocks noGrp="1" noRot="1" noChangeAspect="1"/>
+          </p:cNvSpPr>
+          <p:nvPr>
+            <p:ph type="sldImg"/>
+          </p:nvPr>
+        </p:nvSpPr>
+        <p:spPr/>
+      </p:sp>
+      <p:sp>
+        <p:nvSpPr>
+          <p:cNvPr id="3" name="Notes Placeholder 2"/>
+          <p:cNvSpPr>
+            <a:spLocks noGrp="1"/>
+          </p:cNvSpPr>
+          <p:nvPr>
+            <p:ph type="body" idx="1"/>
+          </p:nvPr>
+        </p:nvSpPr>
+        <p:spPr/>
+        <p:txBody>
+          <a:bodyPr/>
+          <a:lstStyle/>
+          <a:p>
+            <a:r>
+              <a:rPr lang="en-US" dirty="0"/>
+              <a:t>Cocktail Shaker sort is very similar to the bubble sorting algorithm, which is not surprising since Cocktail Shaker sort is actually a bidirectional variation of bubble sort.</a:t>
+            </a:r>
+          </a:p>
+        </p:txBody>
+      </p:sp>
+      <p:sp>
+        <p:nvSpPr>
+          <p:cNvPr id="4" name="Slide Number Placeholder 3"/>
+          <p:cNvSpPr>
+            <a:spLocks noGrp="1"/>
+          </p:cNvSpPr>
+          <p:nvPr>
+            <p:ph type="sldNum" sz="quarter" idx="5"/>
+          </p:nvPr>
+        </p:nvSpPr>
+        <p:spPr/>
+        <p:txBody>
+          <a:bodyPr/>
+          <a:lstStyle/>
+          <a:p>
+            <a:fld id="{37A0A5C6-5E4A-4784-9FF7-C7F273799E85}" type="slidenum">
+              <a:rPr lang="en-US" smtClean="0"/>
+              <a:t>3</a:t>
+            </a:fld>
+            <a:endParaRPr lang="en-US"/>
+          </a:p>
+        </p:txBody>
+      </p:sp>
+    </p:spTree>
+    <p:extLst>
+      <p:ext uri="{BB962C8B-B14F-4D97-AF65-F5344CB8AC3E}">
+        <p14:creationId xmlns:p14="http://schemas.microsoft.com/office/powerpoint/2010/main" val="3664055641"/>
+      </p:ext>
+    </p:extLst>
+  </p:cSld>
+  <p:clrMapOvr>
+    <a:masterClrMapping/>
+  </p:clrMapOvr>
+</p:notes>
+</file>
+
+<file path=ppt/notesSlides/notesSlide4.xml><?xml version="1.0" encoding="utf-8"?>
+<p:notes xmlns:a="http://schemas.openxmlformats.org/drawingml/2006/main" xmlns:r="http://schemas.openxmlformats.org/officeDocument/2006/relationships" xmlns:p="http://schemas.openxmlformats.org/presentationml/2006/main">
+  <p:cSld>
+    <p:spTree>
+      <p:nvGrpSpPr>
+        <p:cNvPr id="1" name=""/>
+        <p:cNvGrpSpPr/>
+        <p:nvPr/>
+      </p:nvGrpSpPr>
+      <p:grpSpPr>
+        <a:xfrm>
+          <a:off x="0" y="0"/>
+          <a:ext cx="0" cy="0"/>
+          <a:chOff x="0" y="0"/>
+          <a:chExt cx="0" cy="0"/>
+        </a:xfrm>
+      </p:grpSpPr>
+      <p:sp>
+        <p:nvSpPr>
+          <p:cNvPr id="2" name="Slide Image Placeholder 1"/>
+          <p:cNvSpPr>
+            <a:spLocks noGrp="1" noRot="1" noChangeAspect="1"/>
+          </p:cNvSpPr>
+          <p:nvPr>
+            <p:ph type="sldImg"/>
+          </p:nvPr>
+        </p:nvSpPr>
+        <p:spPr/>
+      </p:sp>
+      <p:sp>
+        <p:nvSpPr>
+          <p:cNvPr id="3" name="Notes Placeholder 2"/>
+          <p:cNvSpPr>
+            <a:spLocks noGrp="1"/>
+          </p:cNvSpPr>
+          <p:nvPr>
+            <p:ph type="body" idx="1"/>
+          </p:nvPr>
+        </p:nvSpPr>
+        <p:spPr/>
+        <p:txBody>
+          <a:bodyPr/>
+          <a:lstStyle/>
+          <a:p>
+            <a:endParaRPr lang="en-US" dirty="0"/>
+          </a:p>
+        </p:txBody>
+      </p:sp>
+      <p:sp>
+        <p:nvSpPr>
+          <p:cNvPr id="4" name="Slide Number Placeholder 3"/>
+          <p:cNvSpPr>
+            <a:spLocks noGrp="1"/>
+          </p:cNvSpPr>
+          <p:nvPr>
+            <p:ph type="sldNum" sz="quarter" idx="5"/>
+          </p:nvPr>
+        </p:nvSpPr>
+        <p:spPr/>
+        <p:txBody>
+          <a:bodyPr/>
+          <a:lstStyle/>
+          <a:p>
+            <a:fld id="{37A0A5C6-5E4A-4784-9FF7-C7F273799E85}" type="slidenum">
+              <a:rPr lang="en-US" smtClean="0"/>
+              <a:t>6</a:t>
+            </a:fld>
+            <a:endParaRPr lang="en-US"/>
+          </a:p>
+        </p:txBody>
+      </p:sp>
+    </p:spTree>
+    <p:extLst>
+      <p:ext uri="{BB962C8B-B14F-4D97-AF65-F5344CB8AC3E}">
+        <p14:creationId xmlns:p14="http://schemas.microsoft.com/office/powerpoint/2010/main" val="2971654395"/>
+      </p:ext>
+    </p:extLst>
+  </p:cSld>
+  <p:clrMapOvr>
+    <a:masterClrMapping/>
+  </p:clrMapOvr>
+</p:notes>
+</file>
+
 <file path=ppt/slideLayouts/slideLayout1.xml><?xml version="1.0" encoding="utf-8"?>
 <p:sldLayout xmlns:a="http://schemas.openxmlformats.org/drawingml/2006/main" xmlns:r="http://schemas.openxmlformats.org/officeDocument/2006/relationships" xmlns:p="http://schemas.openxmlformats.org/presentationml/2006/main" showMasterSp="0" type="title" preserve="1">
   <p:cSld name="Title Slide">
@@ -400,7 +1109,7 @@
           <a:noFill/>
           <a:extLst>
             <a:ext uri="{909E8E84-426E-40dd-AFC4-6F175D3DCCD1}">
-              <a14:hiddenFill xmlns="" xmlns:a14="http://schemas.microsoft.com/office/drawing/2010/main">
+              <a14:hiddenFill xmlns:a14="http://schemas.microsoft.com/office/drawing/2010/main" xmlns="">
                 <a:solidFill>
                   <a:srgbClr val="FFFFFF"/>
                 </a:solidFill>
@@ -460,7 +1169,7 @@
             </a:ln>
             <a:extLst>
               <a:ext uri="{91240B29-F687-4f45-9708-019B960494DF}">
-                <a14:hiddenLine xmlns="" xmlns:a14="http://schemas.microsoft.com/office/drawing/2010/main" w="9525">
+                <a14:hiddenLine xmlns:a14="http://schemas.microsoft.com/office/drawing/2010/main" xmlns="" w="9525">
                   <a:solidFill>
                     <a:srgbClr val="000000"/>
                   </a:solidFill>
@@ -550,7 +1259,7 @@
             </a:ln>
             <a:extLst>
               <a:ext uri="{91240B29-F687-4f45-9708-019B960494DF}">
-                <a14:hiddenLine xmlns="" xmlns:a14="http://schemas.microsoft.com/office/drawing/2010/main" w="9525">
+                <a14:hiddenLine xmlns:a14="http://schemas.microsoft.com/office/drawing/2010/main" xmlns="" w="9525">
                   <a:solidFill>
                     <a:srgbClr val="000000"/>
                   </a:solidFill>
@@ -640,7 +1349,7 @@
             </a:ln>
             <a:extLst>
               <a:ext uri="{91240B29-F687-4f45-9708-019B960494DF}">
-                <a14:hiddenLine xmlns="" xmlns:a14="http://schemas.microsoft.com/office/drawing/2010/main" w="9525">
+                <a14:hiddenLine xmlns:a14="http://schemas.microsoft.com/office/drawing/2010/main" xmlns="" w="9525">
                   <a:solidFill>
                     <a:srgbClr val="000000"/>
                   </a:solidFill>
@@ -674,7 +1383,7 @@
             </a:ln>
             <a:extLst>
               <a:ext uri="{91240B29-F687-4f45-9708-019B960494DF}">
-                <a14:hiddenLine xmlns="" xmlns:a14="http://schemas.microsoft.com/office/drawing/2010/main" w="9525">
+                <a14:hiddenLine xmlns:a14="http://schemas.microsoft.com/office/drawing/2010/main" xmlns="" w="9525">
                   <a:solidFill>
                     <a:srgbClr val="000000"/>
                   </a:solidFill>
@@ -764,7 +1473,7 @@
             </a:ln>
             <a:extLst>
               <a:ext uri="{91240B29-F687-4f45-9708-019B960494DF}">
-                <a14:hiddenLine xmlns="" xmlns:a14="http://schemas.microsoft.com/office/drawing/2010/main" w="9525">
+                <a14:hiddenLine xmlns:a14="http://schemas.microsoft.com/office/drawing/2010/main" xmlns="" w="9525">
                   <a:solidFill>
                     <a:srgbClr val="000000"/>
                   </a:solidFill>
@@ -826,7 +1535,7 @@
             </a:ln>
             <a:extLst>
               <a:ext uri="{91240B29-F687-4f45-9708-019B960494DF}">
-                <a14:hiddenLine xmlns="" xmlns:a14="http://schemas.microsoft.com/office/drawing/2010/main" w="9525">
+                <a14:hiddenLine xmlns:a14="http://schemas.microsoft.com/office/drawing/2010/main" xmlns="" w="9525">
                   <a:solidFill>
                     <a:srgbClr val="000000"/>
                   </a:solidFill>
@@ -888,7 +1597,7 @@
             </a:ln>
             <a:extLst>
               <a:ext uri="{91240B29-F687-4f45-9708-019B960494DF}">
-                <a14:hiddenLine xmlns="" xmlns:a14="http://schemas.microsoft.com/office/drawing/2010/main" w="9525">
+                <a14:hiddenLine xmlns:a14="http://schemas.microsoft.com/office/drawing/2010/main" xmlns="" w="9525">
                   <a:solidFill>
                     <a:srgbClr val="000000"/>
                   </a:solidFill>
@@ -978,7 +1687,7 @@
             </a:ln>
             <a:extLst>
               <a:ext uri="{91240B29-F687-4f45-9708-019B960494DF}">
-                <a14:hiddenLine xmlns="" xmlns:a14="http://schemas.microsoft.com/office/drawing/2010/main" w="9525">
+                <a14:hiddenLine xmlns:a14="http://schemas.microsoft.com/office/drawing/2010/main" xmlns="" w="9525">
                   <a:solidFill>
                     <a:srgbClr val="000000"/>
                   </a:solidFill>
@@ -1040,7 +1749,7 @@
             </a:ln>
             <a:extLst>
               <a:ext uri="{91240B29-F687-4f45-9708-019B960494DF}">
-                <a14:hiddenLine xmlns="" xmlns:a14="http://schemas.microsoft.com/office/drawing/2010/main" w="9525">
+                <a14:hiddenLine xmlns:a14="http://schemas.microsoft.com/office/drawing/2010/main" xmlns="" w="9525">
                   <a:solidFill>
                     <a:srgbClr val="000000"/>
                   </a:solidFill>
@@ -1102,7 +1811,7 @@
             </a:ln>
             <a:extLst>
               <a:ext uri="{91240B29-F687-4f45-9708-019B960494DF}">
-                <a14:hiddenLine xmlns="" xmlns:a14="http://schemas.microsoft.com/office/drawing/2010/main" w="9525">
+                <a14:hiddenLine xmlns:a14="http://schemas.microsoft.com/office/drawing/2010/main" xmlns="" w="9525">
                   <a:solidFill>
                     <a:srgbClr val="000000"/>
                   </a:solidFill>
@@ -1192,7 +1901,7 @@
             </a:ln>
             <a:extLst>
               <a:ext uri="{91240B29-F687-4f45-9708-019B960494DF}">
-                <a14:hiddenLine xmlns="" xmlns:a14="http://schemas.microsoft.com/office/drawing/2010/main" w="9525">
+                <a14:hiddenLine xmlns:a14="http://schemas.microsoft.com/office/drawing/2010/main" xmlns="" w="9525">
                   <a:solidFill>
                     <a:srgbClr val="000000"/>
                   </a:solidFill>
@@ -1282,7 +1991,7 @@
             </a:ln>
             <a:extLst>
               <a:ext uri="{91240B29-F687-4f45-9708-019B960494DF}">
-                <a14:hiddenLine xmlns="" xmlns:a14="http://schemas.microsoft.com/office/drawing/2010/main" w="9525">
+                <a14:hiddenLine xmlns:a14="http://schemas.microsoft.com/office/drawing/2010/main" xmlns="" w="9525">
                   <a:solidFill>
                     <a:srgbClr val="000000"/>
                   </a:solidFill>
@@ -1344,7 +2053,7 @@
             </a:ln>
             <a:extLst>
               <a:ext uri="{91240B29-F687-4f45-9708-019B960494DF}">
-                <a14:hiddenLine xmlns="" xmlns:a14="http://schemas.microsoft.com/office/drawing/2010/main" w="9525">
+                <a14:hiddenLine xmlns:a14="http://schemas.microsoft.com/office/drawing/2010/main" xmlns="" w="9525">
                   <a:solidFill>
                     <a:srgbClr val="000000"/>
                   </a:solidFill>
@@ -1454,7 +2163,7 @@
             </a:ln>
             <a:extLst>
               <a:ext uri="{91240B29-F687-4f45-9708-019B960494DF}">
-                <a14:hiddenLine xmlns="" xmlns:a14="http://schemas.microsoft.com/office/drawing/2010/main" w="9525">
+                <a14:hiddenLine xmlns:a14="http://schemas.microsoft.com/office/drawing/2010/main" xmlns="" w="9525">
                   <a:solidFill>
                     <a:srgbClr val="000000"/>
                   </a:solidFill>
@@ -1516,7 +2225,7 @@
             </a:ln>
             <a:extLst>
               <a:ext uri="{91240B29-F687-4f45-9708-019B960494DF}">
-                <a14:hiddenLine xmlns="" xmlns:a14="http://schemas.microsoft.com/office/drawing/2010/main" w="9525">
+                <a14:hiddenLine xmlns:a14="http://schemas.microsoft.com/office/drawing/2010/main" xmlns="" w="9525">
                   <a:solidFill>
                     <a:srgbClr val="000000"/>
                   </a:solidFill>
@@ -1606,7 +2315,7 @@
             </a:ln>
             <a:extLst>
               <a:ext uri="{91240B29-F687-4f45-9708-019B960494DF}">
-                <a14:hiddenLine xmlns="" xmlns:a14="http://schemas.microsoft.com/office/drawing/2010/main" w="9525">
+                <a14:hiddenLine xmlns:a14="http://schemas.microsoft.com/office/drawing/2010/main" xmlns="" w="9525">
                   <a:solidFill>
                     <a:srgbClr val="000000"/>
                   </a:solidFill>
@@ -1696,7 +2405,7 @@
             </a:ln>
             <a:extLst>
               <a:ext uri="{91240B29-F687-4f45-9708-019B960494DF}">
-                <a14:hiddenLine xmlns="" xmlns:a14="http://schemas.microsoft.com/office/drawing/2010/main" w="9525">
+                <a14:hiddenLine xmlns:a14="http://schemas.microsoft.com/office/drawing/2010/main" xmlns="" w="9525">
                   <a:solidFill>
                     <a:srgbClr val="000000"/>
                   </a:solidFill>
@@ -1758,7 +2467,7 @@
             </a:ln>
             <a:extLst>
               <a:ext uri="{91240B29-F687-4f45-9708-019B960494DF}">
-                <a14:hiddenLine xmlns="" xmlns:a14="http://schemas.microsoft.com/office/drawing/2010/main" w="9525">
+                <a14:hiddenLine xmlns:a14="http://schemas.microsoft.com/office/drawing/2010/main" xmlns="" w="9525">
                   <a:solidFill>
                     <a:srgbClr val="000000"/>
                   </a:solidFill>
@@ -1848,7 +2557,7 @@
             </a:ln>
             <a:extLst>
               <a:ext uri="{91240B29-F687-4f45-9708-019B960494DF}">
-                <a14:hiddenLine xmlns="" xmlns:a14="http://schemas.microsoft.com/office/drawing/2010/main" w="9525">
+                <a14:hiddenLine xmlns:a14="http://schemas.microsoft.com/office/drawing/2010/main" xmlns="" w="9525">
                   <a:solidFill>
                     <a:srgbClr val="000000"/>
                   </a:solidFill>
@@ -1938,7 +2647,7 @@
             </a:ln>
             <a:extLst>
               <a:ext uri="{91240B29-F687-4f45-9708-019B960494DF}">
-                <a14:hiddenLine xmlns="" xmlns:a14="http://schemas.microsoft.com/office/drawing/2010/main" w="9525">
+                <a14:hiddenLine xmlns:a14="http://schemas.microsoft.com/office/drawing/2010/main" xmlns="" w="9525">
                   <a:solidFill>
                     <a:srgbClr val="000000"/>
                   </a:solidFill>
@@ -1994,7 +2703,7 @@
             </a:ln>
             <a:extLst>
               <a:ext uri="{91240B29-F687-4f45-9708-019B960494DF}">
-                <a14:hiddenLine xmlns="" xmlns:a14="http://schemas.microsoft.com/office/drawing/2010/main" w="9525">
+                <a14:hiddenLine xmlns:a14="http://schemas.microsoft.com/office/drawing/2010/main" xmlns="" w="9525">
                   <a:solidFill>
                     <a:srgbClr val="000000"/>
                   </a:solidFill>
@@ -2084,7 +2793,7 @@
             </a:ln>
             <a:extLst>
               <a:ext uri="{91240B29-F687-4f45-9708-019B960494DF}">
-                <a14:hiddenLine xmlns="" xmlns:a14="http://schemas.microsoft.com/office/drawing/2010/main" w="9525">
+                <a14:hiddenLine xmlns:a14="http://schemas.microsoft.com/office/drawing/2010/main" xmlns="" w="9525">
                   <a:solidFill>
                     <a:srgbClr val="000000"/>
                   </a:solidFill>
@@ -2140,7 +2849,7 @@
             </a:ln>
             <a:extLst>
               <a:ext uri="{91240B29-F687-4f45-9708-019B960494DF}">
-                <a14:hiddenLine xmlns="" xmlns:a14="http://schemas.microsoft.com/office/drawing/2010/main" w="9525">
+                <a14:hiddenLine xmlns:a14="http://schemas.microsoft.com/office/drawing/2010/main" xmlns="" w="9525">
                   <a:solidFill>
                     <a:srgbClr val="000000"/>
                   </a:solidFill>
@@ -2230,7 +2939,7 @@
             </a:ln>
             <a:extLst>
               <a:ext uri="{91240B29-F687-4f45-9708-019B960494DF}">
-                <a14:hiddenLine xmlns="" xmlns:a14="http://schemas.microsoft.com/office/drawing/2010/main" w="9525">
+                <a14:hiddenLine xmlns:a14="http://schemas.microsoft.com/office/drawing/2010/main" xmlns="" w="9525">
                   <a:solidFill>
                     <a:srgbClr val="000000"/>
                   </a:solidFill>
@@ -2298,7 +3007,7 @@
             </a:ln>
             <a:extLst>
               <a:ext uri="{91240B29-F687-4f45-9708-019B960494DF}">
-                <a14:hiddenLine xmlns="" xmlns:a14="http://schemas.microsoft.com/office/drawing/2010/main" w="9525">
+                <a14:hiddenLine xmlns:a14="http://schemas.microsoft.com/office/drawing/2010/main" xmlns="" w="9525">
                   <a:solidFill>
                     <a:srgbClr val="000000"/>
                   </a:solidFill>
@@ -2388,7 +3097,7 @@
             </a:ln>
             <a:extLst>
               <a:ext uri="{91240B29-F687-4f45-9708-019B960494DF}">
-                <a14:hiddenLine xmlns="" xmlns:a14="http://schemas.microsoft.com/office/drawing/2010/main" w="9525">
+                <a14:hiddenLine xmlns:a14="http://schemas.microsoft.com/office/drawing/2010/main" xmlns="" w="9525">
                   <a:solidFill>
                     <a:srgbClr val="000000"/>
                   </a:solidFill>
@@ -2456,7 +3165,7 @@
             </a:ln>
             <a:extLst>
               <a:ext uri="{91240B29-F687-4f45-9708-019B960494DF}">
-                <a14:hiddenLine xmlns="" xmlns:a14="http://schemas.microsoft.com/office/drawing/2010/main" w="9525">
+                <a14:hiddenLine xmlns:a14="http://schemas.microsoft.com/office/drawing/2010/main" xmlns="" w="9525">
                   <a:solidFill>
                     <a:srgbClr val="000000"/>
                   </a:solidFill>
@@ -2546,7 +3255,7 @@
             </a:ln>
             <a:extLst>
               <a:ext uri="{91240B29-F687-4f45-9708-019B960494DF}">
-                <a14:hiddenLine xmlns="" xmlns:a14="http://schemas.microsoft.com/office/drawing/2010/main" w="9525">
+                <a14:hiddenLine xmlns:a14="http://schemas.microsoft.com/office/drawing/2010/main" xmlns="" w="9525">
                   <a:solidFill>
                     <a:srgbClr val="000000"/>
                   </a:solidFill>
@@ -2580,7 +3289,7 @@
             </a:ln>
             <a:extLst>
               <a:ext uri="{91240B29-F687-4f45-9708-019B960494DF}">
-                <a14:hiddenLine xmlns="" xmlns:a14="http://schemas.microsoft.com/office/drawing/2010/main" w="9525">
+                <a14:hiddenLine xmlns:a14="http://schemas.microsoft.com/office/drawing/2010/main" xmlns="" w="9525">
                   <a:solidFill>
                     <a:srgbClr val="000000"/>
                   </a:solidFill>
@@ -2670,7 +3379,7 @@
             </a:ln>
             <a:extLst>
               <a:ext uri="{91240B29-F687-4f45-9708-019B960494DF}">
-                <a14:hiddenLine xmlns="" xmlns:a14="http://schemas.microsoft.com/office/drawing/2010/main" w="9525">
+                <a14:hiddenLine xmlns:a14="http://schemas.microsoft.com/office/drawing/2010/main" xmlns="" w="9525">
                   <a:solidFill>
                     <a:srgbClr val="000000"/>
                   </a:solidFill>
@@ -2732,7 +3441,7 @@
             </a:ln>
             <a:extLst>
               <a:ext uri="{91240B29-F687-4f45-9708-019B960494DF}">
-                <a14:hiddenLine xmlns="" xmlns:a14="http://schemas.microsoft.com/office/drawing/2010/main" w="9525">
+                <a14:hiddenLine xmlns:a14="http://schemas.microsoft.com/office/drawing/2010/main" xmlns="" w="9525">
                   <a:solidFill>
                     <a:srgbClr val="000000"/>
                   </a:solidFill>
@@ -2794,7 +3503,7 @@
             </a:ln>
             <a:extLst>
               <a:ext uri="{91240B29-F687-4f45-9708-019B960494DF}">
-                <a14:hiddenLine xmlns="" xmlns:a14="http://schemas.microsoft.com/office/drawing/2010/main" w="9525">
+                <a14:hiddenLine xmlns:a14="http://schemas.microsoft.com/office/drawing/2010/main" xmlns="" w="9525">
                   <a:solidFill>
                     <a:srgbClr val="000000"/>
                   </a:solidFill>
@@ -2884,7 +3593,7 @@
             </a:ln>
             <a:extLst>
               <a:ext uri="{91240B29-F687-4f45-9708-019B960494DF}">
-                <a14:hiddenLine xmlns="" xmlns:a14="http://schemas.microsoft.com/office/drawing/2010/main" w="9525">
+                <a14:hiddenLine xmlns:a14="http://schemas.microsoft.com/office/drawing/2010/main" xmlns="" w="9525">
                   <a:solidFill>
                     <a:srgbClr val="000000"/>
                   </a:solidFill>
@@ -2952,7 +3661,7 @@
             </a:ln>
             <a:extLst>
               <a:ext uri="{91240B29-F687-4f45-9708-019B960494DF}">
-                <a14:hiddenLine xmlns="" xmlns:a14="http://schemas.microsoft.com/office/drawing/2010/main" w="9525">
+                <a14:hiddenLine xmlns:a14="http://schemas.microsoft.com/office/drawing/2010/main" xmlns="" w="9525">
                   <a:solidFill>
                     <a:srgbClr val="000000"/>
                   </a:solidFill>
@@ -3014,7 +3723,7 @@
             </a:ln>
             <a:extLst>
               <a:ext uri="{91240B29-F687-4f45-9708-019B960494DF}">
-                <a14:hiddenLine xmlns="" xmlns:a14="http://schemas.microsoft.com/office/drawing/2010/main" w="9525">
+                <a14:hiddenLine xmlns:a14="http://schemas.microsoft.com/office/drawing/2010/main" xmlns="" w="9525">
                   <a:solidFill>
                     <a:srgbClr val="000000"/>
                   </a:solidFill>
@@ -3104,7 +3813,7 @@
             </a:ln>
             <a:extLst>
               <a:ext uri="{91240B29-F687-4f45-9708-019B960494DF}">
-                <a14:hiddenLine xmlns="" xmlns:a14="http://schemas.microsoft.com/office/drawing/2010/main" w="9525">
+                <a14:hiddenLine xmlns:a14="http://schemas.microsoft.com/office/drawing/2010/main" xmlns="" w="9525">
                   <a:solidFill>
                     <a:srgbClr val="000000"/>
                   </a:solidFill>
@@ -3166,7 +3875,7 @@
             </a:ln>
             <a:extLst>
               <a:ext uri="{91240B29-F687-4f45-9708-019B960494DF}">
-                <a14:hiddenLine xmlns="" xmlns:a14="http://schemas.microsoft.com/office/drawing/2010/main" w="9525">
+                <a14:hiddenLine xmlns:a14="http://schemas.microsoft.com/office/drawing/2010/main" xmlns="" w="9525">
                   <a:solidFill>
                     <a:srgbClr val="000000"/>
                   </a:solidFill>
@@ -3256,7 +3965,7 @@
             </a:ln>
             <a:extLst>
               <a:ext uri="{91240B29-F687-4f45-9708-019B960494DF}">
-                <a14:hiddenLine xmlns="" xmlns:a14="http://schemas.microsoft.com/office/drawing/2010/main" w="9525">
+                <a14:hiddenLine xmlns:a14="http://schemas.microsoft.com/office/drawing/2010/main" xmlns="" w="9525">
                   <a:solidFill>
                     <a:srgbClr val="000000"/>
                   </a:solidFill>
@@ -3318,7 +4027,7 @@
             </a:ln>
             <a:extLst>
               <a:ext uri="{91240B29-F687-4f45-9708-019B960494DF}">
-                <a14:hiddenLine xmlns="" xmlns:a14="http://schemas.microsoft.com/office/drawing/2010/main" w="9525">
+                <a14:hiddenLine xmlns:a14="http://schemas.microsoft.com/office/drawing/2010/main" xmlns="" w="9525">
                   <a:solidFill>
                     <a:srgbClr val="000000"/>
                   </a:solidFill>
@@ -3408,7 +4117,7 @@
             </a:ln>
             <a:extLst>
               <a:ext uri="{91240B29-F687-4f45-9708-019B960494DF}">
-                <a14:hiddenLine xmlns="" xmlns:a14="http://schemas.microsoft.com/office/drawing/2010/main" w="9525">
+                <a14:hiddenLine xmlns:a14="http://schemas.microsoft.com/office/drawing/2010/main" xmlns="" w="9525">
                   <a:solidFill>
                     <a:srgbClr val="000000"/>
                   </a:solidFill>
@@ -3442,7 +4151,7 @@
             </a:ln>
             <a:extLst>
               <a:ext uri="{91240B29-F687-4f45-9708-019B960494DF}">
-                <a14:hiddenLine xmlns="" xmlns:a14="http://schemas.microsoft.com/office/drawing/2010/main" w="9525">
+                <a14:hiddenLine xmlns:a14="http://schemas.microsoft.com/office/drawing/2010/main" xmlns="" w="9525">
                   <a:solidFill>
                     <a:srgbClr val="000000"/>
                   </a:solidFill>
@@ -3507,7 +4216,7 @@
             </a:ln>
             <a:extLst>
               <a:ext uri="{91240B29-F687-4f45-9708-019B960494DF}">
-                <a14:hiddenLine xmlns="" xmlns:a14="http://schemas.microsoft.com/office/drawing/2010/main" w="9525">
+                <a14:hiddenLine xmlns:a14="http://schemas.microsoft.com/office/drawing/2010/main" xmlns="" w="9525">
                   <a:solidFill>
                     <a:srgbClr val="000000"/>
                   </a:solidFill>
@@ -3597,7 +4306,7 @@
             </a:ln>
             <a:extLst>
               <a:ext uri="{91240B29-F687-4f45-9708-019B960494DF}">
-                <a14:hiddenLine xmlns="" xmlns:a14="http://schemas.microsoft.com/office/drawing/2010/main" w="9525">
+                <a14:hiddenLine xmlns:a14="http://schemas.microsoft.com/office/drawing/2010/main" xmlns="" w="9525">
                   <a:solidFill>
                     <a:srgbClr val="000000"/>
                   </a:solidFill>
@@ -3659,7 +4368,7 @@
             </a:ln>
             <a:extLst>
               <a:ext uri="{91240B29-F687-4f45-9708-019B960494DF}">
-                <a14:hiddenLine xmlns="" xmlns:a14="http://schemas.microsoft.com/office/drawing/2010/main" w="9525">
+                <a14:hiddenLine xmlns:a14="http://schemas.microsoft.com/office/drawing/2010/main" xmlns="" w="9525">
                   <a:solidFill>
                     <a:srgbClr val="000000"/>
                   </a:solidFill>
@@ -3749,7 +4458,7 @@
             </a:ln>
             <a:extLst>
               <a:ext uri="{91240B29-F687-4f45-9708-019B960494DF}">
-                <a14:hiddenLine xmlns="" xmlns:a14="http://schemas.microsoft.com/office/drawing/2010/main" w="9525">
+                <a14:hiddenLine xmlns:a14="http://schemas.microsoft.com/office/drawing/2010/main" xmlns="" w="9525">
                   <a:solidFill>
                     <a:srgbClr val="000000"/>
                   </a:solidFill>
@@ -3839,7 +4548,7 @@
             </a:ln>
             <a:extLst>
               <a:ext uri="{91240B29-F687-4f45-9708-019B960494DF}">
-                <a14:hiddenLine xmlns="" xmlns:a14="http://schemas.microsoft.com/office/drawing/2010/main" w="9525">
+                <a14:hiddenLine xmlns:a14="http://schemas.microsoft.com/office/drawing/2010/main" xmlns="" w="9525">
                   <a:solidFill>
                     <a:srgbClr val="000000"/>
                   </a:solidFill>
@@ -3904,7 +4613,7 @@
             </a:ln>
             <a:extLst>
               <a:ext uri="{91240B29-F687-4f45-9708-019B960494DF}">
-                <a14:hiddenLine xmlns="" xmlns:a14="http://schemas.microsoft.com/office/drawing/2010/main" w="9525">
+                <a14:hiddenLine xmlns:a14="http://schemas.microsoft.com/office/drawing/2010/main" xmlns="" w="9525">
                   <a:solidFill>
                     <a:srgbClr val="000000"/>
                   </a:solidFill>
@@ -3966,7 +4675,7 @@
             </a:ln>
             <a:extLst>
               <a:ext uri="{91240B29-F687-4f45-9708-019B960494DF}">
-                <a14:hiddenLine xmlns="" xmlns:a14="http://schemas.microsoft.com/office/drawing/2010/main" w="9525">
+                <a14:hiddenLine xmlns:a14="http://schemas.microsoft.com/office/drawing/2010/main" xmlns="" w="9525">
                   <a:solidFill>
                     <a:srgbClr val="000000"/>
                   </a:solidFill>
@@ -4056,7 +4765,7 @@
             </a:ln>
             <a:extLst>
               <a:ext uri="{91240B29-F687-4f45-9708-019B960494DF}">
-                <a14:hiddenLine xmlns="" xmlns:a14="http://schemas.microsoft.com/office/drawing/2010/main" w="9525">
+                <a14:hiddenLine xmlns:a14="http://schemas.microsoft.com/office/drawing/2010/main" xmlns="" w="9525">
                   <a:solidFill>
                     <a:srgbClr val="000000"/>
                   </a:solidFill>
@@ -4146,7 +4855,7 @@
             </a:ln>
             <a:extLst>
               <a:ext uri="{91240B29-F687-4f45-9708-019B960494DF}">
-                <a14:hiddenLine xmlns="" xmlns:a14="http://schemas.microsoft.com/office/drawing/2010/main" w="9525">
+                <a14:hiddenLine xmlns:a14="http://schemas.microsoft.com/office/drawing/2010/main" xmlns="" w="9525">
                   <a:solidFill>
                     <a:srgbClr val="000000"/>
                   </a:solidFill>
@@ -4208,7 +4917,7 @@
             </a:ln>
             <a:extLst>
               <a:ext uri="{91240B29-F687-4f45-9708-019B960494DF}">
-                <a14:hiddenLine xmlns="" xmlns:a14="http://schemas.microsoft.com/office/drawing/2010/main" w="9525">
+                <a14:hiddenLine xmlns:a14="http://schemas.microsoft.com/office/drawing/2010/main" xmlns="" w="9525">
                   <a:solidFill>
                     <a:srgbClr val="000000"/>
                   </a:solidFill>
@@ -4328,7 +5037,7 @@
             </a:ln>
             <a:extLst>
               <a:ext uri="{91240B29-F687-4f45-9708-019B960494DF}">
-                <a14:hiddenLine xmlns="" xmlns:a14="http://schemas.microsoft.com/office/drawing/2010/main" w="9525">
+                <a14:hiddenLine xmlns:a14="http://schemas.microsoft.com/office/drawing/2010/main" xmlns="" w="9525">
                   <a:solidFill>
                     <a:srgbClr val="000000"/>
                   </a:solidFill>
@@ -4396,7 +5105,7 @@
             </a:ln>
             <a:extLst>
               <a:ext uri="{91240B29-F687-4f45-9708-019B960494DF}">
-                <a14:hiddenLine xmlns="" xmlns:a14="http://schemas.microsoft.com/office/drawing/2010/main" w="9525">
+                <a14:hiddenLine xmlns:a14="http://schemas.microsoft.com/office/drawing/2010/main" xmlns="" w="9525">
                   <a:solidFill>
                     <a:srgbClr val="000000"/>
                   </a:solidFill>
@@ -4486,7 +5195,7 @@
             </a:ln>
             <a:extLst>
               <a:ext uri="{91240B29-F687-4f45-9708-019B960494DF}">
-                <a14:hiddenLine xmlns="" xmlns:a14="http://schemas.microsoft.com/office/drawing/2010/main" w="9525">
+                <a14:hiddenLine xmlns:a14="http://schemas.microsoft.com/office/drawing/2010/main" xmlns="" w="9525">
                   <a:solidFill>
                     <a:srgbClr val="000000"/>
                   </a:solidFill>
@@ -4626,7 +5335,7 @@
           <a:p>
             <a:fld id="{48A87A34-81AB-432B-8DAE-1953F412C126}" type="datetimeFigureOut">
               <a:rPr lang="en-US" dirty="0"/>
-              <a:t>5/18/2020</a:t>
+              <a:t>5/19/2020</a:t>
             </a:fld>
             <a:endParaRPr lang="en-US" dirty="0"/>
           </a:p>
@@ -4888,7 +5597,7 @@
           <a:p>
             <a:fld id="{48A87A34-81AB-432B-8DAE-1953F412C126}" type="datetimeFigureOut">
               <a:rPr lang="en-US" dirty="0"/>
-              <a:t>5/18/2020</a:t>
+              <a:t>5/19/2020</a:t>
             </a:fld>
             <a:endParaRPr lang="en-US" dirty="0"/>
           </a:p>
@@ -5079,7 +5788,7 @@
           <a:p>
             <a:fld id="{48A87A34-81AB-432B-8DAE-1953F412C126}" type="datetimeFigureOut">
               <a:rPr lang="en-US" dirty="0"/>
-              <a:t>5/18/2020</a:t>
+              <a:t>5/19/2020</a:t>
             </a:fld>
             <a:endParaRPr lang="en-US" dirty="0"/>
           </a:p>
@@ -5337,7 +6046,7 @@
           <a:p>
             <a:fld id="{48A87A34-81AB-432B-8DAE-1953F412C126}" type="datetimeFigureOut">
               <a:rPr lang="en-US" dirty="0"/>
-              <a:t>5/18/2020</a:t>
+              <a:t>5/19/2020</a:t>
             </a:fld>
             <a:endParaRPr lang="en-US" dirty="0"/>
           </a:p>
@@ -5766,7 +6475,7 @@
           <a:p>
             <a:fld id="{48A87A34-81AB-432B-8DAE-1953F412C126}" type="datetimeFigureOut">
               <a:rPr lang="en-US" dirty="0"/>
-              <a:t>5/18/2020</a:t>
+              <a:t>5/19/2020</a:t>
             </a:fld>
             <a:endParaRPr lang="en-US" dirty="0"/>
           </a:p>
@@ -6307,7 +7016,7 @@
           <a:p>
             <a:fld id="{48A87A34-81AB-432B-8DAE-1953F412C126}" type="datetimeFigureOut">
               <a:rPr lang="en-US" dirty="0"/>
-              <a:t>5/18/2020</a:t>
+              <a:t>5/19/2020</a:t>
             </a:fld>
             <a:endParaRPr lang="en-US" dirty="0"/>
           </a:p>
@@ -7022,7 +7731,7 @@
           <a:p>
             <a:fld id="{48A87A34-81AB-432B-8DAE-1953F412C126}" type="datetimeFigureOut">
               <a:rPr lang="en-US" dirty="0"/>
-              <a:t>5/18/2020</a:t>
+              <a:t>5/19/2020</a:t>
             </a:fld>
             <a:endParaRPr lang="en-US" dirty="0"/>
           </a:p>
@@ -7187,7 +7896,7 @@
           <a:p>
             <a:fld id="{48A87A34-81AB-432B-8DAE-1953F412C126}" type="datetimeFigureOut">
               <a:rPr lang="en-US" dirty="0"/>
-              <a:t>5/18/2020</a:t>
+              <a:t>5/19/2020</a:t>
             </a:fld>
             <a:endParaRPr lang="en-US" dirty="0"/>
           </a:p>
@@ -7362,7 +8071,7 @@
           <a:p>
             <a:fld id="{48A87A34-81AB-432B-8DAE-1953F412C126}" type="datetimeFigureOut">
               <a:rPr lang="en-US" dirty="0"/>
-              <a:t>5/18/2020</a:t>
+              <a:t>5/19/2020</a:t>
             </a:fld>
             <a:endParaRPr lang="en-US" dirty="0"/>
           </a:p>
@@ -7527,7 +8236,7 @@
           <a:p>
             <a:fld id="{48A87A34-81AB-432B-8DAE-1953F412C126}" type="datetimeFigureOut">
               <a:rPr lang="en-US" dirty="0"/>
-              <a:t>5/18/2020</a:t>
+              <a:t>5/19/2020</a:t>
             </a:fld>
             <a:endParaRPr lang="en-US" dirty="0"/>
           </a:p>
@@ -7772,7 +8481,7 @@
           <a:p>
             <a:fld id="{48A87A34-81AB-432B-8DAE-1953F412C126}" type="datetimeFigureOut">
               <a:rPr lang="en-US" dirty="0"/>
-              <a:t>5/18/2020</a:t>
+              <a:t>5/19/2020</a:t>
             </a:fld>
             <a:endParaRPr lang="en-US" dirty="0"/>
           </a:p>
@@ -7999,7 +8708,7 @@
           <a:p>
             <a:fld id="{48A87A34-81AB-432B-8DAE-1953F412C126}" type="datetimeFigureOut">
               <a:rPr lang="en-US" dirty="0"/>
-              <a:t>5/18/2020</a:t>
+              <a:t>5/19/2020</a:t>
             </a:fld>
             <a:endParaRPr lang="en-US" dirty="0"/>
           </a:p>
@@ -8375,7 +9084,7 @@
           <a:p>
             <a:fld id="{48A87A34-81AB-432B-8DAE-1953F412C126}" type="datetimeFigureOut">
               <a:rPr lang="en-US" dirty="0"/>
-              <a:t>5/18/2020</a:t>
+              <a:t>5/19/2020</a:t>
             </a:fld>
             <a:endParaRPr lang="en-US" dirty="0"/>
           </a:p>
@@ -8488,7 +9197,7 @@
           <a:p>
             <a:fld id="{48A87A34-81AB-432B-8DAE-1953F412C126}" type="datetimeFigureOut">
               <a:rPr lang="en-US" dirty="0"/>
-              <a:t>5/18/2020</a:t>
+              <a:t>5/19/2020</a:t>
             </a:fld>
             <a:endParaRPr lang="en-US" dirty="0"/>
           </a:p>
@@ -8578,7 +9287,7 @@
           <a:p>
             <a:fld id="{48A87A34-81AB-432B-8DAE-1953F412C126}" type="datetimeFigureOut">
               <a:rPr lang="en-US" dirty="0"/>
-              <a:t>5/18/2020</a:t>
+              <a:t>5/19/2020</a:t>
             </a:fld>
             <a:endParaRPr lang="en-US" dirty="0"/>
           </a:p>
@@ -8822,7 +9531,7 @@
           <a:p>
             <a:fld id="{48A87A34-81AB-432B-8DAE-1953F412C126}" type="datetimeFigureOut">
               <a:rPr lang="en-US" dirty="0"/>
-              <a:t>5/18/2020</a:t>
+              <a:t>5/19/2020</a:t>
             </a:fld>
             <a:endParaRPr lang="en-US" dirty="0"/>
           </a:p>
@@ -9097,7 +9806,7 @@
           <a:p>
             <a:fld id="{48A87A34-81AB-432B-8DAE-1953F412C126}" type="datetimeFigureOut">
               <a:rPr lang="en-US" dirty="0"/>
-              <a:t>5/18/2020</a:t>
+              <a:t>5/19/2020</a:t>
             </a:fld>
             <a:endParaRPr lang="en-US" dirty="0"/>
           </a:p>
@@ -9208,7 +9917,7 @@
           <a:noFill/>
           <a:extLst>
             <a:ext uri="{909E8E84-426E-40dd-AFC4-6F175D3DCCD1}">
-              <a14:hiddenFill xmlns="" xmlns:a14="http://schemas.microsoft.com/office/drawing/2010/main">
+              <a14:hiddenFill xmlns:a14="http://schemas.microsoft.com/office/drawing/2010/main" xmlns="">
                 <a:solidFill>
                   <a:srgbClr val="FFFFFF"/>
                 </a:solidFill>
@@ -9282,7 +9991,7 @@
               </a:ln>
               <a:extLst>
                 <a:ext uri="{91240B29-F687-4f45-9708-019B960494DF}">
-                  <a14:hiddenLine xmlns="" xmlns:a14="http://schemas.microsoft.com/office/drawing/2010/main" w="9525">
+                  <a14:hiddenLine xmlns:a14="http://schemas.microsoft.com/office/drawing/2010/main" xmlns="" w="9525">
                     <a:solidFill>
                       <a:srgbClr val="000000"/>
                     </a:solidFill>
@@ -9372,7 +10081,7 @@
               </a:ln>
               <a:extLst>
                 <a:ext uri="{91240B29-F687-4f45-9708-019B960494DF}">
-                  <a14:hiddenLine xmlns="" xmlns:a14="http://schemas.microsoft.com/office/drawing/2010/main" w="9525">
+                  <a14:hiddenLine xmlns:a14="http://schemas.microsoft.com/office/drawing/2010/main" xmlns="" w="9525">
                     <a:solidFill>
                       <a:srgbClr val="000000"/>
                     </a:solidFill>
@@ -9462,7 +10171,7 @@
               </a:ln>
               <a:extLst>
                 <a:ext uri="{91240B29-F687-4f45-9708-019B960494DF}">
-                  <a14:hiddenLine xmlns="" xmlns:a14="http://schemas.microsoft.com/office/drawing/2010/main" w="9525">
+                  <a14:hiddenLine xmlns:a14="http://schemas.microsoft.com/office/drawing/2010/main" xmlns="" w="9525">
                     <a:solidFill>
                       <a:srgbClr val="000000"/>
                     </a:solidFill>
@@ -9524,7 +10233,7 @@
               </a:ln>
               <a:extLst>
                 <a:ext uri="{91240B29-F687-4f45-9708-019B960494DF}">
-                  <a14:hiddenLine xmlns="" xmlns:a14="http://schemas.microsoft.com/office/drawing/2010/main" w="9525">
+                  <a14:hiddenLine xmlns:a14="http://schemas.microsoft.com/office/drawing/2010/main" xmlns="" w="9525">
                     <a:solidFill>
                       <a:srgbClr val="000000"/>
                     </a:solidFill>
@@ -9614,7 +10323,7 @@
               </a:ln>
               <a:extLst>
                 <a:ext uri="{91240B29-F687-4f45-9708-019B960494DF}">
-                  <a14:hiddenLine xmlns="" xmlns:a14="http://schemas.microsoft.com/office/drawing/2010/main" w="9525">
+                  <a14:hiddenLine xmlns:a14="http://schemas.microsoft.com/office/drawing/2010/main" xmlns="" w="9525">
                     <a:solidFill>
                       <a:srgbClr val="000000"/>
                     </a:solidFill>
@@ -9676,7 +10385,7 @@
               </a:ln>
               <a:extLst>
                 <a:ext uri="{91240B29-F687-4f45-9708-019B960494DF}">
-                  <a14:hiddenLine xmlns="" xmlns:a14="http://schemas.microsoft.com/office/drawing/2010/main" w="9525">
+                  <a14:hiddenLine xmlns:a14="http://schemas.microsoft.com/office/drawing/2010/main" xmlns="" w="9525">
                     <a:solidFill>
                       <a:srgbClr val="000000"/>
                     </a:solidFill>
@@ -9738,7 +10447,7 @@
               </a:ln>
               <a:extLst>
                 <a:ext uri="{91240B29-F687-4f45-9708-019B960494DF}">
-                  <a14:hiddenLine xmlns="" xmlns:a14="http://schemas.microsoft.com/office/drawing/2010/main" w="9525">
+                  <a14:hiddenLine xmlns:a14="http://schemas.microsoft.com/office/drawing/2010/main" xmlns="" w="9525">
                     <a:solidFill>
                       <a:srgbClr val="000000"/>
                     </a:solidFill>
@@ -9828,7 +10537,7 @@
               </a:ln>
               <a:extLst>
                 <a:ext uri="{91240B29-F687-4f45-9708-019B960494DF}">
-                  <a14:hiddenLine xmlns="" xmlns:a14="http://schemas.microsoft.com/office/drawing/2010/main" w="9525">
+                  <a14:hiddenLine xmlns:a14="http://schemas.microsoft.com/office/drawing/2010/main" xmlns="" w="9525">
                     <a:solidFill>
                       <a:srgbClr val="000000"/>
                     </a:solidFill>
@@ -9918,7 +10627,7 @@
               </a:ln>
               <a:extLst>
                 <a:ext uri="{91240B29-F687-4f45-9708-019B960494DF}">
-                  <a14:hiddenLine xmlns="" xmlns:a14="http://schemas.microsoft.com/office/drawing/2010/main" w="9525">
+                  <a14:hiddenLine xmlns:a14="http://schemas.microsoft.com/office/drawing/2010/main" xmlns="" w="9525">
                     <a:solidFill>
                       <a:srgbClr val="000000"/>
                     </a:solidFill>
@@ -9980,7 +10689,7 @@
               </a:ln>
               <a:extLst>
                 <a:ext uri="{91240B29-F687-4f45-9708-019B960494DF}">
-                  <a14:hiddenLine xmlns="" xmlns:a14="http://schemas.microsoft.com/office/drawing/2010/main" w="9525">
+                  <a14:hiddenLine xmlns:a14="http://schemas.microsoft.com/office/drawing/2010/main" xmlns="" w="9525">
                     <a:solidFill>
                       <a:srgbClr val="000000"/>
                     </a:solidFill>
@@ -10090,7 +10799,7 @@
               </a:ln>
               <a:extLst>
                 <a:ext uri="{91240B29-F687-4f45-9708-019B960494DF}">
-                  <a14:hiddenLine xmlns="" xmlns:a14="http://schemas.microsoft.com/office/drawing/2010/main" w="9525">
+                  <a14:hiddenLine xmlns:a14="http://schemas.microsoft.com/office/drawing/2010/main" xmlns="" w="9525">
                     <a:solidFill>
                       <a:srgbClr val="000000"/>
                     </a:solidFill>
@@ -10174,7 +10883,7 @@
               </a:ln>
               <a:extLst>
                 <a:ext uri="{91240B29-F687-4f45-9708-019B960494DF}">
-                  <a14:hiddenLine xmlns="" xmlns:a14="http://schemas.microsoft.com/office/drawing/2010/main" w="9525">
+                  <a14:hiddenLine xmlns:a14="http://schemas.microsoft.com/office/drawing/2010/main" xmlns="" w="9525">
                     <a:solidFill>
                       <a:srgbClr val="000000"/>
                     </a:solidFill>
@@ -10236,7 +10945,7 @@
               </a:ln>
               <a:extLst>
                 <a:ext uri="{91240B29-F687-4f45-9708-019B960494DF}">
-                  <a14:hiddenLine xmlns="" xmlns:a14="http://schemas.microsoft.com/office/drawing/2010/main" w="9525">
+                  <a14:hiddenLine xmlns:a14="http://schemas.microsoft.com/office/drawing/2010/main" xmlns="" w="9525">
                     <a:solidFill>
                       <a:srgbClr val="000000"/>
                     </a:solidFill>
@@ -10298,7 +11007,7 @@
               </a:ln>
               <a:extLst>
                 <a:ext uri="{91240B29-F687-4f45-9708-019B960494DF}">
-                  <a14:hiddenLine xmlns="" xmlns:a14="http://schemas.microsoft.com/office/drawing/2010/main" w="9525">
+                  <a14:hiddenLine xmlns:a14="http://schemas.microsoft.com/office/drawing/2010/main" xmlns="" w="9525">
                     <a:solidFill>
                       <a:srgbClr val="000000"/>
                     </a:solidFill>
@@ -10388,7 +11097,7 @@
               </a:ln>
               <a:extLst>
                 <a:ext uri="{91240B29-F687-4f45-9708-019B960494DF}">
-                  <a14:hiddenLine xmlns="" xmlns:a14="http://schemas.microsoft.com/office/drawing/2010/main" w="9525">
+                  <a14:hiddenLine xmlns:a14="http://schemas.microsoft.com/office/drawing/2010/main" xmlns="" w="9525">
                     <a:solidFill>
                       <a:srgbClr val="000000"/>
                     </a:solidFill>
@@ -10422,7 +11131,7 @@
               </a:ln>
               <a:extLst>
                 <a:ext uri="{91240B29-F687-4f45-9708-019B960494DF}">
-                  <a14:hiddenLine xmlns="" xmlns:a14="http://schemas.microsoft.com/office/drawing/2010/main" w="9525">
+                  <a14:hiddenLine xmlns:a14="http://schemas.microsoft.com/office/drawing/2010/main" xmlns="" w="9525">
                     <a:solidFill>
                       <a:srgbClr val="000000"/>
                     </a:solidFill>
@@ -10487,7 +11196,7 @@
               </a:ln>
               <a:extLst>
                 <a:ext uri="{91240B29-F687-4f45-9708-019B960494DF}">
-                  <a14:hiddenLine xmlns="" xmlns:a14="http://schemas.microsoft.com/office/drawing/2010/main" w="9525">
+                  <a14:hiddenLine xmlns:a14="http://schemas.microsoft.com/office/drawing/2010/main" xmlns="" w="9525">
                     <a:solidFill>
                       <a:srgbClr val="000000"/>
                     </a:solidFill>
@@ -10577,7 +11286,7 @@
               </a:ln>
               <a:extLst>
                 <a:ext uri="{91240B29-F687-4f45-9708-019B960494DF}">
-                  <a14:hiddenLine xmlns="" xmlns:a14="http://schemas.microsoft.com/office/drawing/2010/main" w="9525">
+                  <a14:hiddenLine xmlns:a14="http://schemas.microsoft.com/office/drawing/2010/main" xmlns="" w="9525">
                     <a:solidFill>
                       <a:srgbClr val="000000"/>
                     </a:solidFill>
@@ -10639,7 +11348,7 @@
               </a:ln>
               <a:extLst>
                 <a:ext uri="{91240B29-F687-4f45-9708-019B960494DF}">
-                  <a14:hiddenLine xmlns="" xmlns:a14="http://schemas.microsoft.com/office/drawing/2010/main" w="9525">
+                  <a14:hiddenLine xmlns:a14="http://schemas.microsoft.com/office/drawing/2010/main" xmlns="" w="9525">
                     <a:solidFill>
                       <a:srgbClr val="000000"/>
                     </a:solidFill>
@@ -10729,7 +11438,7 @@
               </a:ln>
               <a:extLst>
                 <a:ext uri="{91240B29-F687-4f45-9708-019B960494DF}">
-                  <a14:hiddenLine xmlns="" xmlns:a14="http://schemas.microsoft.com/office/drawing/2010/main" w="9525">
+                  <a14:hiddenLine xmlns:a14="http://schemas.microsoft.com/office/drawing/2010/main" xmlns="" w="9525">
                     <a:solidFill>
                       <a:srgbClr val="000000"/>
                     </a:solidFill>
@@ -10794,7 +11503,7 @@
               </a:ln>
               <a:extLst>
                 <a:ext uri="{91240B29-F687-4f45-9708-019B960494DF}">
-                  <a14:hiddenLine xmlns="" xmlns:a14="http://schemas.microsoft.com/office/drawing/2010/main" w="9525">
+                  <a14:hiddenLine xmlns:a14="http://schemas.microsoft.com/office/drawing/2010/main" xmlns="" w="9525">
                     <a:solidFill>
                       <a:srgbClr val="000000"/>
                     </a:solidFill>
@@ -10856,7 +11565,7 @@
               </a:ln>
               <a:extLst>
                 <a:ext uri="{91240B29-F687-4f45-9708-019B960494DF}">
-                  <a14:hiddenLine xmlns="" xmlns:a14="http://schemas.microsoft.com/office/drawing/2010/main" w="9525">
+                  <a14:hiddenLine xmlns:a14="http://schemas.microsoft.com/office/drawing/2010/main" xmlns="" w="9525">
                     <a:solidFill>
                       <a:srgbClr val="000000"/>
                     </a:solidFill>
@@ -10946,7 +11655,7 @@
               </a:ln>
               <a:extLst>
                 <a:ext uri="{91240B29-F687-4f45-9708-019B960494DF}">
-                  <a14:hiddenLine xmlns="" xmlns:a14="http://schemas.microsoft.com/office/drawing/2010/main" w="9525">
+                  <a14:hiddenLine xmlns:a14="http://schemas.microsoft.com/office/drawing/2010/main" xmlns="" w="9525">
                     <a:solidFill>
                       <a:srgbClr val="000000"/>
                     </a:solidFill>
@@ -11036,7 +11745,7 @@
               </a:ln>
               <a:extLst>
                 <a:ext uri="{91240B29-F687-4f45-9708-019B960494DF}">
-                  <a14:hiddenLine xmlns="" xmlns:a14="http://schemas.microsoft.com/office/drawing/2010/main" w="9525">
+                  <a14:hiddenLine xmlns:a14="http://schemas.microsoft.com/office/drawing/2010/main" xmlns="" w="9525">
                     <a:solidFill>
                       <a:srgbClr val="000000"/>
                     </a:solidFill>
@@ -11101,7 +11810,7 @@
               </a:ln>
               <a:extLst>
                 <a:ext uri="{91240B29-F687-4f45-9708-019B960494DF}">
-                  <a14:hiddenLine xmlns="" xmlns:a14="http://schemas.microsoft.com/office/drawing/2010/main" w="9525">
+                  <a14:hiddenLine xmlns:a14="http://schemas.microsoft.com/office/drawing/2010/main" xmlns="" w="9525">
                     <a:solidFill>
                       <a:srgbClr val="000000"/>
                     </a:solidFill>
@@ -11221,7 +11930,7 @@
               </a:ln>
               <a:extLst>
                 <a:ext uri="{91240B29-F687-4f45-9708-019B960494DF}">
-                  <a14:hiddenLine xmlns="" xmlns:a14="http://schemas.microsoft.com/office/drawing/2010/main" w="9525">
+                  <a14:hiddenLine xmlns:a14="http://schemas.microsoft.com/office/drawing/2010/main" xmlns="" w="9525">
                     <a:solidFill>
                       <a:srgbClr val="000000"/>
                     </a:solidFill>
@@ -11319,7 +12028,7 @@
               </a:ln>
               <a:extLst>
                 <a:ext uri="{91240B29-F687-4f45-9708-019B960494DF}">
-                  <a14:hiddenLine xmlns="" xmlns:a14="http://schemas.microsoft.com/office/drawing/2010/main" w="9525">
+                  <a14:hiddenLine xmlns:a14="http://schemas.microsoft.com/office/drawing/2010/main" xmlns="" w="9525">
                     <a:solidFill>
                       <a:srgbClr val="000000"/>
                     </a:solidFill>
@@ -11434,7 +12143,7 @@
               </a:ln>
               <a:extLst>
                 <a:ext uri="{91240B29-F687-4f45-9708-019B960494DF}">
-                  <a14:hiddenLine xmlns="" xmlns:a14="http://schemas.microsoft.com/office/drawing/2010/main" w="9525">
+                  <a14:hiddenLine xmlns:a14="http://schemas.microsoft.com/office/drawing/2010/main" xmlns="" w="9525">
                     <a:solidFill>
                       <a:srgbClr val="000000"/>
                     </a:solidFill>
@@ -11524,7 +12233,7 @@
               </a:ln>
               <a:extLst>
                 <a:ext uri="{91240B29-F687-4f45-9708-019B960494DF}">
-                  <a14:hiddenLine xmlns="" xmlns:a14="http://schemas.microsoft.com/office/drawing/2010/main" w="9525">
+                  <a14:hiddenLine xmlns:a14="http://schemas.microsoft.com/office/drawing/2010/main" xmlns="" w="9525">
                     <a:solidFill>
                       <a:srgbClr val="000000"/>
                     </a:solidFill>
@@ -11589,7 +12298,7 @@
               </a:ln>
               <a:extLst>
                 <a:ext uri="{91240B29-F687-4f45-9708-019B960494DF}">
-                  <a14:hiddenLine xmlns="" xmlns:a14="http://schemas.microsoft.com/office/drawing/2010/main" w="9525">
+                  <a14:hiddenLine xmlns:a14="http://schemas.microsoft.com/office/drawing/2010/main" xmlns="" w="9525">
                     <a:solidFill>
                       <a:srgbClr val="000000"/>
                     </a:solidFill>
@@ -11679,7 +12388,7 @@
               </a:ln>
               <a:extLst>
                 <a:ext uri="{91240B29-F687-4f45-9708-019B960494DF}">
-                  <a14:hiddenLine xmlns="" xmlns:a14="http://schemas.microsoft.com/office/drawing/2010/main" w="9525">
+                  <a14:hiddenLine xmlns:a14="http://schemas.microsoft.com/office/drawing/2010/main" xmlns="" w="9525">
                     <a:solidFill>
                       <a:srgbClr val="000000"/>
                     </a:solidFill>
@@ -11747,7 +12456,7 @@
               </a:ln>
               <a:extLst>
                 <a:ext uri="{91240B29-F687-4f45-9708-019B960494DF}">
-                  <a14:hiddenLine xmlns="" xmlns:a14="http://schemas.microsoft.com/office/drawing/2010/main" w="9525">
+                  <a14:hiddenLine xmlns:a14="http://schemas.microsoft.com/office/drawing/2010/main" xmlns="" w="9525">
                     <a:solidFill>
                       <a:srgbClr val="000000"/>
                     </a:solidFill>
@@ -11837,7 +12546,7 @@
               </a:ln>
               <a:extLst>
                 <a:ext uri="{91240B29-F687-4f45-9708-019B960494DF}">
-                  <a14:hiddenLine xmlns="" xmlns:a14="http://schemas.microsoft.com/office/drawing/2010/main" w="9525">
+                  <a14:hiddenLine xmlns:a14="http://schemas.microsoft.com/office/drawing/2010/main" xmlns="" w="9525">
                     <a:solidFill>
                       <a:srgbClr val="000000"/>
                     </a:solidFill>
@@ -11905,7 +12614,7 @@
               </a:ln>
               <a:extLst>
                 <a:ext uri="{91240B29-F687-4f45-9708-019B960494DF}">
-                  <a14:hiddenLine xmlns="" xmlns:a14="http://schemas.microsoft.com/office/drawing/2010/main" w="9525">
+                  <a14:hiddenLine xmlns:a14="http://schemas.microsoft.com/office/drawing/2010/main" xmlns="" w="9525">
                     <a:solidFill>
                       <a:srgbClr val="000000"/>
                     </a:solidFill>
@@ -11995,7 +12704,7 @@
               </a:ln>
               <a:extLst>
                 <a:ext uri="{91240B29-F687-4f45-9708-019B960494DF}">
-                  <a14:hiddenLine xmlns="" xmlns:a14="http://schemas.microsoft.com/office/drawing/2010/main" w="9525">
+                  <a14:hiddenLine xmlns:a14="http://schemas.microsoft.com/office/drawing/2010/main" xmlns="" w="9525">
                     <a:solidFill>
                       <a:srgbClr val="000000"/>
                     </a:solidFill>
@@ -12029,7 +12738,7 @@
               </a:ln>
               <a:extLst>
                 <a:ext uri="{91240B29-F687-4f45-9708-019B960494DF}">
-                  <a14:hiddenLine xmlns="" xmlns:a14="http://schemas.microsoft.com/office/drawing/2010/main" w="9525">
+                  <a14:hiddenLine xmlns:a14="http://schemas.microsoft.com/office/drawing/2010/main" xmlns="" w="9525">
                     <a:solidFill>
                       <a:srgbClr val="000000"/>
                     </a:solidFill>
@@ -12170,7 +12879,7 @@
             <a:fld id="{48A87A34-81AB-432B-8DAE-1953F412C126}" type="datetimeFigureOut">
               <a:rPr lang="en-US" dirty="0"/>
               <a:pPr/>
-              <a:t>5/18/2020</a:t>
+              <a:t>5/19/2020</a:t>
             </a:fld>
             <a:endParaRPr lang="en-US" dirty="0"/>
           </a:p>
@@ -12772,7 +13481,7 @@
           <p:nvPr/>
         </p:nvPicPr>
         <p:blipFill>
-          <a:blip r:embed="rId2"/>
+          <a:blip r:embed="rId3"/>
           <a:stretch>
             <a:fillRect/>
           </a:stretch>
@@ -12876,19 +13585,13 @@
           <a:p>
             <a:r>
               <a:rPr lang="en-US" dirty="0"/>
-              <a:t>Variation of bubble sort</a:t>
+              <a:t>Has similarities to Bubble Sort</a:t>
             </a:r>
           </a:p>
           <a:p>
             <a:r>
               <a:rPr lang="en-US" dirty="0"/>
               <a:t>No official creator</a:t>
-            </a:r>
-          </a:p>
-          <a:p>
-            <a:r>
-              <a:rPr lang="en-US" dirty="0"/>
-              <a:t>Similar algorithm is bubble sort</a:t>
             </a:r>
           </a:p>
         </p:txBody>
@@ -13241,20 +13944,8 @@
               <a:buNone/>
             </a:pPr>
             <a:r>
-              <a:rPr lang="en-US"/>
-              <a:t>1</a:t>
-            </a:r>
-            <a:r>
               <a:rPr lang="en-US" dirty="0"/>
-              <a:t>2</a:t>
-            </a:r>
-            <a:r>
-              <a:rPr lang="en-US"/>
-              <a:t> </a:t>
-            </a:r>
-            <a:r>
-              <a:rPr lang="en-US" dirty="0"/>
-              <a:t>hours to fully run all trials</a:t>
+              <a:t>12 hours to fully run all trials</a:t>
             </a:r>
           </a:p>
         </p:txBody>
@@ -13274,7 +13965,7 @@
           <p:nvPr/>
         </p:nvPicPr>
         <p:blipFill>
-          <a:blip r:embed="rId2"/>
+          <a:blip r:embed="rId3"/>
           <a:stretch>
             <a:fillRect/>
           </a:stretch>
@@ -13450,6 +14141,72 @@
     <p:extLst>
       <p:ext uri="{BB962C8B-B14F-4D97-AF65-F5344CB8AC3E}">
         <p14:creationId xmlns:p14="http://schemas.microsoft.com/office/powerpoint/2010/main" val="1509338378"/>
+      </p:ext>
+    </p:extLst>
+  </p:cSld>
+  <p:clrMapOvr>
+    <a:masterClrMapping/>
+  </p:clrMapOvr>
+</p:sld>
+</file>
+
+<file path=ppt/slides/slide8.xml><?xml version="1.0" encoding="utf-8"?>
+<p:sld xmlns:a="http://schemas.openxmlformats.org/drawingml/2006/main" xmlns:r="http://schemas.openxmlformats.org/officeDocument/2006/relationships" xmlns:p="http://schemas.openxmlformats.org/presentationml/2006/main">
+  <p:cSld>
+    <p:spTree>
+      <p:nvGrpSpPr>
+        <p:cNvPr id="1" name=""/>
+        <p:cNvGrpSpPr/>
+        <p:nvPr/>
+      </p:nvGrpSpPr>
+      <p:grpSpPr>
+        <a:xfrm>
+          <a:off x="0" y="0"/>
+          <a:ext cx="0" cy="0"/>
+          <a:chOff x="0" y="0"/>
+          <a:chExt cx="0" cy="0"/>
+        </a:xfrm>
+      </p:grpSpPr>
+      <p:sp>
+        <p:nvSpPr>
+          <p:cNvPr id="2" name="Title 1">
+            <a:extLst>
+              <a:ext uri="{FF2B5EF4-FFF2-40B4-BE49-F238E27FC236}">
+                <a16:creationId xmlns:a16="http://schemas.microsoft.com/office/drawing/2014/main" id="{709BAACC-A72A-4ED4-819F-F391A66EB71A}"/>
+              </a:ext>
+            </a:extLst>
+          </p:cNvPr>
+          <p:cNvSpPr>
+            <a:spLocks noGrp="1"/>
+          </p:cNvSpPr>
+          <p:nvPr>
+            <p:ph type="title"/>
+          </p:nvPr>
+        </p:nvSpPr>
+        <p:spPr>
+          <a:xfrm>
+            <a:off x="2711296" y="2719147"/>
+            <a:ext cx="6769407" cy="1419706"/>
+          </a:xfrm>
+        </p:spPr>
+        <p:txBody>
+          <a:bodyPr>
+            <a:normAutofit/>
+          </a:bodyPr>
+          <a:lstStyle/>
+          <a:p>
+            <a:pPr algn="ctr"/>
+            <a:r>
+              <a:rPr lang="en-US" sz="9600" dirty="0"/>
+              <a:t>Questions?</a:t>
+            </a:r>
+          </a:p>
+        </p:txBody>
+      </p:sp>
+    </p:spTree>
+    <p:extLst>
+      <p:ext uri="{BB962C8B-B14F-4D97-AF65-F5344CB8AC3E}">
+        <p14:creationId xmlns:p14="http://schemas.microsoft.com/office/powerpoint/2010/main" val="1145058260"/>
       </p:ext>
     </p:extLst>
   </p:cSld>
@@ -13708,4 +14465,299 @@
     </a:ext>
   </a:extLst>
 </a:theme>
+</file>
+
+<file path=ppt/theme/theme2.xml><?xml version="1.0" encoding="utf-8"?>
+<a:theme xmlns:a="http://schemas.openxmlformats.org/drawingml/2006/main" name="Office Theme">
+  <a:themeElements>
+    <a:clrScheme name="Office">
+      <a:dk1>
+        <a:sysClr val="windowText" lastClr="000000"/>
+      </a:dk1>
+      <a:lt1>
+        <a:sysClr val="window" lastClr="FFFFFF"/>
+      </a:lt1>
+      <a:dk2>
+        <a:srgbClr val="44546A"/>
+      </a:dk2>
+      <a:lt2>
+        <a:srgbClr val="E7E6E6"/>
+      </a:lt2>
+      <a:accent1>
+        <a:srgbClr val="4472C4"/>
+      </a:accent1>
+      <a:accent2>
+        <a:srgbClr val="ED7D31"/>
+      </a:accent2>
+      <a:accent3>
+        <a:srgbClr val="A5A5A5"/>
+      </a:accent3>
+      <a:accent4>
+        <a:srgbClr val="FFC000"/>
+      </a:accent4>
+      <a:accent5>
+        <a:srgbClr val="5B9BD5"/>
+      </a:accent5>
+      <a:accent6>
+        <a:srgbClr val="70AD47"/>
+      </a:accent6>
+      <a:hlink>
+        <a:srgbClr val="0563C1"/>
+      </a:hlink>
+      <a:folHlink>
+        <a:srgbClr val="954F72"/>
+      </a:folHlink>
+    </a:clrScheme>
+    <a:fontScheme name="Office">
+      <a:majorFont>
+        <a:latin typeface="Calibri Light" panose="020F0302020204030204"/>
+        <a:ea typeface=""/>
+        <a:cs typeface=""/>
+        <a:font script="Jpan" typeface="游ゴシック Light"/>
+        <a:font script="Hang" typeface="맑은 고딕"/>
+        <a:font script="Hans" typeface="等线 Light"/>
+        <a:font script="Hant" typeface="新細明體"/>
+        <a:font script="Arab" typeface="Times New Roman"/>
+        <a:font script="Hebr" typeface="Times New Roman"/>
+        <a:font script="Thai" typeface="Angsana New"/>
+        <a:font script="Ethi" typeface="Nyala"/>
+        <a:font script="Beng" typeface="Vrinda"/>
+        <a:font script="Gujr" typeface="Shruti"/>
+        <a:font script="Khmr" typeface="MoolBoran"/>
+        <a:font script="Knda" typeface="Tunga"/>
+        <a:font script="Guru" typeface="Raavi"/>
+        <a:font script="Cans" typeface="Euphemia"/>
+        <a:font script="Cher" typeface="Plantagenet Cherokee"/>
+        <a:font script="Yiii" typeface="Microsoft Yi Baiti"/>
+        <a:font script="Tibt" typeface="Microsoft Himalaya"/>
+        <a:font script="Thaa" typeface="MV Boli"/>
+        <a:font script="Deva" typeface="Mangal"/>
+        <a:font script="Telu" typeface="Gautami"/>
+        <a:font script="Taml" typeface="Latha"/>
+        <a:font script="Syrc" typeface="Estrangelo Edessa"/>
+        <a:font script="Orya" typeface="Kalinga"/>
+        <a:font script="Mlym" typeface="Kartika"/>
+        <a:font script="Laoo" typeface="DokChampa"/>
+        <a:font script="Sinh" typeface="Iskoola Pota"/>
+        <a:font script="Mong" typeface="Mongolian Baiti"/>
+        <a:font script="Viet" typeface="Times New Roman"/>
+        <a:font script="Uigh" typeface="Microsoft Uighur"/>
+        <a:font script="Geor" typeface="Sylfaen"/>
+        <a:font script="Armn" typeface="Arial"/>
+        <a:font script="Bugi" typeface="Leelawadee UI"/>
+        <a:font script="Bopo" typeface="Microsoft JhengHei"/>
+        <a:font script="Java" typeface="Javanese Text"/>
+        <a:font script="Lisu" typeface="Segoe UI"/>
+        <a:font script="Mymr" typeface="Myanmar Text"/>
+        <a:font script="Nkoo" typeface="Ebrima"/>
+        <a:font script="Olck" typeface="Nirmala UI"/>
+        <a:font script="Osma" typeface="Ebrima"/>
+        <a:font script="Phag" typeface="Phagspa"/>
+        <a:font script="Syrn" typeface="Estrangelo Edessa"/>
+        <a:font script="Syrj" typeface="Estrangelo Edessa"/>
+        <a:font script="Syre" typeface="Estrangelo Edessa"/>
+        <a:font script="Sora" typeface="Nirmala UI"/>
+        <a:font script="Tale" typeface="Microsoft Tai Le"/>
+        <a:font script="Talu" typeface="Microsoft New Tai Lue"/>
+        <a:font script="Tfng" typeface="Ebrima"/>
+      </a:majorFont>
+      <a:minorFont>
+        <a:latin typeface="Calibri" panose="020F0502020204030204"/>
+        <a:ea typeface=""/>
+        <a:cs typeface=""/>
+        <a:font script="Jpan" typeface="游ゴシック"/>
+        <a:font script="Hang" typeface="맑은 고딕"/>
+        <a:font script="Hans" typeface="等线"/>
+        <a:font script="Hant" typeface="新細明體"/>
+        <a:font script="Arab" typeface="Arial"/>
+        <a:font script="Hebr" typeface="Arial"/>
+        <a:font script="Thai" typeface="Cordia New"/>
+        <a:font script="Ethi" typeface="Nyala"/>
+        <a:font script="Beng" typeface="Vrinda"/>
+        <a:font script="Gujr" typeface="Shruti"/>
+        <a:font script="Khmr" typeface="DaunPenh"/>
+        <a:font script="Knda" typeface="Tunga"/>
+        <a:font script="Guru" typeface="Raavi"/>
+        <a:font script="Cans" typeface="Euphemia"/>
+        <a:font script="Cher" typeface="Plantagenet Cherokee"/>
+        <a:font script="Yiii" typeface="Microsoft Yi Baiti"/>
+        <a:font script="Tibt" typeface="Microsoft Himalaya"/>
+        <a:font script="Thaa" typeface="MV Boli"/>
+        <a:font script="Deva" typeface="Mangal"/>
+        <a:font script="Telu" typeface="Gautami"/>
+        <a:font script="Taml" typeface="Latha"/>
+        <a:font script="Syrc" typeface="Estrangelo Edessa"/>
+        <a:font script="Orya" typeface="Kalinga"/>
+        <a:font script="Mlym" typeface="Kartika"/>
+        <a:font script="Laoo" typeface="DokChampa"/>
+        <a:font script="Sinh" typeface="Iskoola Pota"/>
+        <a:font script="Mong" typeface="Mongolian Baiti"/>
+        <a:font script="Viet" typeface="Arial"/>
+        <a:font script="Uigh" typeface="Microsoft Uighur"/>
+        <a:font script="Geor" typeface="Sylfaen"/>
+        <a:font script="Armn" typeface="Arial"/>
+        <a:font script="Bugi" typeface="Leelawadee UI"/>
+        <a:font script="Bopo" typeface="Microsoft JhengHei"/>
+        <a:font script="Java" typeface="Javanese Text"/>
+        <a:font script="Lisu" typeface="Segoe UI"/>
+        <a:font script="Mymr" typeface="Myanmar Text"/>
+        <a:font script="Nkoo" typeface="Ebrima"/>
+        <a:font script="Olck" typeface="Nirmala UI"/>
+        <a:font script="Osma" typeface="Ebrima"/>
+        <a:font script="Phag" typeface="Phagspa"/>
+        <a:font script="Syrn" typeface="Estrangelo Edessa"/>
+        <a:font script="Syrj" typeface="Estrangelo Edessa"/>
+        <a:font script="Syre" typeface="Estrangelo Edessa"/>
+        <a:font script="Sora" typeface="Nirmala UI"/>
+        <a:font script="Tale" typeface="Microsoft Tai Le"/>
+        <a:font script="Talu" typeface="Microsoft New Tai Lue"/>
+        <a:font script="Tfng" typeface="Ebrima"/>
+      </a:minorFont>
+    </a:fontScheme>
+    <a:fmtScheme name="Office">
+      <a:fillStyleLst>
+        <a:solidFill>
+          <a:schemeClr val="phClr"/>
+        </a:solidFill>
+        <a:gradFill rotWithShape="1">
+          <a:gsLst>
+            <a:gs pos="0">
+              <a:schemeClr val="phClr">
+                <a:lumMod val="110000"/>
+                <a:satMod val="105000"/>
+                <a:tint val="67000"/>
+              </a:schemeClr>
+            </a:gs>
+            <a:gs pos="50000">
+              <a:schemeClr val="phClr">
+                <a:lumMod val="105000"/>
+                <a:satMod val="103000"/>
+                <a:tint val="73000"/>
+              </a:schemeClr>
+            </a:gs>
+            <a:gs pos="100000">
+              <a:schemeClr val="phClr">
+                <a:lumMod val="105000"/>
+                <a:satMod val="109000"/>
+                <a:tint val="81000"/>
+              </a:schemeClr>
+            </a:gs>
+          </a:gsLst>
+          <a:lin ang="5400000" scaled="0"/>
+        </a:gradFill>
+        <a:gradFill rotWithShape="1">
+          <a:gsLst>
+            <a:gs pos="0">
+              <a:schemeClr val="phClr">
+                <a:satMod val="103000"/>
+                <a:lumMod val="102000"/>
+                <a:tint val="94000"/>
+              </a:schemeClr>
+            </a:gs>
+            <a:gs pos="50000">
+              <a:schemeClr val="phClr">
+                <a:satMod val="110000"/>
+                <a:lumMod val="100000"/>
+                <a:shade val="100000"/>
+              </a:schemeClr>
+            </a:gs>
+            <a:gs pos="100000">
+              <a:schemeClr val="phClr">
+                <a:lumMod val="99000"/>
+                <a:satMod val="120000"/>
+                <a:shade val="78000"/>
+              </a:schemeClr>
+            </a:gs>
+          </a:gsLst>
+          <a:lin ang="5400000" scaled="0"/>
+        </a:gradFill>
+      </a:fillStyleLst>
+      <a:lnStyleLst>
+        <a:ln w="6350" cap="flat" cmpd="sng" algn="ctr">
+          <a:solidFill>
+            <a:schemeClr val="phClr"/>
+          </a:solidFill>
+          <a:prstDash val="solid"/>
+          <a:miter lim="800000"/>
+        </a:ln>
+        <a:ln w="12700" cap="flat" cmpd="sng" algn="ctr">
+          <a:solidFill>
+            <a:schemeClr val="phClr"/>
+          </a:solidFill>
+          <a:prstDash val="solid"/>
+          <a:miter lim="800000"/>
+        </a:ln>
+        <a:ln w="19050" cap="flat" cmpd="sng" algn="ctr">
+          <a:solidFill>
+            <a:schemeClr val="phClr"/>
+          </a:solidFill>
+          <a:prstDash val="solid"/>
+          <a:miter lim="800000"/>
+        </a:ln>
+      </a:lnStyleLst>
+      <a:effectStyleLst>
+        <a:effectStyle>
+          <a:effectLst/>
+        </a:effectStyle>
+        <a:effectStyle>
+          <a:effectLst/>
+        </a:effectStyle>
+        <a:effectStyle>
+          <a:effectLst>
+            <a:outerShdw blurRad="57150" dist="19050" dir="5400000" algn="ctr" rotWithShape="0">
+              <a:srgbClr val="000000">
+                <a:alpha val="63000"/>
+              </a:srgbClr>
+            </a:outerShdw>
+          </a:effectLst>
+        </a:effectStyle>
+      </a:effectStyleLst>
+      <a:bgFillStyleLst>
+        <a:solidFill>
+          <a:schemeClr val="phClr"/>
+        </a:solidFill>
+        <a:solidFill>
+          <a:schemeClr val="phClr">
+            <a:tint val="95000"/>
+            <a:satMod val="170000"/>
+          </a:schemeClr>
+        </a:solidFill>
+        <a:gradFill rotWithShape="1">
+          <a:gsLst>
+            <a:gs pos="0">
+              <a:schemeClr val="phClr">
+                <a:tint val="93000"/>
+                <a:satMod val="150000"/>
+                <a:shade val="98000"/>
+                <a:lumMod val="102000"/>
+              </a:schemeClr>
+            </a:gs>
+            <a:gs pos="50000">
+              <a:schemeClr val="phClr">
+                <a:tint val="98000"/>
+                <a:satMod val="130000"/>
+                <a:shade val="90000"/>
+                <a:lumMod val="103000"/>
+              </a:schemeClr>
+            </a:gs>
+            <a:gs pos="100000">
+              <a:schemeClr val="phClr">
+                <a:shade val="63000"/>
+                <a:satMod val="120000"/>
+              </a:schemeClr>
+            </a:gs>
+          </a:gsLst>
+          <a:lin ang="5400000" scaled="0"/>
+        </a:gradFill>
+      </a:bgFillStyleLst>
+    </a:fmtScheme>
+  </a:themeElements>
+  <a:objectDefaults/>
+  <a:extraClrSchemeLst/>
+  <a:extLst>
+    <a:ext uri="{05A4C25C-085E-4340-85A3-A5531E510DB2}">
+      <thm15:themeFamily xmlns:thm15="http://schemas.microsoft.com/office/thememl/2012/main" name="Office Theme" id="{62F939B6-93AF-4DB8-9C6B-D6C7DFDC589F}" vid="{4A3C46E8-61CC-4603-A589-7422A47A8E4A}"/>
+    </a:ext>
+  </a:extLst>
+</a:theme>
 </file>
</xml_diff>

<commit_message>
I added an extra cell in the notebook for demonstration purposes. I added bubble sort complexity facts to imporve a slide.
</commit_message>
<xml_diff>
--- a/FinalPresentation.pptx
+++ b/FinalPresentation.pptx
@@ -436,7 +436,7 @@
           <a:p>
             <a:fld id="{CF1E79B3-D9EA-4A60-98AB-7CFEA2F35D22}" type="datetimeFigureOut">
               <a:rPr lang="en-US" smtClean="0"/>
-              <a:t>5/19/2020</a:t>
+              <a:t>5/20/2020</a:t>
             </a:fld>
             <a:endParaRPr lang="en-US"/>
           </a:p>
@@ -1109,7 +1109,7 @@
           <a:noFill/>
           <a:extLst>
             <a:ext uri="{909E8E84-426E-40dd-AFC4-6F175D3DCCD1}">
-              <a14:hiddenFill xmlns:a14="http://schemas.microsoft.com/office/drawing/2010/main" xmlns="">
+              <a14:hiddenFill xmlns="" xmlns:a14="http://schemas.microsoft.com/office/drawing/2010/main">
                 <a:solidFill>
                   <a:srgbClr val="FFFFFF"/>
                 </a:solidFill>
@@ -1169,7 +1169,7 @@
             </a:ln>
             <a:extLst>
               <a:ext uri="{91240B29-F687-4f45-9708-019B960494DF}">
-                <a14:hiddenLine xmlns:a14="http://schemas.microsoft.com/office/drawing/2010/main" xmlns="" w="9525">
+                <a14:hiddenLine xmlns="" xmlns:a14="http://schemas.microsoft.com/office/drawing/2010/main" w="9525">
                   <a:solidFill>
                     <a:srgbClr val="000000"/>
                   </a:solidFill>
@@ -1259,7 +1259,7 @@
             </a:ln>
             <a:extLst>
               <a:ext uri="{91240B29-F687-4f45-9708-019B960494DF}">
-                <a14:hiddenLine xmlns:a14="http://schemas.microsoft.com/office/drawing/2010/main" xmlns="" w="9525">
+                <a14:hiddenLine xmlns="" xmlns:a14="http://schemas.microsoft.com/office/drawing/2010/main" w="9525">
                   <a:solidFill>
                     <a:srgbClr val="000000"/>
                   </a:solidFill>
@@ -1349,7 +1349,7 @@
             </a:ln>
             <a:extLst>
               <a:ext uri="{91240B29-F687-4f45-9708-019B960494DF}">
-                <a14:hiddenLine xmlns:a14="http://schemas.microsoft.com/office/drawing/2010/main" xmlns="" w="9525">
+                <a14:hiddenLine xmlns="" xmlns:a14="http://schemas.microsoft.com/office/drawing/2010/main" w="9525">
                   <a:solidFill>
                     <a:srgbClr val="000000"/>
                   </a:solidFill>
@@ -1383,7 +1383,7 @@
             </a:ln>
             <a:extLst>
               <a:ext uri="{91240B29-F687-4f45-9708-019B960494DF}">
-                <a14:hiddenLine xmlns:a14="http://schemas.microsoft.com/office/drawing/2010/main" xmlns="" w="9525">
+                <a14:hiddenLine xmlns="" xmlns:a14="http://schemas.microsoft.com/office/drawing/2010/main" w="9525">
                   <a:solidFill>
                     <a:srgbClr val="000000"/>
                   </a:solidFill>
@@ -1473,7 +1473,7 @@
             </a:ln>
             <a:extLst>
               <a:ext uri="{91240B29-F687-4f45-9708-019B960494DF}">
-                <a14:hiddenLine xmlns:a14="http://schemas.microsoft.com/office/drawing/2010/main" xmlns="" w="9525">
+                <a14:hiddenLine xmlns="" xmlns:a14="http://schemas.microsoft.com/office/drawing/2010/main" w="9525">
                   <a:solidFill>
                     <a:srgbClr val="000000"/>
                   </a:solidFill>
@@ -1535,7 +1535,7 @@
             </a:ln>
             <a:extLst>
               <a:ext uri="{91240B29-F687-4f45-9708-019B960494DF}">
-                <a14:hiddenLine xmlns:a14="http://schemas.microsoft.com/office/drawing/2010/main" xmlns="" w="9525">
+                <a14:hiddenLine xmlns="" xmlns:a14="http://schemas.microsoft.com/office/drawing/2010/main" w="9525">
                   <a:solidFill>
                     <a:srgbClr val="000000"/>
                   </a:solidFill>
@@ -1597,7 +1597,7 @@
             </a:ln>
             <a:extLst>
               <a:ext uri="{91240B29-F687-4f45-9708-019B960494DF}">
-                <a14:hiddenLine xmlns:a14="http://schemas.microsoft.com/office/drawing/2010/main" xmlns="" w="9525">
+                <a14:hiddenLine xmlns="" xmlns:a14="http://schemas.microsoft.com/office/drawing/2010/main" w="9525">
                   <a:solidFill>
                     <a:srgbClr val="000000"/>
                   </a:solidFill>
@@ -1687,7 +1687,7 @@
             </a:ln>
             <a:extLst>
               <a:ext uri="{91240B29-F687-4f45-9708-019B960494DF}">
-                <a14:hiddenLine xmlns:a14="http://schemas.microsoft.com/office/drawing/2010/main" xmlns="" w="9525">
+                <a14:hiddenLine xmlns="" xmlns:a14="http://schemas.microsoft.com/office/drawing/2010/main" w="9525">
                   <a:solidFill>
                     <a:srgbClr val="000000"/>
                   </a:solidFill>
@@ -1749,7 +1749,7 @@
             </a:ln>
             <a:extLst>
               <a:ext uri="{91240B29-F687-4f45-9708-019B960494DF}">
-                <a14:hiddenLine xmlns:a14="http://schemas.microsoft.com/office/drawing/2010/main" xmlns="" w="9525">
+                <a14:hiddenLine xmlns="" xmlns:a14="http://schemas.microsoft.com/office/drawing/2010/main" w="9525">
                   <a:solidFill>
                     <a:srgbClr val="000000"/>
                   </a:solidFill>
@@ -1811,7 +1811,7 @@
             </a:ln>
             <a:extLst>
               <a:ext uri="{91240B29-F687-4f45-9708-019B960494DF}">
-                <a14:hiddenLine xmlns:a14="http://schemas.microsoft.com/office/drawing/2010/main" xmlns="" w="9525">
+                <a14:hiddenLine xmlns="" xmlns:a14="http://schemas.microsoft.com/office/drawing/2010/main" w="9525">
                   <a:solidFill>
                     <a:srgbClr val="000000"/>
                   </a:solidFill>
@@ -1901,7 +1901,7 @@
             </a:ln>
             <a:extLst>
               <a:ext uri="{91240B29-F687-4f45-9708-019B960494DF}">
-                <a14:hiddenLine xmlns:a14="http://schemas.microsoft.com/office/drawing/2010/main" xmlns="" w="9525">
+                <a14:hiddenLine xmlns="" xmlns:a14="http://schemas.microsoft.com/office/drawing/2010/main" w="9525">
                   <a:solidFill>
                     <a:srgbClr val="000000"/>
                   </a:solidFill>
@@ -1991,7 +1991,7 @@
             </a:ln>
             <a:extLst>
               <a:ext uri="{91240B29-F687-4f45-9708-019B960494DF}">
-                <a14:hiddenLine xmlns:a14="http://schemas.microsoft.com/office/drawing/2010/main" xmlns="" w="9525">
+                <a14:hiddenLine xmlns="" xmlns:a14="http://schemas.microsoft.com/office/drawing/2010/main" w="9525">
                   <a:solidFill>
                     <a:srgbClr val="000000"/>
                   </a:solidFill>
@@ -2053,7 +2053,7 @@
             </a:ln>
             <a:extLst>
               <a:ext uri="{91240B29-F687-4f45-9708-019B960494DF}">
-                <a14:hiddenLine xmlns:a14="http://schemas.microsoft.com/office/drawing/2010/main" xmlns="" w="9525">
+                <a14:hiddenLine xmlns="" xmlns:a14="http://schemas.microsoft.com/office/drawing/2010/main" w="9525">
                   <a:solidFill>
                     <a:srgbClr val="000000"/>
                   </a:solidFill>
@@ -2163,7 +2163,7 @@
             </a:ln>
             <a:extLst>
               <a:ext uri="{91240B29-F687-4f45-9708-019B960494DF}">
-                <a14:hiddenLine xmlns:a14="http://schemas.microsoft.com/office/drawing/2010/main" xmlns="" w="9525">
+                <a14:hiddenLine xmlns="" xmlns:a14="http://schemas.microsoft.com/office/drawing/2010/main" w="9525">
                   <a:solidFill>
                     <a:srgbClr val="000000"/>
                   </a:solidFill>
@@ -2225,7 +2225,7 @@
             </a:ln>
             <a:extLst>
               <a:ext uri="{91240B29-F687-4f45-9708-019B960494DF}">
-                <a14:hiddenLine xmlns:a14="http://schemas.microsoft.com/office/drawing/2010/main" xmlns="" w="9525">
+                <a14:hiddenLine xmlns="" xmlns:a14="http://schemas.microsoft.com/office/drawing/2010/main" w="9525">
                   <a:solidFill>
                     <a:srgbClr val="000000"/>
                   </a:solidFill>
@@ -2315,7 +2315,7 @@
             </a:ln>
             <a:extLst>
               <a:ext uri="{91240B29-F687-4f45-9708-019B960494DF}">
-                <a14:hiddenLine xmlns:a14="http://schemas.microsoft.com/office/drawing/2010/main" xmlns="" w="9525">
+                <a14:hiddenLine xmlns="" xmlns:a14="http://schemas.microsoft.com/office/drawing/2010/main" w="9525">
                   <a:solidFill>
                     <a:srgbClr val="000000"/>
                   </a:solidFill>
@@ -2405,7 +2405,7 @@
             </a:ln>
             <a:extLst>
               <a:ext uri="{91240B29-F687-4f45-9708-019B960494DF}">
-                <a14:hiddenLine xmlns:a14="http://schemas.microsoft.com/office/drawing/2010/main" xmlns="" w="9525">
+                <a14:hiddenLine xmlns="" xmlns:a14="http://schemas.microsoft.com/office/drawing/2010/main" w="9525">
                   <a:solidFill>
                     <a:srgbClr val="000000"/>
                   </a:solidFill>
@@ -2467,7 +2467,7 @@
             </a:ln>
             <a:extLst>
               <a:ext uri="{91240B29-F687-4f45-9708-019B960494DF}">
-                <a14:hiddenLine xmlns:a14="http://schemas.microsoft.com/office/drawing/2010/main" xmlns="" w="9525">
+                <a14:hiddenLine xmlns="" xmlns:a14="http://schemas.microsoft.com/office/drawing/2010/main" w="9525">
                   <a:solidFill>
                     <a:srgbClr val="000000"/>
                   </a:solidFill>
@@ -2557,7 +2557,7 @@
             </a:ln>
             <a:extLst>
               <a:ext uri="{91240B29-F687-4f45-9708-019B960494DF}">
-                <a14:hiddenLine xmlns:a14="http://schemas.microsoft.com/office/drawing/2010/main" xmlns="" w="9525">
+                <a14:hiddenLine xmlns="" xmlns:a14="http://schemas.microsoft.com/office/drawing/2010/main" w="9525">
                   <a:solidFill>
                     <a:srgbClr val="000000"/>
                   </a:solidFill>
@@ -2647,7 +2647,7 @@
             </a:ln>
             <a:extLst>
               <a:ext uri="{91240B29-F687-4f45-9708-019B960494DF}">
-                <a14:hiddenLine xmlns:a14="http://schemas.microsoft.com/office/drawing/2010/main" xmlns="" w="9525">
+                <a14:hiddenLine xmlns="" xmlns:a14="http://schemas.microsoft.com/office/drawing/2010/main" w="9525">
                   <a:solidFill>
                     <a:srgbClr val="000000"/>
                   </a:solidFill>
@@ -2703,7 +2703,7 @@
             </a:ln>
             <a:extLst>
               <a:ext uri="{91240B29-F687-4f45-9708-019B960494DF}">
-                <a14:hiddenLine xmlns:a14="http://schemas.microsoft.com/office/drawing/2010/main" xmlns="" w="9525">
+                <a14:hiddenLine xmlns="" xmlns:a14="http://schemas.microsoft.com/office/drawing/2010/main" w="9525">
                   <a:solidFill>
                     <a:srgbClr val="000000"/>
                   </a:solidFill>
@@ -2793,7 +2793,7 @@
             </a:ln>
             <a:extLst>
               <a:ext uri="{91240B29-F687-4f45-9708-019B960494DF}">
-                <a14:hiddenLine xmlns:a14="http://schemas.microsoft.com/office/drawing/2010/main" xmlns="" w="9525">
+                <a14:hiddenLine xmlns="" xmlns:a14="http://schemas.microsoft.com/office/drawing/2010/main" w="9525">
                   <a:solidFill>
                     <a:srgbClr val="000000"/>
                   </a:solidFill>
@@ -2849,7 +2849,7 @@
             </a:ln>
             <a:extLst>
               <a:ext uri="{91240B29-F687-4f45-9708-019B960494DF}">
-                <a14:hiddenLine xmlns:a14="http://schemas.microsoft.com/office/drawing/2010/main" xmlns="" w="9525">
+                <a14:hiddenLine xmlns="" xmlns:a14="http://schemas.microsoft.com/office/drawing/2010/main" w="9525">
                   <a:solidFill>
                     <a:srgbClr val="000000"/>
                   </a:solidFill>
@@ -2939,7 +2939,7 @@
             </a:ln>
             <a:extLst>
               <a:ext uri="{91240B29-F687-4f45-9708-019B960494DF}">
-                <a14:hiddenLine xmlns:a14="http://schemas.microsoft.com/office/drawing/2010/main" xmlns="" w="9525">
+                <a14:hiddenLine xmlns="" xmlns:a14="http://schemas.microsoft.com/office/drawing/2010/main" w="9525">
                   <a:solidFill>
                     <a:srgbClr val="000000"/>
                   </a:solidFill>
@@ -3007,7 +3007,7 @@
             </a:ln>
             <a:extLst>
               <a:ext uri="{91240B29-F687-4f45-9708-019B960494DF}">
-                <a14:hiddenLine xmlns:a14="http://schemas.microsoft.com/office/drawing/2010/main" xmlns="" w="9525">
+                <a14:hiddenLine xmlns="" xmlns:a14="http://schemas.microsoft.com/office/drawing/2010/main" w="9525">
                   <a:solidFill>
                     <a:srgbClr val="000000"/>
                   </a:solidFill>
@@ -3097,7 +3097,7 @@
             </a:ln>
             <a:extLst>
               <a:ext uri="{91240B29-F687-4f45-9708-019B960494DF}">
-                <a14:hiddenLine xmlns:a14="http://schemas.microsoft.com/office/drawing/2010/main" xmlns="" w="9525">
+                <a14:hiddenLine xmlns="" xmlns:a14="http://schemas.microsoft.com/office/drawing/2010/main" w="9525">
                   <a:solidFill>
                     <a:srgbClr val="000000"/>
                   </a:solidFill>
@@ -3165,7 +3165,7 @@
             </a:ln>
             <a:extLst>
               <a:ext uri="{91240B29-F687-4f45-9708-019B960494DF}">
-                <a14:hiddenLine xmlns:a14="http://schemas.microsoft.com/office/drawing/2010/main" xmlns="" w="9525">
+                <a14:hiddenLine xmlns="" xmlns:a14="http://schemas.microsoft.com/office/drawing/2010/main" w="9525">
                   <a:solidFill>
                     <a:srgbClr val="000000"/>
                   </a:solidFill>
@@ -3255,7 +3255,7 @@
             </a:ln>
             <a:extLst>
               <a:ext uri="{91240B29-F687-4f45-9708-019B960494DF}">
-                <a14:hiddenLine xmlns:a14="http://schemas.microsoft.com/office/drawing/2010/main" xmlns="" w="9525">
+                <a14:hiddenLine xmlns="" xmlns:a14="http://schemas.microsoft.com/office/drawing/2010/main" w="9525">
                   <a:solidFill>
                     <a:srgbClr val="000000"/>
                   </a:solidFill>
@@ -3289,7 +3289,7 @@
             </a:ln>
             <a:extLst>
               <a:ext uri="{91240B29-F687-4f45-9708-019B960494DF}">
-                <a14:hiddenLine xmlns:a14="http://schemas.microsoft.com/office/drawing/2010/main" xmlns="" w="9525">
+                <a14:hiddenLine xmlns="" xmlns:a14="http://schemas.microsoft.com/office/drawing/2010/main" w="9525">
                   <a:solidFill>
                     <a:srgbClr val="000000"/>
                   </a:solidFill>
@@ -3379,7 +3379,7 @@
             </a:ln>
             <a:extLst>
               <a:ext uri="{91240B29-F687-4f45-9708-019B960494DF}">
-                <a14:hiddenLine xmlns:a14="http://schemas.microsoft.com/office/drawing/2010/main" xmlns="" w="9525">
+                <a14:hiddenLine xmlns="" xmlns:a14="http://schemas.microsoft.com/office/drawing/2010/main" w="9525">
                   <a:solidFill>
                     <a:srgbClr val="000000"/>
                   </a:solidFill>
@@ -3441,7 +3441,7 @@
             </a:ln>
             <a:extLst>
               <a:ext uri="{91240B29-F687-4f45-9708-019B960494DF}">
-                <a14:hiddenLine xmlns:a14="http://schemas.microsoft.com/office/drawing/2010/main" xmlns="" w="9525">
+                <a14:hiddenLine xmlns="" xmlns:a14="http://schemas.microsoft.com/office/drawing/2010/main" w="9525">
                   <a:solidFill>
                     <a:srgbClr val="000000"/>
                   </a:solidFill>
@@ -3503,7 +3503,7 @@
             </a:ln>
             <a:extLst>
               <a:ext uri="{91240B29-F687-4f45-9708-019B960494DF}">
-                <a14:hiddenLine xmlns:a14="http://schemas.microsoft.com/office/drawing/2010/main" xmlns="" w="9525">
+                <a14:hiddenLine xmlns="" xmlns:a14="http://schemas.microsoft.com/office/drawing/2010/main" w="9525">
                   <a:solidFill>
                     <a:srgbClr val="000000"/>
                   </a:solidFill>
@@ -3593,7 +3593,7 @@
             </a:ln>
             <a:extLst>
               <a:ext uri="{91240B29-F687-4f45-9708-019B960494DF}">
-                <a14:hiddenLine xmlns:a14="http://schemas.microsoft.com/office/drawing/2010/main" xmlns="" w="9525">
+                <a14:hiddenLine xmlns="" xmlns:a14="http://schemas.microsoft.com/office/drawing/2010/main" w="9525">
                   <a:solidFill>
                     <a:srgbClr val="000000"/>
                   </a:solidFill>
@@ -3661,7 +3661,7 @@
             </a:ln>
             <a:extLst>
               <a:ext uri="{91240B29-F687-4f45-9708-019B960494DF}">
-                <a14:hiddenLine xmlns:a14="http://schemas.microsoft.com/office/drawing/2010/main" xmlns="" w="9525">
+                <a14:hiddenLine xmlns="" xmlns:a14="http://schemas.microsoft.com/office/drawing/2010/main" w="9525">
                   <a:solidFill>
                     <a:srgbClr val="000000"/>
                   </a:solidFill>
@@ -3723,7 +3723,7 @@
             </a:ln>
             <a:extLst>
               <a:ext uri="{91240B29-F687-4f45-9708-019B960494DF}">
-                <a14:hiddenLine xmlns:a14="http://schemas.microsoft.com/office/drawing/2010/main" xmlns="" w="9525">
+                <a14:hiddenLine xmlns="" xmlns:a14="http://schemas.microsoft.com/office/drawing/2010/main" w="9525">
                   <a:solidFill>
                     <a:srgbClr val="000000"/>
                   </a:solidFill>
@@ -3813,7 +3813,7 @@
             </a:ln>
             <a:extLst>
               <a:ext uri="{91240B29-F687-4f45-9708-019B960494DF}">
-                <a14:hiddenLine xmlns:a14="http://schemas.microsoft.com/office/drawing/2010/main" xmlns="" w="9525">
+                <a14:hiddenLine xmlns="" xmlns:a14="http://schemas.microsoft.com/office/drawing/2010/main" w="9525">
                   <a:solidFill>
                     <a:srgbClr val="000000"/>
                   </a:solidFill>
@@ -3875,7 +3875,7 @@
             </a:ln>
             <a:extLst>
               <a:ext uri="{91240B29-F687-4f45-9708-019B960494DF}">
-                <a14:hiddenLine xmlns:a14="http://schemas.microsoft.com/office/drawing/2010/main" xmlns="" w="9525">
+                <a14:hiddenLine xmlns="" xmlns:a14="http://schemas.microsoft.com/office/drawing/2010/main" w="9525">
                   <a:solidFill>
                     <a:srgbClr val="000000"/>
                   </a:solidFill>
@@ -3965,7 +3965,7 @@
             </a:ln>
             <a:extLst>
               <a:ext uri="{91240B29-F687-4f45-9708-019B960494DF}">
-                <a14:hiddenLine xmlns:a14="http://schemas.microsoft.com/office/drawing/2010/main" xmlns="" w="9525">
+                <a14:hiddenLine xmlns="" xmlns:a14="http://schemas.microsoft.com/office/drawing/2010/main" w="9525">
                   <a:solidFill>
                     <a:srgbClr val="000000"/>
                   </a:solidFill>
@@ -4027,7 +4027,7 @@
             </a:ln>
             <a:extLst>
               <a:ext uri="{91240B29-F687-4f45-9708-019B960494DF}">
-                <a14:hiddenLine xmlns:a14="http://schemas.microsoft.com/office/drawing/2010/main" xmlns="" w="9525">
+                <a14:hiddenLine xmlns="" xmlns:a14="http://schemas.microsoft.com/office/drawing/2010/main" w="9525">
                   <a:solidFill>
                     <a:srgbClr val="000000"/>
                   </a:solidFill>
@@ -4117,7 +4117,7 @@
             </a:ln>
             <a:extLst>
               <a:ext uri="{91240B29-F687-4f45-9708-019B960494DF}">
-                <a14:hiddenLine xmlns:a14="http://schemas.microsoft.com/office/drawing/2010/main" xmlns="" w="9525">
+                <a14:hiddenLine xmlns="" xmlns:a14="http://schemas.microsoft.com/office/drawing/2010/main" w="9525">
                   <a:solidFill>
                     <a:srgbClr val="000000"/>
                   </a:solidFill>
@@ -4151,7 +4151,7 @@
             </a:ln>
             <a:extLst>
               <a:ext uri="{91240B29-F687-4f45-9708-019B960494DF}">
-                <a14:hiddenLine xmlns:a14="http://schemas.microsoft.com/office/drawing/2010/main" xmlns="" w="9525">
+                <a14:hiddenLine xmlns="" xmlns:a14="http://schemas.microsoft.com/office/drawing/2010/main" w="9525">
                   <a:solidFill>
                     <a:srgbClr val="000000"/>
                   </a:solidFill>
@@ -4216,7 +4216,7 @@
             </a:ln>
             <a:extLst>
               <a:ext uri="{91240B29-F687-4f45-9708-019B960494DF}">
-                <a14:hiddenLine xmlns:a14="http://schemas.microsoft.com/office/drawing/2010/main" xmlns="" w="9525">
+                <a14:hiddenLine xmlns="" xmlns:a14="http://schemas.microsoft.com/office/drawing/2010/main" w="9525">
                   <a:solidFill>
                     <a:srgbClr val="000000"/>
                   </a:solidFill>
@@ -4306,7 +4306,7 @@
             </a:ln>
             <a:extLst>
               <a:ext uri="{91240B29-F687-4f45-9708-019B960494DF}">
-                <a14:hiddenLine xmlns:a14="http://schemas.microsoft.com/office/drawing/2010/main" xmlns="" w="9525">
+                <a14:hiddenLine xmlns="" xmlns:a14="http://schemas.microsoft.com/office/drawing/2010/main" w="9525">
                   <a:solidFill>
                     <a:srgbClr val="000000"/>
                   </a:solidFill>
@@ -4368,7 +4368,7 @@
             </a:ln>
             <a:extLst>
               <a:ext uri="{91240B29-F687-4f45-9708-019B960494DF}">
-                <a14:hiddenLine xmlns:a14="http://schemas.microsoft.com/office/drawing/2010/main" xmlns="" w="9525">
+                <a14:hiddenLine xmlns="" xmlns:a14="http://schemas.microsoft.com/office/drawing/2010/main" w="9525">
                   <a:solidFill>
                     <a:srgbClr val="000000"/>
                   </a:solidFill>
@@ -4458,7 +4458,7 @@
             </a:ln>
             <a:extLst>
               <a:ext uri="{91240B29-F687-4f45-9708-019B960494DF}">
-                <a14:hiddenLine xmlns:a14="http://schemas.microsoft.com/office/drawing/2010/main" xmlns="" w="9525">
+                <a14:hiddenLine xmlns="" xmlns:a14="http://schemas.microsoft.com/office/drawing/2010/main" w="9525">
                   <a:solidFill>
                     <a:srgbClr val="000000"/>
                   </a:solidFill>
@@ -4548,7 +4548,7 @@
             </a:ln>
             <a:extLst>
               <a:ext uri="{91240B29-F687-4f45-9708-019B960494DF}">
-                <a14:hiddenLine xmlns:a14="http://schemas.microsoft.com/office/drawing/2010/main" xmlns="" w="9525">
+                <a14:hiddenLine xmlns="" xmlns:a14="http://schemas.microsoft.com/office/drawing/2010/main" w="9525">
                   <a:solidFill>
                     <a:srgbClr val="000000"/>
                   </a:solidFill>
@@ -4613,7 +4613,7 @@
             </a:ln>
             <a:extLst>
               <a:ext uri="{91240B29-F687-4f45-9708-019B960494DF}">
-                <a14:hiddenLine xmlns:a14="http://schemas.microsoft.com/office/drawing/2010/main" xmlns="" w="9525">
+                <a14:hiddenLine xmlns="" xmlns:a14="http://schemas.microsoft.com/office/drawing/2010/main" w="9525">
                   <a:solidFill>
                     <a:srgbClr val="000000"/>
                   </a:solidFill>
@@ -4675,7 +4675,7 @@
             </a:ln>
             <a:extLst>
               <a:ext uri="{91240B29-F687-4f45-9708-019B960494DF}">
-                <a14:hiddenLine xmlns:a14="http://schemas.microsoft.com/office/drawing/2010/main" xmlns="" w="9525">
+                <a14:hiddenLine xmlns="" xmlns:a14="http://schemas.microsoft.com/office/drawing/2010/main" w="9525">
                   <a:solidFill>
                     <a:srgbClr val="000000"/>
                   </a:solidFill>
@@ -4765,7 +4765,7 @@
             </a:ln>
             <a:extLst>
               <a:ext uri="{91240B29-F687-4f45-9708-019B960494DF}">
-                <a14:hiddenLine xmlns:a14="http://schemas.microsoft.com/office/drawing/2010/main" xmlns="" w="9525">
+                <a14:hiddenLine xmlns="" xmlns:a14="http://schemas.microsoft.com/office/drawing/2010/main" w="9525">
                   <a:solidFill>
                     <a:srgbClr val="000000"/>
                   </a:solidFill>
@@ -4855,7 +4855,7 @@
             </a:ln>
             <a:extLst>
               <a:ext uri="{91240B29-F687-4f45-9708-019B960494DF}">
-                <a14:hiddenLine xmlns:a14="http://schemas.microsoft.com/office/drawing/2010/main" xmlns="" w="9525">
+                <a14:hiddenLine xmlns="" xmlns:a14="http://schemas.microsoft.com/office/drawing/2010/main" w="9525">
                   <a:solidFill>
                     <a:srgbClr val="000000"/>
                   </a:solidFill>
@@ -4917,7 +4917,7 @@
             </a:ln>
             <a:extLst>
               <a:ext uri="{91240B29-F687-4f45-9708-019B960494DF}">
-                <a14:hiddenLine xmlns:a14="http://schemas.microsoft.com/office/drawing/2010/main" xmlns="" w="9525">
+                <a14:hiddenLine xmlns="" xmlns:a14="http://schemas.microsoft.com/office/drawing/2010/main" w="9525">
                   <a:solidFill>
                     <a:srgbClr val="000000"/>
                   </a:solidFill>
@@ -5037,7 +5037,7 @@
             </a:ln>
             <a:extLst>
               <a:ext uri="{91240B29-F687-4f45-9708-019B960494DF}">
-                <a14:hiddenLine xmlns:a14="http://schemas.microsoft.com/office/drawing/2010/main" xmlns="" w="9525">
+                <a14:hiddenLine xmlns="" xmlns:a14="http://schemas.microsoft.com/office/drawing/2010/main" w="9525">
                   <a:solidFill>
                     <a:srgbClr val="000000"/>
                   </a:solidFill>
@@ -5105,7 +5105,7 @@
             </a:ln>
             <a:extLst>
               <a:ext uri="{91240B29-F687-4f45-9708-019B960494DF}">
-                <a14:hiddenLine xmlns:a14="http://schemas.microsoft.com/office/drawing/2010/main" xmlns="" w="9525">
+                <a14:hiddenLine xmlns="" xmlns:a14="http://schemas.microsoft.com/office/drawing/2010/main" w="9525">
                   <a:solidFill>
                     <a:srgbClr val="000000"/>
                   </a:solidFill>
@@ -5195,7 +5195,7 @@
             </a:ln>
             <a:extLst>
               <a:ext uri="{91240B29-F687-4f45-9708-019B960494DF}">
-                <a14:hiddenLine xmlns:a14="http://schemas.microsoft.com/office/drawing/2010/main" xmlns="" w="9525">
+                <a14:hiddenLine xmlns="" xmlns:a14="http://schemas.microsoft.com/office/drawing/2010/main" w="9525">
                   <a:solidFill>
                     <a:srgbClr val="000000"/>
                   </a:solidFill>
@@ -5335,7 +5335,7 @@
           <a:p>
             <a:fld id="{48A87A34-81AB-432B-8DAE-1953F412C126}" type="datetimeFigureOut">
               <a:rPr lang="en-US" dirty="0"/>
-              <a:t>5/19/2020</a:t>
+              <a:t>5/20/2020</a:t>
             </a:fld>
             <a:endParaRPr lang="en-US" dirty="0"/>
           </a:p>
@@ -5597,7 +5597,7 @@
           <a:p>
             <a:fld id="{48A87A34-81AB-432B-8DAE-1953F412C126}" type="datetimeFigureOut">
               <a:rPr lang="en-US" dirty="0"/>
-              <a:t>5/19/2020</a:t>
+              <a:t>5/20/2020</a:t>
             </a:fld>
             <a:endParaRPr lang="en-US" dirty="0"/>
           </a:p>
@@ -5788,7 +5788,7 @@
           <a:p>
             <a:fld id="{48A87A34-81AB-432B-8DAE-1953F412C126}" type="datetimeFigureOut">
               <a:rPr lang="en-US" dirty="0"/>
-              <a:t>5/19/2020</a:t>
+              <a:t>5/20/2020</a:t>
             </a:fld>
             <a:endParaRPr lang="en-US" dirty="0"/>
           </a:p>
@@ -6046,7 +6046,7 @@
           <a:p>
             <a:fld id="{48A87A34-81AB-432B-8DAE-1953F412C126}" type="datetimeFigureOut">
               <a:rPr lang="en-US" dirty="0"/>
-              <a:t>5/19/2020</a:t>
+              <a:t>5/20/2020</a:t>
             </a:fld>
             <a:endParaRPr lang="en-US" dirty="0"/>
           </a:p>
@@ -6475,7 +6475,7 @@
           <a:p>
             <a:fld id="{48A87A34-81AB-432B-8DAE-1953F412C126}" type="datetimeFigureOut">
               <a:rPr lang="en-US" dirty="0"/>
-              <a:t>5/19/2020</a:t>
+              <a:t>5/20/2020</a:t>
             </a:fld>
             <a:endParaRPr lang="en-US" dirty="0"/>
           </a:p>
@@ -7016,7 +7016,7 @@
           <a:p>
             <a:fld id="{48A87A34-81AB-432B-8DAE-1953F412C126}" type="datetimeFigureOut">
               <a:rPr lang="en-US" dirty="0"/>
-              <a:t>5/19/2020</a:t>
+              <a:t>5/20/2020</a:t>
             </a:fld>
             <a:endParaRPr lang="en-US" dirty="0"/>
           </a:p>
@@ -7731,7 +7731,7 @@
           <a:p>
             <a:fld id="{48A87A34-81AB-432B-8DAE-1953F412C126}" type="datetimeFigureOut">
               <a:rPr lang="en-US" dirty="0"/>
-              <a:t>5/19/2020</a:t>
+              <a:t>5/20/2020</a:t>
             </a:fld>
             <a:endParaRPr lang="en-US" dirty="0"/>
           </a:p>
@@ -7896,7 +7896,7 @@
           <a:p>
             <a:fld id="{48A87A34-81AB-432B-8DAE-1953F412C126}" type="datetimeFigureOut">
               <a:rPr lang="en-US" dirty="0"/>
-              <a:t>5/19/2020</a:t>
+              <a:t>5/20/2020</a:t>
             </a:fld>
             <a:endParaRPr lang="en-US" dirty="0"/>
           </a:p>
@@ -8071,7 +8071,7 @@
           <a:p>
             <a:fld id="{48A87A34-81AB-432B-8DAE-1953F412C126}" type="datetimeFigureOut">
               <a:rPr lang="en-US" dirty="0"/>
-              <a:t>5/19/2020</a:t>
+              <a:t>5/20/2020</a:t>
             </a:fld>
             <a:endParaRPr lang="en-US" dirty="0"/>
           </a:p>
@@ -8236,7 +8236,7 @@
           <a:p>
             <a:fld id="{48A87A34-81AB-432B-8DAE-1953F412C126}" type="datetimeFigureOut">
               <a:rPr lang="en-US" dirty="0"/>
-              <a:t>5/19/2020</a:t>
+              <a:t>5/20/2020</a:t>
             </a:fld>
             <a:endParaRPr lang="en-US" dirty="0"/>
           </a:p>
@@ -8481,7 +8481,7 @@
           <a:p>
             <a:fld id="{48A87A34-81AB-432B-8DAE-1953F412C126}" type="datetimeFigureOut">
               <a:rPr lang="en-US" dirty="0"/>
-              <a:t>5/19/2020</a:t>
+              <a:t>5/20/2020</a:t>
             </a:fld>
             <a:endParaRPr lang="en-US" dirty="0"/>
           </a:p>
@@ -8708,7 +8708,7 @@
           <a:p>
             <a:fld id="{48A87A34-81AB-432B-8DAE-1953F412C126}" type="datetimeFigureOut">
               <a:rPr lang="en-US" dirty="0"/>
-              <a:t>5/19/2020</a:t>
+              <a:t>5/20/2020</a:t>
             </a:fld>
             <a:endParaRPr lang="en-US" dirty="0"/>
           </a:p>
@@ -9084,7 +9084,7 @@
           <a:p>
             <a:fld id="{48A87A34-81AB-432B-8DAE-1953F412C126}" type="datetimeFigureOut">
               <a:rPr lang="en-US" dirty="0"/>
-              <a:t>5/19/2020</a:t>
+              <a:t>5/20/2020</a:t>
             </a:fld>
             <a:endParaRPr lang="en-US" dirty="0"/>
           </a:p>
@@ -9197,7 +9197,7 @@
           <a:p>
             <a:fld id="{48A87A34-81AB-432B-8DAE-1953F412C126}" type="datetimeFigureOut">
               <a:rPr lang="en-US" dirty="0"/>
-              <a:t>5/19/2020</a:t>
+              <a:t>5/20/2020</a:t>
             </a:fld>
             <a:endParaRPr lang="en-US" dirty="0"/>
           </a:p>
@@ -9287,7 +9287,7 @@
           <a:p>
             <a:fld id="{48A87A34-81AB-432B-8DAE-1953F412C126}" type="datetimeFigureOut">
               <a:rPr lang="en-US" dirty="0"/>
-              <a:t>5/19/2020</a:t>
+              <a:t>5/20/2020</a:t>
             </a:fld>
             <a:endParaRPr lang="en-US" dirty="0"/>
           </a:p>
@@ -9531,7 +9531,7 @@
           <a:p>
             <a:fld id="{48A87A34-81AB-432B-8DAE-1953F412C126}" type="datetimeFigureOut">
               <a:rPr lang="en-US" dirty="0"/>
-              <a:t>5/19/2020</a:t>
+              <a:t>5/20/2020</a:t>
             </a:fld>
             <a:endParaRPr lang="en-US" dirty="0"/>
           </a:p>
@@ -9806,7 +9806,7 @@
           <a:p>
             <a:fld id="{48A87A34-81AB-432B-8DAE-1953F412C126}" type="datetimeFigureOut">
               <a:rPr lang="en-US" dirty="0"/>
-              <a:t>5/19/2020</a:t>
+              <a:t>5/20/2020</a:t>
             </a:fld>
             <a:endParaRPr lang="en-US" dirty="0"/>
           </a:p>
@@ -9917,7 +9917,7 @@
           <a:noFill/>
           <a:extLst>
             <a:ext uri="{909E8E84-426E-40dd-AFC4-6F175D3DCCD1}">
-              <a14:hiddenFill xmlns:a14="http://schemas.microsoft.com/office/drawing/2010/main" xmlns="">
+              <a14:hiddenFill xmlns="" xmlns:a14="http://schemas.microsoft.com/office/drawing/2010/main">
                 <a:solidFill>
                   <a:srgbClr val="FFFFFF"/>
                 </a:solidFill>
@@ -9991,7 +9991,7 @@
               </a:ln>
               <a:extLst>
                 <a:ext uri="{91240B29-F687-4f45-9708-019B960494DF}">
-                  <a14:hiddenLine xmlns:a14="http://schemas.microsoft.com/office/drawing/2010/main" xmlns="" w="9525">
+                  <a14:hiddenLine xmlns="" xmlns:a14="http://schemas.microsoft.com/office/drawing/2010/main" w="9525">
                     <a:solidFill>
                       <a:srgbClr val="000000"/>
                     </a:solidFill>
@@ -10081,7 +10081,7 @@
               </a:ln>
               <a:extLst>
                 <a:ext uri="{91240B29-F687-4f45-9708-019B960494DF}">
-                  <a14:hiddenLine xmlns:a14="http://schemas.microsoft.com/office/drawing/2010/main" xmlns="" w="9525">
+                  <a14:hiddenLine xmlns="" xmlns:a14="http://schemas.microsoft.com/office/drawing/2010/main" w="9525">
                     <a:solidFill>
                       <a:srgbClr val="000000"/>
                     </a:solidFill>
@@ -10171,7 +10171,7 @@
               </a:ln>
               <a:extLst>
                 <a:ext uri="{91240B29-F687-4f45-9708-019B960494DF}">
-                  <a14:hiddenLine xmlns:a14="http://schemas.microsoft.com/office/drawing/2010/main" xmlns="" w="9525">
+                  <a14:hiddenLine xmlns="" xmlns:a14="http://schemas.microsoft.com/office/drawing/2010/main" w="9525">
                     <a:solidFill>
                       <a:srgbClr val="000000"/>
                     </a:solidFill>
@@ -10233,7 +10233,7 @@
               </a:ln>
               <a:extLst>
                 <a:ext uri="{91240B29-F687-4f45-9708-019B960494DF}">
-                  <a14:hiddenLine xmlns:a14="http://schemas.microsoft.com/office/drawing/2010/main" xmlns="" w="9525">
+                  <a14:hiddenLine xmlns="" xmlns:a14="http://schemas.microsoft.com/office/drawing/2010/main" w="9525">
                     <a:solidFill>
                       <a:srgbClr val="000000"/>
                     </a:solidFill>
@@ -10323,7 +10323,7 @@
               </a:ln>
               <a:extLst>
                 <a:ext uri="{91240B29-F687-4f45-9708-019B960494DF}">
-                  <a14:hiddenLine xmlns:a14="http://schemas.microsoft.com/office/drawing/2010/main" xmlns="" w="9525">
+                  <a14:hiddenLine xmlns="" xmlns:a14="http://schemas.microsoft.com/office/drawing/2010/main" w="9525">
                     <a:solidFill>
                       <a:srgbClr val="000000"/>
                     </a:solidFill>
@@ -10385,7 +10385,7 @@
               </a:ln>
               <a:extLst>
                 <a:ext uri="{91240B29-F687-4f45-9708-019B960494DF}">
-                  <a14:hiddenLine xmlns:a14="http://schemas.microsoft.com/office/drawing/2010/main" xmlns="" w="9525">
+                  <a14:hiddenLine xmlns="" xmlns:a14="http://schemas.microsoft.com/office/drawing/2010/main" w="9525">
                     <a:solidFill>
                       <a:srgbClr val="000000"/>
                     </a:solidFill>
@@ -10447,7 +10447,7 @@
               </a:ln>
               <a:extLst>
                 <a:ext uri="{91240B29-F687-4f45-9708-019B960494DF}">
-                  <a14:hiddenLine xmlns:a14="http://schemas.microsoft.com/office/drawing/2010/main" xmlns="" w="9525">
+                  <a14:hiddenLine xmlns="" xmlns:a14="http://schemas.microsoft.com/office/drawing/2010/main" w="9525">
                     <a:solidFill>
                       <a:srgbClr val="000000"/>
                     </a:solidFill>
@@ -10537,7 +10537,7 @@
               </a:ln>
               <a:extLst>
                 <a:ext uri="{91240B29-F687-4f45-9708-019B960494DF}">
-                  <a14:hiddenLine xmlns:a14="http://schemas.microsoft.com/office/drawing/2010/main" xmlns="" w="9525">
+                  <a14:hiddenLine xmlns="" xmlns:a14="http://schemas.microsoft.com/office/drawing/2010/main" w="9525">
                     <a:solidFill>
                       <a:srgbClr val="000000"/>
                     </a:solidFill>
@@ -10627,7 +10627,7 @@
               </a:ln>
               <a:extLst>
                 <a:ext uri="{91240B29-F687-4f45-9708-019B960494DF}">
-                  <a14:hiddenLine xmlns:a14="http://schemas.microsoft.com/office/drawing/2010/main" xmlns="" w="9525">
+                  <a14:hiddenLine xmlns="" xmlns:a14="http://schemas.microsoft.com/office/drawing/2010/main" w="9525">
                     <a:solidFill>
                       <a:srgbClr val="000000"/>
                     </a:solidFill>
@@ -10689,7 +10689,7 @@
               </a:ln>
               <a:extLst>
                 <a:ext uri="{91240B29-F687-4f45-9708-019B960494DF}">
-                  <a14:hiddenLine xmlns:a14="http://schemas.microsoft.com/office/drawing/2010/main" xmlns="" w="9525">
+                  <a14:hiddenLine xmlns="" xmlns:a14="http://schemas.microsoft.com/office/drawing/2010/main" w="9525">
                     <a:solidFill>
                       <a:srgbClr val="000000"/>
                     </a:solidFill>
@@ -10799,7 +10799,7 @@
               </a:ln>
               <a:extLst>
                 <a:ext uri="{91240B29-F687-4f45-9708-019B960494DF}">
-                  <a14:hiddenLine xmlns:a14="http://schemas.microsoft.com/office/drawing/2010/main" xmlns="" w="9525">
+                  <a14:hiddenLine xmlns="" xmlns:a14="http://schemas.microsoft.com/office/drawing/2010/main" w="9525">
                     <a:solidFill>
                       <a:srgbClr val="000000"/>
                     </a:solidFill>
@@ -10883,7 +10883,7 @@
               </a:ln>
               <a:extLst>
                 <a:ext uri="{91240B29-F687-4f45-9708-019B960494DF}">
-                  <a14:hiddenLine xmlns:a14="http://schemas.microsoft.com/office/drawing/2010/main" xmlns="" w="9525">
+                  <a14:hiddenLine xmlns="" xmlns:a14="http://schemas.microsoft.com/office/drawing/2010/main" w="9525">
                     <a:solidFill>
                       <a:srgbClr val="000000"/>
                     </a:solidFill>
@@ -10945,7 +10945,7 @@
               </a:ln>
               <a:extLst>
                 <a:ext uri="{91240B29-F687-4f45-9708-019B960494DF}">
-                  <a14:hiddenLine xmlns:a14="http://schemas.microsoft.com/office/drawing/2010/main" xmlns="" w="9525">
+                  <a14:hiddenLine xmlns="" xmlns:a14="http://schemas.microsoft.com/office/drawing/2010/main" w="9525">
                     <a:solidFill>
                       <a:srgbClr val="000000"/>
                     </a:solidFill>
@@ -11007,7 +11007,7 @@
               </a:ln>
               <a:extLst>
                 <a:ext uri="{91240B29-F687-4f45-9708-019B960494DF}">
-                  <a14:hiddenLine xmlns:a14="http://schemas.microsoft.com/office/drawing/2010/main" xmlns="" w="9525">
+                  <a14:hiddenLine xmlns="" xmlns:a14="http://schemas.microsoft.com/office/drawing/2010/main" w="9525">
                     <a:solidFill>
                       <a:srgbClr val="000000"/>
                     </a:solidFill>
@@ -11097,7 +11097,7 @@
               </a:ln>
               <a:extLst>
                 <a:ext uri="{91240B29-F687-4f45-9708-019B960494DF}">
-                  <a14:hiddenLine xmlns:a14="http://schemas.microsoft.com/office/drawing/2010/main" xmlns="" w="9525">
+                  <a14:hiddenLine xmlns="" xmlns:a14="http://schemas.microsoft.com/office/drawing/2010/main" w="9525">
                     <a:solidFill>
                       <a:srgbClr val="000000"/>
                     </a:solidFill>
@@ -11131,7 +11131,7 @@
               </a:ln>
               <a:extLst>
                 <a:ext uri="{91240B29-F687-4f45-9708-019B960494DF}">
-                  <a14:hiddenLine xmlns:a14="http://schemas.microsoft.com/office/drawing/2010/main" xmlns="" w="9525">
+                  <a14:hiddenLine xmlns="" xmlns:a14="http://schemas.microsoft.com/office/drawing/2010/main" w="9525">
                     <a:solidFill>
                       <a:srgbClr val="000000"/>
                     </a:solidFill>
@@ -11196,7 +11196,7 @@
               </a:ln>
               <a:extLst>
                 <a:ext uri="{91240B29-F687-4f45-9708-019B960494DF}">
-                  <a14:hiddenLine xmlns:a14="http://schemas.microsoft.com/office/drawing/2010/main" xmlns="" w="9525">
+                  <a14:hiddenLine xmlns="" xmlns:a14="http://schemas.microsoft.com/office/drawing/2010/main" w="9525">
                     <a:solidFill>
                       <a:srgbClr val="000000"/>
                     </a:solidFill>
@@ -11286,7 +11286,7 @@
               </a:ln>
               <a:extLst>
                 <a:ext uri="{91240B29-F687-4f45-9708-019B960494DF}">
-                  <a14:hiddenLine xmlns:a14="http://schemas.microsoft.com/office/drawing/2010/main" xmlns="" w="9525">
+                  <a14:hiddenLine xmlns="" xmlns:a14="http://schemas.microsoft.com/office/drawing/2010/main" w="9525">
                     <a:solidFill>
                       <a:srgbClr val="000000"/>
                     </a:solidFill>
@@ -11348,7 +11348,7 @@
               </a:ln>
               <a:extLst>
                 <a:ext uri="{91240B29-F687-4f45-9708-019B960494DF}">
-                  <a14:hiddenLine xmlns:a14="http://schemas.microsoft.com/office/drawing/2010/main" xmlns="" w="9525">
+                  <a14:hiddenLine xmlns="" xmlns:a14="http://schemas.microsoft.com/office/drawing/2010/main" w="9525">
                     <a:solidFill>
                       <a:srgbClr val="000000"/>
                     </a:solidFill>
@@ -11438,7 +11438,7 @@
               </a:ln>
               <a:extLst>
                 <a:ext uri="{91240B29-F687-4f45-9708-019B960494DF}">
-                  <a14:hiddenLine xmlns:a14="http://schemas.microsoft.com/office/drawing/2010/main" xmlns="" w="9525">
+                  <a14:hiddenLine xmlns="" xmlns:a14="http://schemas.microsoft.com/office/drawing/2010/main" w="9525">
                     <a:solidFill>
                       <a:srgbClr val="000000"/>
                     </a:solidFill>
@@ -11503,7 +11503,7 @@
               </a:ln>
               <a:extLst>
                 <a:ext uri="{91240B29-F687-4f45-9708-019B960494DF}">
-                  <a14:hiddenLine xmlns:a14="http://schemas.microsoft.com/office/drawing/2010/main" xmlns="" w="9525">
+                  <a14:hiddenLine xmlns="" xmlns:a14="http://schemas.microsoft.com/office/drawing/2010/main" w="9525">
                     <a:solidFill>
                       <a:srgbClr val="000000"/>
                     </a:solidFill>
@@ -11565,7 +11565,7 @@
               </a:ln>
               <a:extLst>
                 <a:ext uri="{91240B29-F687-4f45-9708-019B960494DF}">
-                  <a14:hiddenLine xmlns:a14="http://schemas.microsoft.com/office/drawing/2010/main" xmlns="" w="9525">
+                  <a14:hiddenLine xmlns="" xmlns:a14="http://schemas.microsoft.com/office/drawing/2010/main" w="9525">
                     <a:solidFill>
                       <a:srgbClr val="000000"/>
                     </a:solidFill>
@@ -11655,7 +11655,7 @@
               </a:ln>
               <a:extLst>
                 <a:ext uri="{91240B29-F687-4f45-9708-019B960494DF}">
-                  <a14:hiddenLine xmlns:a14="http://schemas.microsoft.com/office/drawing/2010/main" xmlns="" w="9525">
+                  <a14:hiddenLine xmlns="" xmlns:a14="http://schemas.microsoft.com/office/drawing/2010/main" w="9525">
                     <a:solidFill>
                       <a:srgbClr val="000000"/>
                     </a:solidFill>
@@ -11745,7 +11745,7 @@
               </a:ln>
               <a:extLst>
                 <a:ext uri="{91240B29-F687-4f45-9708-019B960494DF}">
-                  <a14:hiddenLine xmlns:a14="http://schemas.microsoft.com/office/drawing/2010/main" xmlns="" w="9525">
+                  <a14:hiddenLine xmlns="" xmlns:a14="http://schemas.microsoft.com/office/drawing/2010/main" w="9525">
                     <a:solidFill>
                       <a:srgbClr val="000000"/>
                     </a:solidFill>
@@ -11810,7 +11810,7 @@
               </a:ln>
               <a:extLst>
                 <a:ext uri="{91240B29-F687-4f45-9708-019B960494DF}">
-                  <a14:hiddenLine xmlns:a14="http://schemas.microsoft.com/office/drawing/2010/main" xmlns="" w="9525">
+                  <a14:hiddenLine xmlns="" xmlns:a14="http://schemas.microsoft.com/office/drawing/2010/main" w="9525">
                     <a:solidFill>
                       <a:srgbClr val="000000"/>
                     </a:solidFill>
@@ -11930,7 +11930,7 @@
               </a:ln>
               <a:extLst>
                 <a:ext uri="{91240B29-F687-4f45-9708-019B960494DF}">
-                  <a14:hiddenLine xmlns:a14="http://schemas.microsoft.com/office/drawing/2010/main" xmlns="" w="9525">
+                  <a14:hiddenLine xmlns="" xmlns:a14="http://schemas.microsoft.com/office/drawing/2010/main" w="9525">
                     <a:solidFill>
                       <a:srgbClr val="000000"/>
                     </a:solidFill>
@@ -12028,7 +12028,7 @@
               </a:ln>
               <a:extLst>
                 <a:ext uri="{91240B29-F687-4f45-9708-019B960494DF}">
-                  <a14:hiddenLine xmlns:a14="http://schemas.microsoft.com/office/drawing/2010/main" xmlns="" w="9525">
+                  <a14:hiddenLine xmlns="" xmlns:a14="http://schemas.microsoft.com/office/drawing/2010/main" w="9525">
                     <a:solidFill>
                       <a:srgbClr val="000000"/>
                     </a:solidFill>
@@ -12143,7 +12143,7 @@
               </a:ln>
               <a:extLst>
                 <a:ext uri="{91240B29-F687-4f45-9708-019B960494DF}">
-                  <a14:hiddenLine xmlns:a14="http://schemas.microsoft.com/office/drawing/2010/main" xmlns="" w="9525">
+                  <a14:hiddenLine xmlns="" xmlns:a14="http://schemas.microsoft.com/office/drawing/2010/main" w="9525">
                     <a:solidFill>
                       <a:srgbClr val="000000"/>
                     </a:solidFill>
@@ -12233,7 +12233,7 @@
               </a:ln>
               <a:extLst>
                 <a:ext uri="{91240B29-F687-4f45-9708-019B960494DF}">
-                  <a14:hiddenLine xmlns:a14="http://schemas.microsoft.com/office/drawing/2010/main" xmlns="" w="9525">
+                  <a14:hiddenLine xmlns="" xmlns:a14="http://schemas.microsoft.com/office/drawing/2010/main" w="9525">
                     <a:solidFill>
                       <a:srgbClr val="000000"/>
                     </a:solidFill>
@@ -12298,7 +12298,7 @@
               </a:ln>
               <a:extLst>
                 <a:ext uri="{91240B29-F687-4f45-9708-019B960494DF}">
-                  <a14:hiddenLine xmlns:a14="http://schemas.microsoft.com/office/drawing/2010/main" xmlns="" w="9525">
+                  <a14:hiddenLine xmlns="" xmlns:a14="http://schemas.microsoft.com/office/drawing/2010/main" w="9525">
                     <a:solidFill>
                       <a:srgbClr val="000000"/>
                     </a:solidFill>
@@ -12388,7 +12388,7 @@
               </a:ln>
               <a:extLst>
                 <a:ext uri="{91240B29-F687-4f45-9708-019B960494DF}">
-                  <a14:hiddenLine xmlns:a14="http://schemas.microsoft.com/office/drawing/2010/main" xmlns="" w="9525">
+                  <a14:hiddenLine xmlns="" xmlns:a14="http://schemas.microsoft.com/office/drawing/2010/main" w="9525">
                     <a:solidFill>
                       <a:srgbClr val="000000"/>
                     </a:solidFill>
@@ -12456,7 +12456,7 @@
               </a:ln>
               <a:extLst>
                 <a:ext uri="{91240B29-F687-4f45-9708-019B960494DF}">
-                  <a14:hiddenLine xmlns:a14="http://schemas.microsoft.com/office/drawing/2010/main" xmlns="" w="9525">
+                  <a14:hiddenLine xmlns="" xmlns:a14="http://schemas.microsoft.com/office/drawing/2010/main" w="9525">
                     <a:solidFill>
                       <a:srgbClr val="000000"/>
                     </a:solidFill>
@@ -12546,7 +12546,7 @@
               </a:ln>
               <a:extLst>
                 <a:ext uri="{91240B29-F687-4f45-9708-019B960494DF}">
-                  <a14:hiddenLine xmlns:a14="http://schemas.microsoft.com/office/drawing/2010/main" xmlns="" w="9525">
+                  <a14:hiddenLine xmlns="" xmlns:a14="http://schemas.microsoft.com/office/drawing/2010/main" w="9525">
                     <a:solidFill>
                       <a:srgbClr val="000000"/>
                     </a:solidFill>
@@ -12614,7 +12614,7 @@
               </a:ln>
               <a:extLst>
                 <a:ext uri="{91240B29-F687-4f45-9708-019B960494DF}">
-                  <a14:hiddenLine xmlns:a14="http://schemas.microsoft.com/office/drawing/2010/main" xmlns="" w="9525">
+                  <a14:hiddenLine xmlns="" xmlns:a14="http://schemas.microsoft.com/office/drawing/2010/main" w="9525">
                     <a:solidFill>
                       <a:srgbClr val="000000"/>
                     </a:solidFill>
@@ -12704,7 +12704,7 @@
               </a:ln>
               <a:extLst>
                 <a:ext uri="{91240B29-F687-4f45-9708-019B960494DF}">
-                  <a14:hiddenLine xmlns:a14="http://schemas.microsoft.com/office/drawing/2010/main" xmlns="" w="9525">
+                  <a14:hiddenLine xmlns="" xmlns:a14="http://schemas.microsoft.com/office/drawing/2010/main" w="9525">
                     <a:solidFill>
                       <a:srgbClr val="000000"/>
                     </a:solidFill>
@@ -12738,7 +12738,7 @@
               </a:ln>
               <a:extLst>
                 <a:ext uri="{91240B29-F687-4f45-9708-019B960494DF}">
-                  <a14:hiddenLine xmlns:a14="http://schemas.microsoft.com/office/drawing/2010/main" xmlns="" w="9525">
+                  <a14:hiddenLine xmlns="" xmlns:a14="http://schemas.microsoft.com/office/drawing/2010/main" w="9525">
                     <a:solidFill>
                       <a:srgbClr val="000000"/>
                     </a:solidFill>
@@ -12879,7 +12879,7 @@
             <a:fld id="{48A87A34-81AB-432B-8DAE-1953F412C126}" type="datetimeFigureOut">
               <a:rPr lang="en-US" dirty="0"/>
               <a:pPr/>
-              <a:t>5/19/2020</a:t>
+              <a:t>5/20/2020</a:t>
             </a:fld>
             <a:endParaRPr lang="en-US" dirty="0"/>
           </a:p>
@@ -14057,81 +14057,108 @@
         <p:spPr/>
         <p:txBody>
           <a:bodyPr>
-            <a:normAutofit fontScale="85000" lnSpcReduction="10000"/>
+            <a:noAutofit/>
           </a:bodyPr>
           <a:lstStyle/>
           <a:p>
             <a:r>
-              <a:rPr lang="en-US" dirty="0"/>
+              <a:rPr lang="en-US" sz="1100" dirty="0"/>
               <a:t>Time complexity</a:t>
             </a:r>
           </a:p>
           <a:p>
             <a:pPr lvl="1"/>
             <a:r>
-              <a:rPr lang="en-US" dirty="0"/>
+              <a:rPr lang="en-US" sz="1100" dirty="0"/>
               <a:t>Best case: O(n)</a:t>
             </a:r>
           </a:p>
           <a:p>
             <a:pPr lvl="1"/>
             <a:r>
-              <a:rPr lang="en-US" dirty="0"/>
+              <a:rPr lang="en-US" sz="1100" dirty="0"/>
               <a:t>Average/worst case: O(n</a:t>
             </a:r>
             <a:r>
-              <a:rPr lang="en-US" baseline="30000" dirty="0"/>
+              <a:rPr lang="en-US" sz="1100" baseline="30000" dirty="0"/>
               <a:t>2</a:t>
             </a:r>
             <a:r>
-              <a:rPr lang="en-US" dirty="0"/>
+              <a:rPr lang="en-US" sz="1100" dirty="0"/>
               <a:t>)</a:t>
             </a:r>
           </a:p>
           <a:p>
             <a:r>
-              <a:rPr lang="en-US" dirty="0"/>
-              <a:t>Space complexity: O(1)</a:t>
+              <a:rPr lang="en-US" sz="1100" dirty="0"/>
+              <a:t>Worst-Case Space complexity: O(1)</a:t>
             </a:r>
           </a:p>
           <a:p>
             <a:r>
-              <a:rPr lang="en-US" dirty="0"/>
+              <a:rPr lang="en-US" sz="1100" dirty="0"/>
+              <a:t>Bubble Sort complexity</a:t>
+            </a:r>
+          </a:p>
+          <a:p>
+            <a:pPr lvl="1"/>
+            <a:r>
+              <a:rPr lang="en-US" sz="1100" dirty="0"/>
+              <a:t>Best case: O(n)</a:t>
+            </a:r>
+          </a:p>
+          <a:p>
+            <a:pPr lvl="1"/>
+            <a:r>
+              <a:rPr lang="en-US" sz="1100" dirty="0"/>
+              <a:t>Average/worst case: O(n</a:t>
+            </a:r>
+            <a:r>
+              <a:rPr lang="en-US" sz="1100" baseline="30000" dirty="0"/>
+              <a:t>2</a:t>
+            </a:r>
+            <a:r>
+              <a:rPr lang="en-US" sz="1100" dirty="0"/>
+              <a:t>)</a:t>
+            </a:r>
+          </a:p>
+          <a:p>
+            <a:pPr lvl="1"/>
+            <a:r>
+              <a:rPr lang="en-US" sz="1100" dirty="0"/>
+              <a:t>Worst-Case Space Complexity: O(n)</a:t>
+            </a:r>
+          </a:p>
+          <a:p>
+            <a:r>
+              <a:rPr lang="en-US" sz="1100" dirty="0"/>
               <a:t>Pros</a:t>
             </a:r>
           </a:p>
           <a:p>
             <a:pPr lvl="1"/>
             <a:r>
-              <a:rPr lang="en-US" dirty="0"/>
-              <a:t>Sorts through </a:t>
-            </a:r>
-            <a:r>
-              <a:rPr lang="en-US"/>
-              <a:t>elements slightly faster </a:t>
-            </a:r>
-            <a:r>
-              <a:rPr lang="en-US" dirty="0"/>
-              <a:t>than bubble sort</a:t>
+              <a:rPr lang="en-US" sz="1100" dirty="0"/>
+              <a:t>Sorts through elements slightly faster than bubble sort</a:t>
             </a:r>
           </a:p>
           <a:p>
             <a:pPr lvl="1"/>
             <a:r>
-              <a:rPr lang="en-US" dirty="0"/>
+              <a:rPr lang="en-US" sz="1100" dirty="0"/>
               <a:t>Better space complexity than bubble sort</a:t>
             </a:r>
           </a:p>
           <a:p>
             <a:r>
-              <a:rPr lang="en-US" dirty="0"/>
+              <a:rPr lang="en-US" sz="1100" dirty="0"/>
               <a:t>Cons</a:t>
             </a:r>
           </a:p>
           <a:p>
             <a:pPr lvl="1"/>
             <a:r>
-              <a:rPr lang="en-US" dirty="0"/>
+              <a:rPr lang="en-US" sz="1100" dirty="0"/>
               <a:t>Still slow with larger n lists</a:t>
             </a:r>
           </a:p>

</xml_diff>